<commit_message>
Photos updated and powerpoint almost complete
</commit_message>
<xml_diff>
--- a/StreamZ_presentation.pptx
+++ b/StreamZ_presentation.pptx
@@ -4389,12 +4389,65 @@
           <a:chExt cx="0" cy="0"/>
         </a:xfrm>
       </p:grpSpPr>
+      <p:sp>
+        <p:nvSpPr>
+          <p:cNvPr id="17" name="Retângulo: Cantos Diagonais Cortados 16">
+            <a:extLst>
+              <a:ext uri="{FF2B5EF4-FFF2-40B4-BE49-F238E27FC236}">
+                <a16:creationId xmlns:a16="http://schemas.microsoft.com/office/drawing/2014/main" id="{6A45A929-1DD4-48A3-A6C2-F55778163D45}"/>
+              </a:ext>
+            </a:extLst>
+          </p:cNvPr>
+          <p:cNvSpPr/>
+          <p:nvPr/>
+        </p:nvSpPr>
+        <p:spPr>
+          <a:xfrm>
+            <a:off x="1067691" y="288052"/>
+            <a:ext cx="10096150" cy="663841"/>
+          </a:xfrm>
+          <a:prstGeom prst="snip2DiagRect">
+            <a:avLst/>
+          </a:prstGeom>
+          <a:effectLst>
+            <a:outerShdw blurRad="50800" dist="38100" dir="16200000" rotWithShape="0">
+              <a:prstClr val="black">
+                <a:alpha val="40000"/>
+              </a:prstClr>
+            </a:outerShdw>
+          </a:effectLst>
+        </p:spPr>
+        <p:style>
+          <a:lnRef idx="2">
+            <a:schemeClr val="accent1">
+              <a:shade val="50000"/>
+            </a:schemeClr>
+          </a:lnRef>
+          <a:fillRef idx="1">
+            <a:schemeClr val="accent1"/>
+          </a:fillRef>
+          <a:effectRef idx="0">
+            <a:schemeClr val="accent1"/>
+          </a:effectRef>
+          <a:fontRef idx="minor">
+            <a:schemeClr val="lt1"/>
+          </a:fontRef>
+        </p:style>
+        <p:txBody>
+          <a:bodyPr rtlCol="0" anchor="ctr"/>
+          <a:lstStyle/>
+          <a:p>
+            <a:pPr algn="ctr"/>
+            <a:endParaRPr lang="pt-PT"/>
+          </a:p>
+        </p:txBody>
+      </p:sp>
       <p:pic>
         <p:nvPicPr>
-          <p:cNvPr id="8" name="Imagem 7" descr="Uma imagem com texto&#10;&#10;Descrição gerada automaticamente">
-            <a:extLst>
-              <a:ext uri="{FF2B5EF4-FFF2-40B4-BE49-F238E27FC236}">
-                <a16:creationId xmlns:a16="http://schemas.microsoft.com/office/drawing/2014/main" id="{7C0D3126-E6E4-43E6-8F84-186366474C2F}"/>
+          <p:cNvPr id="6" name="Imagem 5" descr="Uma imagem com texto&#10;&#10;Descrição gerada automaticamente">
+            <a:extLst>
+              <a:ext uri="{FF2B5EF4-FFF2-40B4-BE49-F238E27FC236}">
+                <a16:creationId xmlns:a16="http://schemas.microsoft.com/office/drawing/2014/main" id="{61B99CF3-0828-410D-BAB1-00BA0E7AA24B}"/>
               </a:ext>
             </a:extLst>
           </p:cNvPr>
@@ -4417,7 +4470,79 @@
         </p:blipFill>
         <p:spPr>
           <a:xfrm>
-            <a:off x="5783244" y="5580470"/>
+            <a:off x="408001" y="5430862"/>
+            <a:ext cx="1420627" cy="1026422"/>
+          </a:xfrm>
+          <a:prstGeom prst="rect">
+            <a:avLst/>
+          </a:prstGeom>
+        </p:spPr>
+      </p:pic>
+      <p:pic>
+        <p:nvPicPr>
+          <p:cNvPr id="11" name="Imagem 10" descr="Uma imagem com texto&#10;&#10;Descrição gerada automaticamente">
+            <a:extLst>
+              <a:ext uri="{FF2B5EF4-FFF2-40B4-BE49-F238E27FC236}">
+                <a16:creationId xmlns:a16="http://schemas.microsoft.com/office/drawing/2014/main" id="{32031CF8-E300-4683-9331-9BF32BCC6F8E}"/>
+              </a:ext>
+            </a:extLst>
+          </p:cNvPr>
+          <p:cNvPicPr>
+            <a:picLocks noChangeAspect="1"/>
+          </p:cNvPicPr>
+          <p:nvPr/>
+        </p:nvPicPr>
+        <p:blipFill>
+          <a:blip r:embed="rId3">
+            <a:extLst>
+              <a:ext uri="{28A0092B-C50C-407E-A947-70E740481C1C}">
+                <a14:useLocalDpi xmlns:a14="http://schemas.microsoft.com/office/drawing/2010/main" val="0"/>
+              </a:ext>
+            </a:extLst>
+          </a:blip>
+          <a:stretch>
+            <a:fillRect/>
+          </a:stretch>
+        </p:blipFill>
+        <p:spPr>
+          <a:xfrm>
+            <a:off x="9814470" y="5574324"/>
+            <a:ext cx="1392296" cy="1072015"/>
+          </a:xfrm>
+          <a:prstGeom prst="rect">
+            <a:avLst/>
+          </a:prstGeom>
+        </p:spPr>
+      </p:pic>
+      <p:pic>
+        <p:nvPicPr>
+          <p:cNvPr id="8" name="Imagem 7" descr="Uma imagem com texto&#10;&#10;Descrição gerada automaticamente">
+            <a:extLst>
+              <a:ext uri="{FF2B5EF4-FFF2-40B4-BE49-F238E27FC236}">
+                <a16:creationId xmlns:a16="http://schemas.microsoft.com/office/drawing/2014/main" id="{7C0D3126-E6E4-43E6-8F84-186366474C2F}"/>
+              </a:ext>
+            </a:extLst>
+          </p:cNvPr>
+          <p:cNvPicPr>
+            <a:picLocks noChangeAspect="1"/>
+          </p:cNvPicPr>
+          <p:nvPr/>
+        </p:nvPicPr>
+        <p:blipFill>
+          <a:blip r:embed="rId4">
+            <a:extLst>
+              <a:ext uri="{28A0092B-C50C-407E-A947-70E740481C1C}">
+                <a14:useLocalDpi xmlns:a14="http://schemas.microsoft.com/office/drawing/2010/main" val="0"/>
+              </a:ext>
+            </a:extLst>
+          </a:blip>
+          <a:stretch>
+            <a:fillRect/>
+          </a:stretch>
+        </p:blipFill>
+        <p:spPr>
+          <a:xfrm>
+            <a:off x="5803013" y="5482352"/>
             <a:ext cx="625507" cy="1163987"/>
           </a:xfrm>
           <a:prstGeom prst="rect">
@@ -4454,6 +4579,9 @@
             <a:pPr algn="ctr"/>
             <a:r>
               <a:rPr lang="pt-PT" dirty="0">
+                <a:solidFill>
+                  <a:schemeClr val="bg1"/>
+                </a:solidFill>
                 <a:effectLst>
                   <a:outerShdw blurRad="38100" dist="38100" dir="2700000" algn="tl">
                     <a:srgbClr val="000000">
@@ -4484,7 +4612,7 @@
           </p:nvPr>
         </p:nvPicPr>
         <p:blipFill>
-          <a:blip r:embed="rId3">
+          <a:blip r:embed="rId5">
             <a:extLst>
               <a:ext uri="{28A0092B-C50C-407E-A947-70E740481C1C}">
                 <a14:useLocalDpi xmlns:a14="http://schemas.microsoft.com/office/drawing/2010/main" val="0"/>
@@ -4517,7 +4645,7 @@
           <p:nvPr/>
         </p:nvPicPr>
         <p:blipFill>
-          <a:blip r:embed="rId4">
+          <a:blip r:embed="rId6">
             <a:extLst>
               <a:ext uri="{28A0092B-C50C-407E-A947-70E740481C1C}">
                 <a14:useLocalDpi xmlns:a14="http://schemas.microsoft.com/office/drawing/2010/main" val="0"/>
@@ -4553,7 +4681,7 @@
           <p:nvPr/>
         </p:nvPicPr>
         <p:blipFill>
-          <a:blip r:embed="rId5">
+          <a:blip r:embed="rId7">
             <a:extLst>
               <a:ext uri="{28A0092B-C50C-407E-A947-70E740481C1C}">
                 <a14:useLocalDpi xmlns:a14="http://schemas.microsoft.com/office/drawing/2010/main" val="0"/>
@@ -4680,8 +4808,8 @@
         </p:nvSpPr>
         <p:spPr>
           <a:xfrm>
-            <a:off x="960920" y="1236675"/>
-            <a:ext cx="2353225" cy="1692771"/>
+            <a:off x="1114371" y="1259916"/>
+            <a:ext cx="2696474" cy="2062103"/>
           </a:xfrm>
           <a:prstGeom prst="rect">
             <a:avLst/>
@@ -4695,90 +4823,81 @@
           <a:lstStyle/>
           <a:p>
             <a:r>
-              <a:rPr lang="pt-PT" sz="1300" dirty="0"/>
-              <a:t>Correspondência de cada janela a cada secção da </a:t>
-            </a:r>
-            <a:r>
-              <a:rPr lang="pt-PT" sz="1300" i="1" dirty="0" err="1"/>
-              <a:t>framework</a:t>
-            </a:r>
-            <a:r>
-              <a:rPr lang="pt-PT" sz="1300" dirty="0"/>
-              <a:t>:</a:t>
-            </a:r>
-          </a:p>
-          <a:p>
-            <a:endParaRPr lang="pt-PT" sz="1300" dirty="0"/>
-          </a:p>
-          <a:p>
-            <a:pPr marL="342900" indent="-342900">
+              <a:rPr lang="pt-PT" sz="1600" b="1" dirty="0"/>
+              <a:t>Legenda:</a:t>
+            </a:r>
+          </a:p>
+          <a:p>
+            <a:endParaRPr lang="pt-PT" sz="1600" dirty="0"/>
+          </a:p>
+          <a:p>
+            <a:pPr marL="342900" indent="-342900" algn="just">
               <a:buFont typeface="+mj-lt"/>
               <a:buAutoNum type="arabicPeriod"/>
             </a:pPr>
             <a:r>
-              <a:rPr lang="pt-PT" sz="1300" dirty="0"/>
-              <a:t>Menu de login</a:t>
-            </a:r>
-          </a:p>
-          <a:p>
-            <a:pPr marL="342900" indent="-342900">
+              <a:rPr lang="pt-PT" sz="1600" dirty="0"/>
+              <a:t>Menu da StreamZ </a:t>
+            </a:r>
+            <a:r>
+              <a:rPr lang="pt-PT" sz="1600" dirty="0" err="1"/>
+              <a:t>framework</a:t>
+            </a:r>
+            <a:endParaRPr lang="pt-PT" sz="1600" dirty="0"/>
+          </a:p>
+          <a:p>
+            <a:pPr marL="342900" indent="-342900" algn="just">
               <a:buFont typeface="+mj-lt"/>
               <a:buAutoNum type="arabicPeriod"/>
             </a:pPr>
             <a:r>
-              <a:rPr lang="pt-PT" sz="1300" dirty="0"/>
-              <a:t>Opção de </a:t>
-            </a:r>
-            <a:r>
-              <a:rPr lang="pt-PT" sz="1300" dirty="0" err="1"/>
-              <a:t>SignIn</a:t>
-            </a:r>
-            <a:endParaRPr lang="pt-PT" sz="1300" dirty="0"/>
-          </a:p>
-          <a:p>
-            <a:pPr marL="342900" indent="-342900">
+              <a:rPr lang="pt-PT" sz="1600" dirty="0"/>
+              <a:t>Menu das definições</a:t>
+            </a:r>
+          </a:p>
+          <a:p>
+            <a:pPr marL="342900" indent="-342900" algn="just">
               <a:buFont typeface="+mj-lt"/>
               <a:buAutoNum type="arabicPeriod"/>
             </a:pPr>
             <a:r>
-              <a:rPr lang="pt-PT" sz="1300" dirty="0"/>
-              <a:t>Opção de </a:t>
-            </a:r>
-            <a:r>
-              <a:rPr lang="pt-PT" sz="1300" dirty="0" err="1"/>
-              <a:t>SignUp</a:t>
-            </a:r>
-            <a:endParaRPr lang="pt-PT" sz="1300" dirty="0"/>
-          </a:p>
-          <a:p>
-            <a:pPr marL="342900" indent="-342900">
+              <a:rPr lang="pt-PT" sz="1600" dirty="0"/>
+              <a:t>Menu de </a:t>
+            </a:r>
+            <a:r>
+              <a:rPr lang="pt-PT" sz="1600" i="1" dirty="0"/>
+              <a:t>Login</a:t>
+            </a:r>
+          </a:p>
+          <a:p>
+            <a:pPr marL="342900" indent="-342900" algn="just">
               <a:buFont typeface="+mj-lt"/>
               <a:buAutoNum type="arabicPeriod"/>
             </a:pPr>
             <a:r>
-              <a:rPr lang="pt-PT" sz="1300" dirty="0"/>
-              <a:t>Menu do </a:t>
-            </a:r>
-            <a:r>
-              <a:rPr lang="pt-PT" sz="1300" dirty="0" err="1"/>
-              <a:t>streamer</a:t>
-            </a:r>
-            <a:endParaRPr lang="pt-PT" sz="1300" dirty="0"/>
-          </a:p>
-          <a:p>
-            <a:pPr marL="342900" indent="-342900">
+              <a:rPr lang="pt-PT" sz="1600" dirty="0"/>
+              <a:t>Opção de </a:t>
+            </a:r>
+            <a:r>
+              <a:rPr lang="pt-PT" sz="1600" i="1" dirty="0" err="1"/>
+              <a:t>SignIn</a:t>
+            </a:r>
+            <a:endParaRPr lang="pt-PT" sz="1600" i="1" dirty="0"/>
+          </a:p>
+          <a:p>
+            <a:pPr marL="342900" indent="-342900" algn="just">
               <a:buFont typeface="+mj-lt"/>
               <a:buAutoNum type="arabicPeriod"/>
             </a:pPr>
             <a:r>
-              <a:rPr lang="pt-PT" sz="1300" dirty="0"/>
-              <a:t>Menu do </a:t>
-            </a:r>
-            <a:r>
-              <a:rPr lang="pt-PT" sz="1300" dirty="0" err="1"/>
-              <a:t>viewer</a:t>
-            </a:r>
-            <a:endParaRPr lang="pt-PT" sz="1300" dirty="0"/>
+              <a:rPr lang="pt-PT" sz="1600" dirty="0"/>
+              <a:t>Opção de </a:t>
+            </a:r>
+            <a:r>
+              <a:rPr lang="pt-PT" sz="1600" i="1" dirty="0" err="1"/>
+              <a:t>SignUp</a:t>
+            </a:r>
+            <a:endParaRPr lang="pt-PT" sz="1600" i="1" dirty="0"/>
           </a:p>
         </p:txBody>
       </p:sp>
@@ -4797,7 +4916,7 @@
           <p:nvPr/>
         </p:nvPicPr>
         <p:blipFill>
-          <a:blip r:embed="rId6">
+          <a:blip r:embed="rId8">
             <a:extLst>
               <a:ext uri="{28A0092B-C50C-407E-A947-70E740481C1C}">
                 <a14:useLocalDpi xmlns:a14="http://schemas.microsoft.com/office/drawing/2010/main" val="0"/>
@@ -4833,7 +4952,7 @@
           <p:nvPr/>
         </p:nvPicPr>
         <p:blipFill>
-          <a:blip r:embed="rId7">
+          <a:blip r:embed="rId9">
             <a:extLst>
               <a:ext uri="{28A0092B-C50C-407E-A947-70E740481C1C}">
                 <a14:useLocalDpi xmlns:a14="http://schemas.microsoft.com/office/drawing/2010/main" val="0"/>
@@ -4846,7 +4965,7 @@
         </p:blipFill>
         <p:spPr>
           <a:xfrm>
-            <a:off x="8534603" y="1302305"/>
+            <a:off x="8534603" y="1241259"/>
             <a:ext cx="1120237" cy="1783235"/>
           </a:xfrm>
           <a:prstGeom prst="rect">
@@ -5535,6 +5654,159 @@
           </p:txBody>
         </p:sp>
       </p:grpSp>
+      <p:sp>
+        <p:nvSpPr>
+          <p:cNvPr id="40" name="CaixaDeTexto 39">
+            <a:extLst>
+              <a:ext uri="{FF2B5EF4-FFF2-40B4-BE49-F238E27FC236}">
+                <a16:creationId xmlns:a16="http://schemas.microsoft.com/office/drawing/2014/main" id="{21580627-2465-41A9-BA4A-04DEB0B8E213}"/>
+              </a:ext>
+            </a:extLst>
+          </p:cNvPr>
+          <p:cNvSpPr txBox="1"/>
+          <p:nvPr/>
+        </p:nvSpPr>
+        <p:spPr>
+          <a:xfrm>
+            <a:off x="9771545" y="1229719"/>
+            <a:ext cx="1392296" cy="1146468"/>
+          </a:xfrm>
+          <a:prstGeom prst="rect">
+            <a:avLst/>
+          </a:prstGeom>
+          <a:noFill/>
+        </p:spPr>
+        <p:txBody>
+          <a:bodyPr wrap="square" rtlCol="0">
+            <a:spAutoFit/>
+          </a:bodyPr>
+          <a:lstStyle/>
+          <a:p>
+            <a:pPr algn="just"/>
+            <a:r>
+              <a:rPr lang="pt-PT" sz="1600" dirty="0"/>
+              <a:t>* </a:t>
+            </a:r>
+            <a:r>
+              <a:rPr lang="pt-PT" sz="1050" dirty="0"/>
+              <a:t>Possíveis</a:t>
+            </a:r>
+            <a:r>
+              <a:rPr lang="pt-PT" sz="1050" i="1" dirty="0"/>
+              <a:t> GUI </a:t>
+            </a:r>
+            <a:r>
+              <a:rPr lang="pt-PT" sz="1050" dirty="0"/>
+              <a:t>de algumas opções do programa  que apenas se encontra implementado em consola. </a:t>
+            </a:r>
+          </a:p>
+        </p:txBody>
+      </p:sp>
+      <p:sp>
+        <p:nvSpPr>
+          <p:cNvPr id="19" name="CaixaDeTexto 18">
+            <a:extLst>
+              <a:ext uri="{FF2B5EF4-FFF2-40B4-BE49-F238E27FC236}">
+                <a16:creationId xmlns:a16="http://schemas.microsoft.com/office/drawing/2014/main" id="{FF5490AE-A1E0-4036-A1CA-968D933AC585}"/>
+              </a:ext>
+            </a:extLst>
+          </p:cNvPr>
+          <p:cNvSpPr txBox="1"/>
+          <p:nvPr/>
+        </p:nvSpPr>
+        <p:spPr>
+          <a:xfrm>
+            <a:off x="10526611" y="3567840"/>
+            <a:ext cx="338513" cy="369332"/>
+          </a:xfrm>
+          <a:prstGeom prst="rect">
+            <a:avLst/>
+          </a:prstGeom>
+          <a:noFill/>
+        </p:spPr>
+        <p:txBody>
+          <a:bodyPr wrap="square" rtlCol="0">
+            <a:spAutoFit/>
+          </a:bodyPr>
+          <a:lstStyle/>
+          <a:p>
+            <a:r>
+              <a:rPr lang="pt-PT" dirty="0"/>
+              <a:t>*</a:t>
+            </a:r>
+          </a:p>
+        </p:txBody>
+      </p:sp>
+      <p:sp>
+        <p:nvSpPr>
+          <p:cNvPr id="41" name="CaixaDeTexto 40">
+            <a:extLst>
+              <a:ext uri="{FF2B5EF4-FFF2-40B4-BE49-F238E27FC236}">
+                <a16:creationId xmlns:a16="http://schemas.microsoft.com/office/drawing/2014/main" id="{55DE062B-6F3D-4B65-83DE-704BC1105D24}"/>
+              </a:ext>
+            </a:extLst>
+          </p:cNvPr>
+          <p:cNvSpPr txBox="1"/>
+          <p:nvPr/>
+        </p:nvSpPr>
+        <p:spPr>
+          <a:xfrm>
+            <a:off x="7387734" y="3689482"/>
+            <a:ext cx="425820" cy="369332"/>
+          </a:xfrm>
+          <a:prstGeom prst="rect">
+            <a:avLst/>
+          </a:prstGeom>
+          <a:noFill/>
+        </p:spPr>
+        <p:txBody>
+          <a:bodyPr wrap="square" rtlCol="0">
+            <a:spAutoFit/>
+          </a:bodyPr>
+          <a:lstStyle/>
+          <a:p>
+            <a:r>
+              <a:rPr lang="pt-PT" dirty="0"/>
+              <a:t>*</a:t>
+            </a:r>
+          </a:p>
+        </p:txBody>
+      </p:sp>
+      <p:sp>
+        <p:nvSpPr>
+          <p:cNvPr id="42" name="CaixaDeTexto 41">
+            <a:extLst>
+              <a:ext uri="{FF2B5EF4-FFF2-40B4-BE49-F238E27FC236}">
+                <a16:creationId xmlns:a16="http://schemas.microsoft.com/office/drawing/2014/main" id="{831698D1-2ADC-40B9-B770-6D695276EBC7}"/>
+              </a:ext>
+            </a:extLst>
+          </p:cNvPr>
+          <p:cNvSpPr txBox="1"/>
+          <p:nvPr/>
+        </p:nvSpPr>
+        <p:spPr>
+          <a:xfrm>
+            <a:off x="3105448" y="3474790"/>
+            <a:ext cx="425820" cy="369332"/>
+          </a:xfrm>
+          <a:prstGeom prst="rect">
+            <a:avLst/>
+          </a:prstGeom>
+          <a:noFill/>
+        </p:spPr>
+        <p:txBody>
+          <a:bodyPr wrap="square" rtlCol="0">
+            <a:spAutoFit/>
+          </a:bodyPr>
+          <a:lstStyle/>
+          <a:p>
+            <a:r>
+              <a:rPr lang="pt-PT" dirty="0"/>
+              <a:t>*</a:t>
+            </a:r>
+          </a:p>
+        </p:txBody>
+      </p:sp>
     </p:spTree>
     <p:extLst>
       <p:ext uri="{BB962C8B-B14F-4D97-AF65-F5344CB8AC3E}">
@@ -5567,6 +5839,59 @@
       </p:grpSpPr>
       <p:sp>
         <p:nvSpPr>
+          <p:cNvPr id="27" name="Retângulo: Cantos Diagonais Cortados 26">
+            <a:extLst>
+              <a:ext uri="{FF2B5EF4-FFF2-40B4-BE49-F238E27FC236}">
+                <a16:creationId xmlns:a16="http://schemas.microsoft.com/office/drawing/2014/main" id="{0EB20209-7A70-4B6D-84F1-8C027629A353}"/>
+              </a:ext>
+            </a:extLst>
+          </p:cNvPr>
+          <p:cNvSpPr/>
+          <p:nvPr/>
+        </p:nvSpPr>
+        <p:spPr>
+          <a:xfrm>
+            <a:off x="1067691" y="288052"/>
+            <a:ext cx="10096150" cy="663841"/>
+          </a:xfrm>
+          <a:prstGeom prst="snip2DiagRect">
+            <a:avLst/>
+          </a:prstGeom>
+          <a:effectLst>
+            <a:outerShdw blurRad="50800" dist="38100" dir="16200000" rotWithShape="0">
+              <a:prstClr val="black">
+                <a:alpha val="40000"/>
+              </a:prstClr>
+            </a:outerShdw>
+          </a:effectLst>
+        </p:spPr>
+        <p:style>
+          <a:lnRef idx="2">
+            <a:schemeClr val="accent1">
+              <a:shade val="50000"/>
+            </a:schemeClr>
+          </a:lnRef>
+          <a:fillRef idx="1">
+            <a:schemeClr val="accent1"/>
+          </a:fillRef>
+          <a:effectRef idx="0">
+            <a:schemeClr val="accent1"/>
+          </a:effectRef>
+          <a:fontRef idx="minor">
+            <a:schemeClr val="lt1"/>
+          </a:fontRef>
+        </p:style>
+        <p:txBody>
+          <a:bodyPr rtlCol="0" anchor="ctr"/>
+          <a:lstStyle/>
+          <a:p>
+            <a:pPr algn="ctr"/>
+            <a:endParaRPr lang="pt-PT"/>
+          </a:p>
+        </p:txBody>
+      </p:sp>
+      <p:sp>
+        <p:nvSpPr>
           <p:cNvPr id="2" name="Título 1">
             <a:extLst>
               <a:ext uri="{FF2B5EF4-FFF2-40B4-BE49-F238E27FC236}">
@@ -5583,7 +5908,7 @@
         </p:nvSpPr>
         <p:spPr>
           <a:xfrm>
-            <a:off x="1530288" y="214563"/>
+            <a:off x="1530286" y="278564"/>
             <a:ext cx="9131423" cy="718919"/>
           </a:xfrm>
         </p:spPr>
@@ -5594,6 +5919,9 @@
             <a:pPr algn="ctr"/>
             <a:r>
               <a:rPr lang="pt-PT" dirty="0">
+                <a:solidFill>
+                  <a:schemeClr val="bg1"/>
+                </a:solidFill>
                 <a:effectLst>
                   <a:outerShdw blurRad="38100" dist="38100" dir="2700000" algn="tl">
                     <a:srgbClr val="000000">
@@ -6032,8 +6360,8 @@
         </p:nvSpPr>
         <p:spPr>
           <a:xfrm>
-            <a:off x="484988" y="469106"/>
-            <a:ext cx="2353225" cy="1815882"/>
+            <a:off x="1067691" y="1249271"/>
+            <a:ext cx="2353225" cy="1323439"/>
           </a:xfrm>
           <a:prstGeom prst="rect">
             <a:avLst/>
@@ -6047,124 +6375,57 @@
           <a:lstStyle/>
           <a:p>
             <a:r>
-              <a:rPr lang="pt-PT" sz="1600" dirty="0"/>
-              <a:t>Correspondência de cada janela a cada secção da </a:t>
-            </a:r>
-            <a:r>
-              <a:rPr lang="pt-PT" sz="1600" i="1" dirty="0" err="1"/>
-              <a:t>framework</a:t>
-            </a:r>
-            <a:r>
-              <a:rPr lang="pt-PT" sz="1600" dirty="0"/>
-              <a:t>:</a:t>
+              <a:rPr lang="pt-PT" sz="1600" b="1" dirty="0"/>
+              <a:t>Legenda:</a:t>
             </a:r>
           </a:p>
           <a:p>
             <a:endParaRPr lang="pt-PT" sz="1600" dirty="0"/>
           </a:p>
           <a:p>
-            <a:pPr marL="342900" indent="-342900">
+            <a:pPr marL="342900" indent="-342900" algn="just">
               <a:buAutoNum type="arabicPeriod" startAt="6"/>
             </a:pPr>
             <a:r>
-              <a:rPr lang="pt-PT" sz="1600" dirty="0" err="1"/>
-              <a:t>Asd</a:t>
-            </a:r>
-            <a:endParaRPr lang="pt-PT" sz="1600" dirty="0"/>
-          </a:p>
-          <a:p>
-            <a:pPr marL="342900" indent="-342900">
+              <a:rPr lang="pt-PT" sz="1600" dirty="0"/>
+              <a:t>Menu do </a:t>
+            </a:r>
+            <a:r>
+              <a:rPr lang="pt-PT" sz="1600" i="1" dirty="0" err="1"/>
+              <a:t>viewer</a:t>
+            </a:r>
+            <a:endParaRPr lang="pt-PT" sz="1600" i="1" dirty="0"/>
+          </a:p>
+          <a:p>
+            <a:pPr marL="342900" indent="-342900" algn="just">
               <a:buAutoNum type="arabicPeriod" startAt="6"/>
             </a:pPr>
             <a:r>
               <a:rPr lang="pt-PT" sz="1600" dirty="0"/>
-              <a:t>A</a:t>
-            </a:r>
-          </a:p>
-          <a:p>
-            <a:pPr marL="342900" indent="-342900">
+              <a:t>Menu do </a:t>
+            </a:r>
+            <a:r>
+              <a:rPr lang="pt-PT" sz="1600" i="1" dirty="0" err="1"/>
+              <a:t>streamer</a:t>
+            </a:r>
+            <a:endParaRPr lang="pt-PT" sz="1600" i="1" dirty="0"/>
+          </a:p>
+          <a:p>
+            <a:pPr marL="342900" indent="-342900" algn="just">
               <a:buAutoNum type="arabicPeriod" startAt="6"/>
             </a:pPr>
             <a:r>
-              <a:rPr lang="pt-PT" sz="1600" dirty="0" err="1"/>
-              <a:t>er</a:t>
-            </a:r>
-            <a:endParaRPr lang="pt-PT" sz="1600" dirty="0"/>
+              <a:rPr lang="pt-PT" sz="1600" dirty="0"/>
+              <a:t>Menu do </a:t>
+            </a:r>
+            <a:r>
+              <a:rPr lang="pt-PT" sz="1600" i="1" dirty="0" err="1"/>
+              <a:t>admin</a:t>
+            </a:r>
+            <a:endParaRPr lang="pt-PT" sz="1600" i="1" dirty="0"/>
           </a:p>
         </p:txBody>
       </p:sp>
-      <p:pic>
-        <p:nvPicPr>
-          <p:cNvPr id="15" name="Imagem 14" descr="Uma imagem com texto&#10;&#10;Descrição gerada automaticamente">
-            <a:extLst>
-              <a:ext uri="{FF2B5EF4-FFF2-40B4-BE49-F238E27FC236}">
-                <a16:creationId xmlns:a16="http://schemas.microsoft.com/office/drawing/2014/main" id="{45C4523D-E02E-46EE-B378-9218CBFB1463}"/>
-              </a:ext>
-            </a:extLst>
-          </p:cNvPr>
-          <p:cNvPicPr>
-            <a:picLocks noChangeAspect="1"/>
-          </p:cNvPicPr>
-          <p:nvPr/>
-        </p:nvPicPr>
-        <p:blipFill>
-          <a:blip r:embed="rId5">
-            <a:extLst>
-              <a:ext uri="{28A0092B-C50C-407E-A947-70E740481C1C}">
-                <a14:useLocalDpi xmlns:a14="http://schemas.microsoft.com/office/drawing/2010/main" val="0"/>
-              </a:ext>
-            </a:extLst>
-          </a:blip>
-          <a:stretch>
-            <a:fillRect/>
-          </a:stretch>
-        </p:blipFill>
-        <p:spPr>
-          <a:xfrm>
-            <a:off x="2838213" y="3388504"/>
-            <a:ext cx="1735243" cy="1722047"/>
-          </a:xfrm>
-          <a:prstGeom prst="rect">
-            <a:avLst/>
-          </a:prstGeom>
-        </p:spPr>
-      </p:pic>
-      <p:pic>
-        <p:nvPicPr>
-          <p:cNvPr id="17" name="Imagem 16" descr="Uma imagem com texto&#10;&#10;Descrição gerada automaticamente">
-            <a:extLst>
-              <a:ext uri="{FF2B5EF4-FFF2-40B4-BE49-F238E27FC236}">
-                <a16:creationId xmlns:a16="http://schemas.microsoft.com/office/drawing/2014/main" id="{740AE632-AF05-4451-B909-E50C58D12F16}"/>
-              </a:ext>
-            </a:extLst>
-          </p:cNvPr>
-          <p:cNvPicPr>
-            <a:picLocks noChangeAspect="1"/>
-          </p:cNvPicPr>
-          <p:nvPr/>
-        </p:nvPicPr>
-        <p:blipFill>
-          <a:blip r:embed="rId6">
-            <a:extLst>
-              <a:ext uri="{28A0092B-C50C-407E-A947-70E740481C1C}">
-                <a14:useLocalDpi xmlns:a14="http://schemas.microsoft.com/office/drawing/2010/main" val="0"/>
-              </a:ext>
-            </a:extLst>
-          </a:blip>
-          <a:stretch>
-            <a:fillRect/>
-          </a:stretch>
-        </p:blipFill>
-        <p:spPr>
-          <a:xfrm>
-            <a:off x="10852500" y="3014885"/>
-            <a:ext cx="1079104" cy="1957571"/>
-          </a:xfrm>
-          <a:prstGeom prst="rect">
-            <a:avLst/>
-          </a:prstGeom>
-        </p:spPr>
-      </p:pic>
       <p:cxnSp>
         <p:nvCxnSpPr>
           <p:cNvPr id="41" name="Conexão: Ângulo Reto 40">
@@ -6206,6 +6467,114 @@
           </a:fontRef>
         </p:style>
       </p:cxnSp>
+      <p:pic>
+        <p:nvPicPr>
+          <p:cNvPr id="4" name="Imagem 3" descr="Uma imagem com texto&#10;&#10;Descrição gerada automaticamente">
+            <a:extLst>
+              <a:ext uri="{FF2B5EF4-FFF2-40B4-BE49-F238E27FC236}">
+                <a16:creationId xmlns:a16="http://schemas.microsoft.com/office/drawing/2014/main" id="{2EBE558A-A9F3-4F18-A69B-14CAEB4376A3}"/>
+              </a:ext>
+            </a:extLst>
+          </p:cNvPr>
+          <p:cNvPicPr>
+            <a:picLocks noChangeAspect="1"/>
+          </p:cNvPicPr>
+          <p:nvPr/>
+        </p:nvPicPr>
+        <p:blipFill>
+          <a:blip r:embed="rId5">
+            <a:extLst>
+              <a:ext uri="{28A0092B-C50C-407E-A947-70E740481C1C}">
+                <a14:useLocalDpi xmlns:a14="http://schemas.microsoft.com/office/drawing/2010/main" val="0"/>
+              </a:ext>
+            </a:extLst>
+          </a:blip>
+          <a:stretch>
+            <a:fillRect/>
+          </a:stretch>
+        </p:blipFill>
+        <p:spPr>
+          <a:xfrm>
+            <a:off x="2813955" y="3232697"/>
+            <a:ext cx="2004234" cy="2392887"/>
+          </a:xfrm>
+          <a:prstGeom prst="rect">
+            <a:avLst/>
+          </a:prstGeom>
+        </p:spPr>
+      </p:pic>
+      <p:pic>
+        <p:nvPicPr>
+          <p:cNvPr id="6" name="Imagem 5" descr="Uma imagem com texto&#10;&#10;Descrição gerada automaticamente">
+            <a:extLst>
+              <a:ext uri="{FF2B5EF4-FFF2-40B4-BE49-F238E27FC236}">
+                <a16:creationId xmlns:a16="http://schemas.microsoft.com/office/drawing/2014/main" id="{A26AD443-B548-4E35-ABC1-E31CEFFC45F0}"/>
+              </a:ext>
+            </a:extLst>
+          </p:cNvPr>
+          <p:cNvPicPr>
+            <a:picLocks noChangeAspect="1"/>
+          </p:cNvPicPr>
+          <p:nvPr/>
+        </p:nvPicPr>
+        <p:blipFill>
+          <a:blip r:embed="rId6">
+            <a:extLst>
+              <a:ext uri="{28A0092B-C50C-407E-A947-70E740481C1C}">
+                <a14:useLocalDpi xmlns:a14="http://schemas.microsoft.com/office/drawing/2010/main" val="0"/>
+              </a:ext>
+            </a:extLst>
+          </a:blip>
+          <a:stretch>
+            <a:fillRect/>
+          </a:stretch>
+        </p:blipFill>
+        <p:spPr>
+          <a:xfrm>
+            <a:off x="10477342" y="3232697"/>
+            <a:ext cx="1459360" cy="1837493"/>
+          </a:xfrm>
+          <a:prstGeom prst="rect">
+            <a:avLst/>
+          </a:prstGeom>
+        </p:spPr>
+      </p:pic>
+      <p:pic>
+        <p:nvPicPr>
+          <p:cNvPr id="9" name="Imagem 8" descr="Uma imagem com texto&#10;&#10;Descrição gerada automaticamente">
+            <a:extLst>
+              <a:ext uri="{FF2B5EF4-FFF2-40B4-BE49-F238E27FC236}">
+                <a16:creationId xmlns:a16="http://schemas.microsoft.com/office/drawing/2014/main" id="{9F618556-372B-4F8D-A31C-832DAA53E994}"/>
+              </a:ext>
+            </a:extLst>
+          </p:cNvPr>
+          <p:cNvPicPr>
+            <a:picLocks noChangeAspect="1"/>
+          </p:cNvPicPr>
+          <p:nvPr/>
+        </p:nvPicPr>
+        <p:blipFill>
+          <a:blip r:embed="rId7">
+            <a:extLst>
+              <a:ext uri="{28A0092B-C50C-407E-A947-70E740481C1C}">
+                <a14:useLocalDpi xmlns:a14="http://schemas.microsoft.com/office/drawing/2010/main" val="0"/>
+              </a:ext>
+            </a:extLst>
+          </a:blip>
+          <a:stretch>
+            <a:fillRect/>
+          </a:stretch>
+        </p:blipFill>
+        <p:spPr>
+          <a:xfrm>
+            <a:off x="5670681" y="4022851"/>
+            <a:ext cx="1686385" cy="2316065"/>
+          </a:xfrm>
+          <a:prstGeom prst="rect">
+            <a:avLst/>
+          </a:prstGeom>
+        </p:spPr>
+      </p:pic>
       <p:grpSp>
         <p:nvGrpSpPr>
           <p:cNvPr id="46" name="Agrupar 45">
@@ -6220,10 +6589,10 @@
         </p:nvGrpSpPr>
         <p:grpSpPr>
           <a:xfrm>
-            <a:off x="6446934" y="6304189"/>
-            <a:ext cx="413075" cy="369332"/>
+            <a:off x="7068946" y="6291048"/>
+            <a:ext cx="413075" cy="369705"/>
             <a:chOff x="510203" y="599076"/>
-            <a:chExt cx="413075" cy="369332"/>
+            <a:chExt cx="413075" cy="369705"/>
           </a:xfrm>
         </p:grpSpPr>
         <p:sp>
@@ -6286,7 +6655,7 @@
           </p:nvSpPr>
           <p:spPr>
             <a:xfrm>
-              <a:off x="553044" y="599076"/>
+              <a:off x="572224" y="599449"/>
               <a:ext cx="274523" cy="369332"/>
             </a:xfrm>
             <a:prstGeom prst="rect">
@@ -6312,6 +6681,76 @@
           </p:txBody>
         </p:sp>
       </p:grpSp>
+      <p:sp>
+        <p:nvSpPr>
+          <p:cNvPr id="29" name="CaixaDeTexto 28">
+            <a:extLst>
+              <a:ext uri="{FF2B5EF4-FFF2-40B4-BE49-F238E27FC236}">
+                <a16:creationId xmlns:a16="http://schemas.microsoft.com/office/drawing/2014/main" id="{582DD70B-E3A9-4A45-8509-6602C7B0F932}"/>
+              </a:ext>
+            </a:extLst>
+          </p:cNvPr>
+          <p:cNvSpPr txBox="1"/>
+          <p:nvPr/>
+        </p:nvSpPr>
+        <p:spPr>
+          <a:xfrm>
+            <a:off x="255297" y="3774913"/>
+            <a:ext cx="425820" cy="369332"/>
+          </a:xfrm>
+          <a:prstGeom prst="rect">
+            <a:avLst/>
+          </a:prstGeom>
+          <a:noFill/>
+        </p:spPr>
+        <p:txBody>
+          <a:bodyPr wrap="square" rtlCol="0">
+            <a:spAutoFit/>
+          </a:bodyPr>
+          <a:lstStyle/>
+          <a:p>
+            <a:r>
+              <a:rPr lang="pt-PT" dirty="0"/>
+              <a:t>*</a:t>
+            </a:r>
+          </a:p>
+        </p:txBody>
+      </p:sp>
+      <p:sp>
+        <p:nvSpPr>
+          <p:cNvPr id="30" name="CaixaDeTexto 29">
+            <a:extLst>
+              <a:ext uri="{FF2B5EF4-FFF2-40B4-BE49-F238E27FC236}">
+                <a16:creationId xmlns:a16="http://schemas.microsoft.com/office/drawing/2014/main" id="{71473274-FC68-4965-8DC3-85B32D8783D9}"/>
+              </a:ext>
+            </a:extLst>
+          </p:cNvPr>
+          <p:cNvSpPr txBox="1"/>
+          <p:nvPr/>
+        </p:nvSpPr>
+        <p:spPr>
+          <a:xfrm>
+            <a:off x="7806721" y="3774717"/>
+            <a:ext cx="425820" cy="369332"/>
+          </a:xfrm>
+          <a:prstGeom prst="rect">
+            <a:avLst/>
+          </a:prstGeom>
+          <a:noFill/>
+        </p:spPr>
+        <p:txBody>
+          <a:bodyPr wrap="square" rtlCol="0">
+            <a:spAutoFit/>
+          </a:bodyPr>
+          <a:lstStyle/>
+          <a:p>
+            <a:r>
+              <a:rPr lang="pt-PT" dirty="0"/>
+              <a:t>*</a:t>
+            </a:r>
+          </a:p>
+        </p:txBody>
+      </p:sp>
     </p:spTree>
     <p:extLst>
       <p:ext uri="{BB962C8B-B14F-4D97-AF65-F5344CB8AC3E}">
@@ -14359,14 +14798,14 @@
             </a:r>
           </a:p>
           <a:p>
-            <a:pPr lvl="1"/>
+            <a:pPr lvl="1" algn="just"/>
             <a:r>
               <a:rPr lang="pt-PT" sz="1400" dirty="0"/>
               <a:t>Decompor o problema proposto nas melhores e mais eficientes estruturas de dados;</a:t>
             </a:r>
           </a:p>
           <a:p>
-            <a:pPr lvl="1"/>
+            <a:pPr lvl="1" algn="just"/>
             <a:r>
               <a:rPr lang="pt-PT" sz="1400" dirty="0"/>
               <a:t>Trabalhar com um número elevado de </a:t>
@@ -14381,7 +14820,7 @@
             </a:r>
           </a:p>
           <a:p>
-            <a:pPr lvl="1"/>
+            <a:pPr lvl="1" algn="just"/>
             <a:r>
               <a:rPr lang="pt-PT" sz="1400" dirty="0"/>
               <a:t>Criação de um programa com fluxo dinâmico e interativo, não permitindo, contudo, maus </a:t>
@@ -14396,14 +14835,14 @@
             </a:r>
           </a:p>
           <a:p>
-            <a:pPr lvl="1"/>
+            <a:pPr lvl="1" algn="just"/>
             <a:r>
               <a:rPr lang="pt-PT" sz="1400" dirty="0"/>
               <a:t>O desenvolvimento do melhor padrão possível para guardar e importar os respetivos dados em ficheiros;</a:t>
             </a:r>
           </a:p>
           <a:p>
-            <a:pPr lvl="1"/>
+            <a:pPr lvl="1" algn="just"/>
             <a:r>
               <a:rPr lang="pt-PT" sz="1400" dirty="0"/>
               <a:t>Criação de material de teste detalhado, com a utilização dos google </a:t>
@@ -14418,7 +14857,7 @@
             </a:r>
           </a:p>
           <a:p>
-            <a:pPr lvl="1"/>
+            <a:pPr lvl="1" algn="just"/>
             <a:r>
               <a:rPr lang="pt-PT" sz="1400" dirty="0"/>
               <a:t>Obtenção de um programa </a:t>
@@ -14450,14 +14889,14 @@
             </a:r>
           </a:p>
           <a:p>
-            <a:pPr lvl="1"/>
+            <a:pPr lvl="1" algn="just"/>
             <a:r>
               <a:rPr lang="pt-PT" sz="1400" dirty="0"/>
               <a:t>Lucas Santos: 50%</a:t>
             </a:r>
           </a:p>
           <a:p>
-            <a:pPr lvl="1"/>
+            <a:pPr lvl="1" algn="just"/>
             <a:r>
               <a:rPr lang="pt-PT" sz="1400" dirty="0"/>
               <a:t>Sérgio da Gama: 50%</a:t>

</xml_diff>

<commit_message>
Added photos and updated powerpoint, missing two slides
</commit_message>
<xml_diff>
--- a/StreamZ_presentation.pptx
+++ b/StreamZ_presentation.pptx
@@ -11,12 +11,14 @@
     <p:sldId id="267" r:id="rId5"/>
     <p:sldId id="262" r:id="rId6"/>
     <p:sldId id="263" r:id="rId7"/>
-    <p:sldId id="264" r:id="rId8"/>
-    <p:sldId id="265" r:id="rId9"/>
-    <p:sldId id="266" r:id="rId10"/>
-    <p:sldId id="260" r:id="rId11"/>
-    <p:sldId id="268" r:id="rId12"/>
-    <p:sldId id="269" r:id="rId13"/>
+    <p:sldId id="270" r:id="rId8"/>
+    <p:sldId id="264" r:id="rId9"/>
+    <p:sldId id="271" r:id="rId10"/>
+    <p:sldId id="265" r:id="rId11"/>
+    <p:sldId id="266" r:id="rId12"/>
+    <p:sldId id="260" r:id="rId13"/>
+    <p:sldId id="268" r:id="rId14"/>
+    <p:sldId id="269" r:id="rId15"/>
   </p:sldIdLst>
   <p:sldSz cx="12192000" cy="6858000"/>
   <p:notesSz cx="6858000" cy="9144000"/>
@@ -282,7 +284,7 @@
           <a:p>
             <a:fld id="{A19A71F5-DA94-4BA2-B9E9-1E6B8C3AD471}" type="datetimeFigureOut">
               <a:rPr lang="pt-PT" smtClean="0"/>
-              <a:t>21/11/2020</a:t>
+              <a:t>22/11/2020</a:t>
             </a:fld>
             <a:endParaRPr lang="pt-PT"/>
           </a:p>
@@ -480,7 +482,7 @@
           <a:p>
             <a:fld id="{A19A71F5-DA94-4BA2-B9E9-1E6B8C3AD471}" type="datetimeFigureOut">
               <a:rPr lang="pt-PT" smtClean="0"/>
-              <a:t>21/11/2020</a:t>
+              <a:t>22/11/2020</a:t>
             </a:fld>
             <a:endParaRPr lang="pt-PT"/>
           </a:p>
@@ -688,7 +690,7 @@
           <a:p>
             <a:fld id="{A19A71F5-DA94-4BA2-B9E9-1E6B8C3AD471}" type="datetimeFigureOut">
               <a:rPr lang="pt-PT" smtClean="0"/>
-              <a:t>21/11/2020</a:t>
+              <a:t>22/11/2020</a:t>
             </a:fld>
             <a:endParaRPr lang="pt-PT"/>
           </a:p>
@@ -886,7 +888,7 @@
           <a:p>
             <a:fld id="{A19A71F5-DA94-4BA2-B9E9-1E6B8C3AD471}" type="datetimeFigureOut">
               <a:rPr lang="pt-PT" smtClean="0"/>
-              <a:t>21/11/2020</a:t>
+              <a:t>22/11/2020</a:t>
             </a:fld>
             <a:endParaRPr lang="pt-PT"/>
           </a:p>
@@ -1161,7 +1163,7 @@
           <a:p>
             <a:fld id="{A19A71F5-DA94-4BA2-B9E9-1E6B8C3AD471}" type="datetimeFigureOut">
               <a:rPr lang="pt-PT" smtClean="0"/>
-              <a:t>21/11/2020</a:t>
+              <a:t>22/11/2020</a:t>
             </a:fld>
             <a:endParaRPr lang="pt-PT"/>
           </a:p>
@@ -1426,7 +1428,7 @@
           <a:p>
             <a:fld id="{A19A71F5-DA94-4BA2-B9E9-1E6B8C3AD471}" type="datetimeFigureOut">
               <a:rPr lang="pt-PT" smtClean="0"/>
-              <a:t>21/11/2020</a:t>
+              <a:t>22/11/2020</a:t>
             </a:fld>
             <a:endParaRPr lang="pt-PT"/>
           </a:p>
@@ -1838,7 +1840,7 @@
           <a:p>
             <a:fld id="{A19A71F5-DA94-4BA2-B9E9-1E6B8C3AD471}" type="datetimeFigureOut">
               <a:rPr lang="pt-PT" smtClean="0"/>
-              <a:t>21/11/2020</a:t>
+              <a:t>22/11/2020</a:t>
             </a:fld>
             <a:endParaRPr lang="pt-PT"/>
           </a:p>
@@ -1979,7 +1981,7 @@
           <a:p>
             <a:fld id="{A19A71F5-DA94-4BA2-B9E9-1E6B8C3AD471}" type="datetimeFigureOut">
               <a:rPr lang="pt-PT" smtClean="0"/>
-              <a:t>21/11/2020</a:t>
+              <a:t>22/11/2020</a:t>
             </a:fld>
             <a:endParaRPr lang="pt-PT"/>
           </a:p>
@@ -2092,7 +2094,7 @@
           <a:p>
             <a:fld id="{A19A71F5-DA94-4BA2-B9E9-1E6B8C3AD471}" type="datetimeFigureOut">
               <a:rPr lang="pt-PT" smtClean="0"/>
-              <a:t>21/11/2020</a:t>
+              <a:t>22/11/2020</a:t>
             </a:fld>
             <a:endParaRPr lang="pt-PT"/>
           </a:p>
@@ -2403,7 +2405,7 @@
           <a:p>
             <a:fld id="{A19A71F5-DA94-4BA2-B9E9-1E6B8C3AD471}" type="datetimeFigureOut">
               <a:rPr lang="pt-PT" smtClean="0"/>
-              <a:t>21/11/2020</a:t>
+              <a:t>22/11/2020</a:t>
             </a:fld>
             <a:endParaRPr lang="pt-PT"/>
           </a:p>
@@ -2691,7 +2693,7 @@
           <a:p>
             <a:fld id="{A19A71F5-DA94-4BA2-B9E9-1E6B8C3AD471}" type="datetimeFigureOut">
               <a:rPr lang="pt-PT" smtClean="0"/>
-              <a:t>21/11/2020</a:t>
+              <a:t>22/11/2020</a:t>
             </a:fld>
             <a:endParaRPr lang="pt-PT"/>
           </a:p>
@@ -2932,7 +2934,7 @@
           <a:p>
             <a:fld id="{A19A71F5-DA94-4BA2-B9E9-1E6B8C3AD471}" type="datetimeFigureOut">
               <a:rPr lang="pt-PT" smtClean="0"/>
-              <a:t>21/11/2020</a:t>
+              <a:t>22/11/2020</a:t>
             </a:fld>
             <a:endParaRPr lang="pt-PT"/>
           </a:p>
@@ -4375,6 +4377,905 @@
 <file path=ppt/slides/slide10.xml><?xml version="1.0" encoding="utf-8"?>
 <p:sld xmlns:a="http://schemas.openxmlformats.org/drawingml/2006/main" xmlns:r="http://schemas.openxmlformats.org/officeDocument/2006/relationships" xmlns:p="http://schemas.openxmlformats.org/presentationml/2006/main">
   <p:cSld>
+    <p:bg>
+      <p:bgPr>
+        <a:solidFill>
+          <a:schemeClr val="bg1"/>
+        </a:solidFill>
+        <a:effectLst/>
+      </p:bgPr>
+    </p:bg>
+    <p:spTree>
+      <p:nvGrpSpPr>
+        <p:cNvPr id="1" name=""/>
+        <p:cNvGrpSpPr/>
+        <p:nvPr/>
+      </p:nvGrpSpPr>
+      <p:grpSpPr>
+        <a:xfrm>
+          <a:off x="0" y="0"/>
+          <a:ext cx="0" cy="0"/>
+          <a:chOff x="0" y="0"/>
+          <a:chExt cx="0" cy="0"/>
+        </a:xfrm>
+      </p:grpSpPr>
+      <p:sp>
+        <p:nvSpPr>
+          <p:cNvPr id="10" name="Rectangle 9">
+            <a:extLst>
+              <a:ext uri="{FF2B5EF4-FFF2-40B4-BE49-F238E27FC236}">
+                <a16:creationId xmlns:a16="http://schemas.microsoft.com/office/drawing/2014/main" id="{35555856-9970-4BC3-9AA9-6A917F53AFBD}"/>
+              </a:ext>
+              <a:ext uri="{C183D7F6-B498-43B3-948B-1728B52AA6E4}">
+                <adec:decorative xmlns:adec="http://schemas.microsoft.com/office/drawing/2017/decorative" val="1"/>
+              </a:ext>
+            </a:extLst>
+          </p:cNvPr>
+          <p:cNvSpPr>
+            <a:spLocks noGrp="1" noRot="1" noChangeAspect="1" noMove="1" noResize="1" noEditPoints="1" noAdjustHandles="1" noChangeArrowheads="1" noChangeShapeType="1" noTextEdit="1"/>
+          </p:cNvSpPr>
+          <p:nvPr>
+            <p:extLst>
+              <p:ext uri="{386F3935-93C4-4BCD-93E2-E3B085C9AB24}">
+                <p16:designElem xmlns:p16="http://schemas.microsoft.com/office/powerpoint/2015/main" val="1"/>
+              </p:ext>
+            </p:extLst>
+          </p:nvPr>
+        </p:nvSpPr>
+        <p:spPr>
+          <a:xfrm flipH="1">
+            <a:off x="0" y="0"/>
+            <a:ext cx="6421721" cy="6858000"/>
+          </a:xfrm>
+          <a:prstGeom prst="rect">
+            <a:avLst/>
+          </a:prstGeom>
+          <a:gradFill>
+            <a:gsLst>
+              <a:gs pos="0">
+                <a:schemeClr val="accent1">
+                  <a:lumMod val="100000"/>
+                  <a:alpha val="82000"/>
+                </a:schemeClr>
+              </a:gs>
+              <a:gs pos="25000">
+                <a:schemeClr val="accent1">
+                  <a:alpha val="60000"/>
+                </a:schemeClr>
+              </a:gs>
+              <a:gs pos="94000">
+                <a:schemeClr val="bg2">
+                  <a:lumMod val="75000"/>
+                </a:schemeClr>
+              </a:gs>
+              <a:gs pos="100000">
+                <a:schemeClr val="bg2">
+                  <a:lumMod val="75000"/>
+                </a:schemeClr>
+              </a:gs>
+            </a:gsLst>
+            <a:lin ang="4200000" scaled="0"/>
+          </a:gradFill>
+          <a:ln>
+            <a:noFill/>
+          </a:ln>
+        </p:spPr>
+        <p:style>
+          <a:lnRef idx="2">
+            <a:schemeClr val="accent1">
+              <a:shade val="50000"/>
+            </a:schemeClr>
+          </a:lnRef>
+          <a:fillRef idx="1">
+            <a:schemeClr val="accent1"/>
+          </a:fillRef>
+          <a:effectRef idx="0">
+            <a:schemeClr val="accent1"/>
+          </a:effectRef>
+          <a:fontRef idx="minor">
+            <a:schemeClr val="lt1"/>
+          </a:fontRef>
+        </p:style>
+        <p:txBody>
+          <a:bodyPr rtlCol="0" anchor="ctr"/>
+          <a:lstStyle/>
+          <a:p>
+            <a:pPr algn="ctr"/>
+            <a:endParaRPr lang="en-US"/>
+          </a:p>
+        </p:txBody>
+      </p:sp>
+      <p:pic>
+        <p:nvPicPr>
+          <p:cNvPr id="12" name="Picture 11">
+            <a:extLst>
+              <a:ext uri="{FF2B5EF4-FFF2-40B4-BE49-F238E27FC236}">
+                <a16:creationId xmlns:a16="http://schemas.microsoft.com/office/drawing/2014/main" id="{7F487851-BFAF-46D8-A1ED-50CAD6E46F59}"/>
+              </a:ext>
+              <a:ext uri="{C183D7F6-B498-43B3-948B-1728B52AA6E4}">
+                <adec:decorative xmlns:adec="http://schemas.microsoft.com/office/drawing/2017/decorative" val="1"/>
+              </a:ext>
+            </a:extLst>
+          </p:cNvPr>
+          <p:cNvPicPr>
+            <a:picLocks noGrp="1" noRot="1" noChangeAspect="1" noMove="1" noResize="1" noEditPoints="1" noAdjustHandles="1" noChangeArrowheads="1" noChangeShapeType="1" noCrop="1"/>
+          </p:cNvPicPr>
+          <p:nvPr>
+            <p:extLst>
+              <p:ext uri="{386F3935-93C4-4BCD-93E2-E3B085C9AB24}">
+                <p16:designElem xmlns:p16="http://schemas.microsoft.com/office/powerpoint/2015/main" val="1"/>
+              </p:ext>
+            </p:extLst>
+          </p:nvPr>
+        </p:nvPicPr>
+        <p:blipFill>
+          <a:blip r:embed="rId2">
+            <a:extLst>
+              <a:ext uri="{28A0092B-C50C-407E-A947-70E740481C1C}">
+                <a14:useLocalDpi xmlns:a14="http://schemas.microsoft.com/office/drawing/2010/main" val="0"/>
+              </a:ext>
+            </a:extLst>
+          </a:blip>
+          <a:stretch>
+            <a:fillRect/>
+          </a:stretch>
+        </p:blipFill>
+        <p:spPr>
+          <a:xfrm>
+            <a:off x="0" y="0"/>
+            <a:ext cx="12192000" cy="6858000"/>
+          </a:xfrm>
+          <a:prstGeom prst="rect">
+            <a:avLst/>
+          </a:prstGeom>
+        </p:spPr>
+      </p:pic>
+      <p:sp>
+        <p:nvSpPr>
+          <p:cNvPr id="2" name="Título 1">
+            <a:extLst>
+              <a:ext uri="{FF2B5EF4-FFF2-40B4-BE49-F238E27FC236}">
+                <a16:creationId xmlns:a16="http://schemas.microsoft.com/office/drawing/2014/main" id="{D8FD4CB8-FBEF-418C-9210-810F790F7904}"/>
+              </a:ext>
+            </a:extLst>
+          </p:cNvPr>
+          <p:cNvSpPr>
+            <a:spLocks noGrp="1"/>
+          </p:cNvSpPr>
+          <p:nvPr>
+            <p:ph type="title"/>
+          </p:nvPr>
+        </p:nvSpPr>
+        <p:spPr>
+          <a:xfrm>
+            <a:off x="6590662" y="4267832"/>
+            <a:ext cx="4805996" cy="1297115"/>
+          </a:xfrm>
+        </p:spPr>
+        <p:txBody>
+          <a:bodyPr vert="horz" lIns="91440" tIns="45720" rIns="91440" bIns="45720" rtlCol="0" anchor="t">
+            <a:noAutofit/>
+          </a:bodyPr>
+          <a:lstStyle/>
+          <a:p>
+            <a:r>
+              <a:rPr lang="en-US" kern="1200" dirty="0">
+                <a:solidFill>
+                  <a:srgbClr val="000000"/>
+                </a:solidFill>
+                <a:effectLst>
+                  <a:outerShdw blurRad="38100" dist="38100" dir="2700000" algn="tl">
+                    <a:srgbClr val="000000">
+                      <a:alpha val="43137"/>
+                    </a:srgbClr>
+                  </a:outerShdw>
+                </a:effectLst>
+                <a:latin typeface="+mj-lt"/>
+                <a:ea typeface="+mj-ea"/>
+                <a:cs typeface="+mj-cs"/>
+              </a:rPr>
+              <a:t>Funcionalidade Destacada</a:t>
+            </a:r>
+          </a:p>
+        </p:txBody>
+      </p:sp>
+      <p:sp>
+        <p:nvSpPr>
+          <p:cNvPr id="14" name="Freeform 50">
+            <a:extLst>
+              <a:ext uri="{FF2B5EF4-FFF2-40B4-BE49-F238E27FC236}">
+                <a16:creationId xmlns:a16="http://schemas.microsoft.com/office/drawing/2014/main" id="{13722DD7-BA73-4776-93A3-94491FEF7260}"/>
+              </a:ext>
+              <a:ext uri="{C183D7F6-B498-43B3-948B-1728B52AA6E4}">
+                <adec:decorative xmlns:adec="http://schemas.microsoft.com/office/drawing/2017/decorative" val="1"/>
+              </a:ext>
+            </a:extLst>
+          </p:cNvPr>
+          <p:cNvSpPr>
+            <a:spLocks noGrp="1" noRot="1" noChangeAspect="1" noMove="1" noResize="1" noEditPoints="1" noAdjustHandles="1" noChangeArrowheads="1" noChangeShapeType="1" noTextEdit="1"/>
+          </p:cNvSpPr>
+          <p:nvPr>
+            <p:extLst>
+              <p:ext uri="{386F3935-93C4-4BCD-93E2-E3B085C9AB24}">
+                <p16:designElem xmlns:p16="http://schemas.microsoft.com/office/powerpoint/2015/main" val="1"/>
+              </p:ext>
+            </p:extLst>
+          </p:nvPr>
+        </p:nvSpPr>
+        <p:spPr>
+          <a:xfrm flipH="1">
+            <a:off x="0" y="581159"/>
+            <a:ext cx="5464879" cy="6276841"/>
+          </a:xfrm>
+          <a:custGeom>
+            <a:avLst/>
+            <a:gdLst>
+              <a:gd name="connsiteX0" fmla="*/ 3299930 w 5464879"/>
+              <a:gd name="connsiteY0" fmla="*/ 0 h 6276841"/>
+              <a:gd name="connsiteX1" fmla="*/ 5398992 w 5464879"/>
+              <a:gd name="connsiteY1" fmla="*/ 753544 h 6276841"/>
+              <a:gd name="connsiteX2" fmla="*/ 5464879 w 5464879"/>
+              <a:gd name="connsiteY2" fmla="*/ 813426 h 6276841"/>
+              <a:gd name="connsiteX3" fmla="*/ 5464879 w 5464879"/>
+              <a:gd name="connsiteY3" fmla="*/ 5786434 h 6276841"/>
+              <a:gd name="connsiteX4" fmla="*/ 5398992 w 5464879"/>
+              <a:gd name="connsiteY4" fmla="*/ 5846317 h 6276841"/>
+              <a:gd name="connsiteX5" fmla="*/ 4872873 w 5464879"/>
+              <a:gd name="connsiteY5" fmla="*/ 6201577 h 6276841"/>
+              <a:gd name="connsiteX6" fmla="*/ 4716632 w 5464879"/>
+              <a:gd name="connsiteY6" fmla="*/ 6276841 h 6276841"/>
+              <a:gd name="connsiteX7" fmla="*/ 1883227 w 5464879"/>
+              <a:gd name="connsiteY7" fmla="*/ 6276841 h 6276841"/>
+              <a:gd name="connsiteX8" fmla="*/ 1726987 w 5464879"/>
+              <a:gd name="connsiteY8" fmla="*/ 6201577 h 6276841"/>
+              <a:gd name="connsiteX9" fmla="*/ 0 w 5464879"/>
+              <a:gd name="connsiteY9" fmla="*/ 3299930 h 6276841"/>
+              <a:gd name="connsiteX10" fmla="*/ 3299930 w 5464879"/>
+              <a:gd name="connsiteY10" fmla="*/ 0 h 6276841"/>
+            </a:gdLst>
+            <a:ahLst/>
+            <a:cxnLst>
+              <a:cxn ang="0">
+                <a:pos x="connsiteX0" y="connsiteY0"/>
+              </a:cxn>
+              <a:cxn ang="0">
+                <a:pos x="connsiteX1" y="connsiteY1"/>
+              </a:cxn>
+              <a:cxn ang="0">
+                <a:pos x="connsiteX2" y="connsiteY2"/>
+              </a:cxn>
+              <a:cxn ang="0">
+                <a:pos x="connsiteX3" y="connsiteY3"/>
+              </a:cxn>
+              <a:cxn ang="0">
+                <a:pos x="connsiteX4" y="connsiteY4"/>
+              </a:cxn>
+              <a:cxn ang="0">
+                <a:pos x="connsiteX5" y="connsiteY5"/>
+              </a:cxn>
+              <a:cxn ang="0">
+                <a:pos x="connsiteX6" y="connsiteY6"/>
+              </a:cxn>
+              <a:cxn ang="0">
+                <a:pos x="connsiteX7" y="connsiteY7"/>
+              </a:cxn>
+              <a:cxn ang="0">
+                <a:pos x="connsiteX8" y="connsiteY8"/>
+              </a:cxn>
+              <a:cxn ang="0">
+                <a:pos x="connsiteX9" y="connsiteY9"/>
+              </a:cxn>
+              <a:cxn ang="0">
+                <a:pos x="connsiteX10" y="connsiteY10"/>
+              </a:cxn>
+            </a:cxnLst>
+            <a:rect l="l" t="t" r="r" b="b"/>
+            <a:pathLst>
+              <a:path w="5464879" h="6276841">
+                <a:moveTo>
+                  <a:pt x="3299930" y="0"/>
+                </a:moveTo>
+                <a:cubicBezTo>
+                  <a:pt x="4097274" y="0"/>
+                  <a:pt x="4828569" y="282789"/>
+                  <a:pt x="5398992" y="753544"/>
+                </a:cubicBezTo>
+                <a:lnTo>
+                  <a:pt x="5464879" y="813426"/>
+                </a:lnTo>
+                <a:lnTo>
+                  <a:pt x="5464879" y="5786434"/>
+                </a:lnTo>
+                <a:lnTo>
+                  <a:pt x="5398992" y="5846317"/>
+                </a:lnTo>
+                <a:cubicBezTo>
+                  <a:pt x="5236014" y="5980818"/>
+                  <a:pt x="5059904" y="6099975"/>
+                  <a:pt x="4872873" y="6201577"/>
+                </a:cubicBezTo>
+                <a:lnTo>
+                  <a:pt x="4716632" y="6276841"/>
+                </a:lnTo>
+                <a:lnTo>
+                  <a:pt x="1883227" y="6276841"/>
+                </a:lnTo>
+                <a:lnTo>
+                  <a:pt x="1726987" y="6201577"/>
+                </a:lnTo>
+                <a:cubicBezTo>
+                  <a:pt x="698316" y="5642769"/>
+                  <a:pt x="0" y="4552900"/>
+                  <a:pt x="0" y="3299930"/>
+                </a:cubicBezTo>
+                <a:cubicBezTo>
+                  <a:pt x="0" y="1477429"/>
+                  <a:pt x="1477429" y="0"/>
+                  <a:pt x="3299930" y="0"/>
+                </a:cubicBezTo>
+                <a:close/>
+              </a:path>
+            </a:pathLst>
+          </a:custGeom>
+          <a:solidFill>
+            <a:srgbClr val="FFFFFF"/>
+          </a:solidFill>
+          <a:ln>
+            <a:gradFill>
+              <a:gsLst>
+                <a:gs pos="0">
+                  <a:schemeClr val="accent1">
+                    <a:lumMod val="40000"/>
+                    <a:lumOff val="60000"/>
+                  </a:schemeClr>
+                </a:gs>
+                <a:gs pos="23000">
+                  <a:schemeClr val="accent1">
+                    <a:lumMod val="45000"/>
+                    <a:lumOff val="55000"/>
+                  </a:schemeClr>
+                </a:gs>
+                <a:gs pos="83000">
+                  <a:schemeClr val="bg2">
+                    <a:lumMod val="75000"/>
+                  </a:schemeClr>
+                </a:gs>
+                <a:gs pos="100000">
+                  <a:schemeClr val="bg2">
+                    <a:lumMod val="75000"/>
+                  </a:schemeClr>
+                </a:gs>
+              </a:gsLst>
+              <a:lin ang="5400000" scaled="1"/>
+            </a:gradFill>
+          </a:ln>
+        </p:spPr>
+        <p:style>
+          <a:lnRef idx="2">
+            <a:schemeClr val="accent1">
+              <a:shade val="50000"/>
+            </a:schemeClr>
+          </a:lnRef>
+          <a:fillRef idx="1">
+            <a:schemeClr val="accent1"/>
+          </a:fillRef>
+          <a:effectRef idx="0">
+            <a:schemeClr val="accent1"/>
+          </a:effectRef>
+          <a:fontRef idx="minor">
+            <a:schemeClr val="lt1"/>
+          </a:fontRef>
+        </p:style>
+        <p:txBody>
+          <a:bodyPr wrap="square" rtlCol="0" anchor="ctr">
+            <a:noAutofit/>
+          </a:bodyPr>
+          <a:lstStyle/>
+          <a:p>
+            <a:pPr algn="ctr"/>
+            <a:endParaRPr lang="en-US"/>
+          </a:p>
+        </p:txBody>
+      </p:sp>
+      <p:pic>
+        <p:nvPicPr>
+          <p:cNvPr id="7" name="Graphic 6" descr="Marca de Verificação">
+            <a:extLst>
+              <a:ext uri="{FF2B5EF4-FFF2-40B4-BE49-F238E27FC236}">
+                <a16:creationId xmlns:a16="http://schemas.microsoft.com/office/drawing/2014/main" id="{99BC7C11-7C74-4B78-A8F9-AA7E45740460}"/>
+              </a:ext>
+            </a:extLst>
+          </p:cNvPr>
+          <p:cNvPicPr>
+            <a:picLocks noChangeAspect="1"/>
+          </p:cNvPicPr>
+          <p:nvPr/>
+        </p:nvPicPr>
+        <p:blipFill>
+          <a:blip r:embed="rId3">
+            <a:extLst>
+              <a:ext uri="{28A0092B-C50C-407E-A947-70E740481C1C}">
+                <a14:useLocalDpi xmlns:a14="http://schemas.microsoft.com/office/drawing/2010/main" val="0"/>
+              </a:ext>
+              <a:ext uri="{96DAC541-7B7A-43D3-8B79-37D633B846F1}">
+                <asvg:svgBlip xmlns:asvg="http://schemas.microsoft.com/office/drawing/2016/SVG/main" r:embed="rId4"/>
+              </a:ext>
+            </a:extLst>
+          </a:blip>
+          <a:stretch>
+            <a:fillRect/>
+          </a:stretch>
+        </p:blipFill>
+        <p:spPr>
+          <a:xfrm>
+            <a:off x="9451128" y="4806957"/>
+            <a:ext cx="1044152" cy="1044152"/>
+          </a:xfrm>
+          <a:custGeom>
+            <a:avLst/>
+            <a:gdLst/>
+            <a:ahLst/>
+            <a:cxnLst/>
+            <a:rect l="l" t="t" r="r" b="b"/>
+            <a:pathLst>
+              <a:path w="4141760" h="4377846">
+                <a:moveTo>
+                  <a:pt x="0" y="0"/>
+                </a:moveTo>
+                <a:lnTo>
+                  <a:pt x="4141760" y="0"/>
+                </a:lnTo>
+                <a:lnTo>
+                  <a:pt x="4141760" y="4377846"/>
+                </a:lnTo>
+                <a:lnTo>
+                  <a:pt x="0" y="4377846"/>
+                </a:lnTo>
+                <a:close/>
+              </a:path>
+            </a:pathLst>
+          </a:custGeom>
+        </p:spPr>
+      </p:pic>
+    </p:spTree>
+    <p:extLst>
+      <p:ext uri="{BB962C8B-B14F-4D97-AF65-F5344CB8AC3E}">
+        <p14:creationId xmlns:p14="http://schemas.microsoft.com/office/powerpoint/2010/main" val="1346403632"/>
+      </p:ext>
+    </p:extLst>
+  </p:cSld>
+  <p:clrMapOvr>
+    <a:masterClrMapping/>
+  </p:clrMapOvr>
+</p:sld>
+</file>
+
+<file path=ppt/slides/slide11.xml><?xml version="1.0" encoding="utf-8"?>
+<p:sld xmlns:a="http://schemas.openxmlformats.org/drawingml/2006/main" xmlns:r="http://schemas.openxmlformats.org/officeDocument/2006/relationships" xmlns:p="http://schemas.openxmlformats.org/presentationml/2006/main">
+  <p:cSld>
+    <p:bg>
+      <p:bgPr>
+        <a:solidFill>
+          <a:schemeClr val="bg1"/>
+        </a:solidFill>
+        <a:effectLst/>
+      </p:bgPr>
+    </p:bg>
+    <p:spTree>
+      <p:nvGrpSpPr>
+        <p:cNvPr id="1" name=""/>
+        <p:cNvGrpSpPr/>
+        <p:nvPr/>
+      </p:nvGrpSpPr>
+      <p:grpSpPr>
+        <a:xfrm>
+          <a:off x="0" y="0"/>
+          <a:ext cx="0" cy="0"/>
+          <a:chOff x="0" y="0"/>
+          <a:chExt cx="0" cy="0"/>
+        </a:xfrm>
+      </p:grpSpPr>
+      <p:sp>
+        <p:nvSpPr>
+          <p:cNvPr id="19" name="Rectangle 18">
+            <a:extLst>
+              <a:ext uri="{FF2B5EF4-FFF2-40B4-BE49-F238E27FC236}">
+                <a16:creationId xmlns:a16="http://schemas.microsoft.com/office/drawing/2014/main" id="{B775CD93-9DF2-48CB-9F57-1BCA9A46C7FA}"/>
+              </a:ext>
+              <a:ext uri="{C183D7F6-B498-43B3-948B-1728B52AA6E4}">
+                <adec:decorative xmlns:adec="http://schemas.microsoft.com/office/drawing/2017/decorative" val="1"/>
+              </a:ext>
+            </a:extLst>
+          </p:cNvPr>
+          <p:cNvSpPr>
+            <a:spLocks noGrp="1" noRot="1" noChangeAspect="1" noMove="1" noResize="1" noEditPoints="1" noAdjustHandles="1" noChangeArrowheads="1" noChangeShapeType="1" noTextEdit="1"/>
+          </p:cNvSpPr>
+          <p:nvPr>
+            <p:extLst>
+              <p:ext uri="{386F3935-93C4-4BCD-93E2-E3B085C9AB24}">
+                <p16:designElem xmlns:p16="http://schemas.microsoft.com/office/powerpoint/2015/main" val="1"/>
+              </p:ext>
+            </p:extLst>
+          </p:nvPr>
+        </p:nvSpPr>
+        <p:spPr>
+          <a:xfrm>
+            <a:off x="466344" y="448055"/>
+            <a:ext cx="3414370" cy="3801257"/>
+          </a:xfrm>
+          <a:prstGeom prst="rect">
+            <a:avLst/>
+          </a:prstGeom>
+          <a:solidFill>
+            <a:srgbClr val="595959"/>
+          </a:solidFill>
+          <a:ln w="25400">
+            <a:noFill/>
+          </a:ln>
+        </p:spPr>
+        <p:style>
+          <a:lnRef idx="2">
+            <a:schemeClr val="accent1">
+              <a:shade val="50000"/>
+            </a:schemeClr>
+          </a:lnRef>
+          <a:fillRef idx="1">
+            <a:schemeClr val="accent1"/>
+          </a:fillRef>
+          <a:effectRef idx="0">
+            <a:schemeClr val="accent1"/>
+          </a:effectRef>
+          <a:fontRef idx="minor">
+            <a:schemeClr val="lt1"/>
+          </a:fontRef>
+        </p:style>
+        <p:txBody>
+          <a:bodyPr rtlCol="0" anchor="ctr"/>
+          <a:lstStyle/>
+          <a:p>
+            <a:pPr algn="ctr"/>
+            <a:endParaRPr lang="en-US">
+              <a:solidFill>
+                <a:srgbClr val="FFFFFF"/>
+              </a:solidFill>
+            </a:endParaRPr>
+          </a:p>
+        </p:txBody>
+      </p:sp>
+      <p:sp>
+        <p:nvSpPr>
+          <p:cNvPr id="2" name="Título 1">
+            <a:extLst>
+              <a:ext uri="{FF2B5EF4-FFF2-40B4-BE49-F238E27FC236}">
+                <a16:creationId xmlns:a16="http://schemas.microsoft.com/office/drawing/2014/main" id="{EC0C3B75-B8C8-48E2-A537-EF03E63BB6F6}"/>
+              </a:ext>
+            </a:extLst>
+          </p:cNvPr>
+          <p:cNvSpPr>
+            <a:spLocks noGrp="1"/>
+          </p:cNvSpPr>
+          <p:nvPr>
+            <p:ph type="title"/>
+          </p:nvPr>
+        </p:nvSpPr>
+        <p:spPr>
+          <a:xfrm>
+            <a:off x="777240" y="731519"/>
+            <a:ext cx="2845191" cy="3237579"/>
+          </a:xfrm>
+        </p:spPr>
+        <p:txBody>
+          <a:bodyPr>
+            <a:normAutofit/>
+          </a:bodyPr>
+          <a:lstStyle/>
+          <a:p>
+            <a:r>
+              <a:rPr lang="pt-PT" sz="3800">
+                <a:solidFill>
+                  <a:srgbClr val="FFFFFF"/>
+                </a:solidFill>
+                <a:effectLst>
+                  <a:outerShdw blurRad="38100" dist="38100" dir="2700000" algn="tl">
+                    <a:srgbClr val="000000">
+                      <a:alpha val="43137"/>
+                    </a:srgbClr>
+                  </a:outerShdw>
+                </a:effectLst>
+              </a:rPr>
+              <a:t>Principais dificuldades e esforço individual</a:t>
+            </a:r>
+          </a:p>
+        </p:txBody>
+      </p:sp>
+      <p:sp>
+        <p:nvSpPr>
+          <p:cNvPr id="21" name="Rectangle 20">
+            <a:extLst>
+              <a:ext uri="{FF2B5EF4-FFF2-40B4-BE49-F238E27FC236}">
+                <a16:creationId xmlns:a16="http://schemas.microsoft.com/office/drawing/2014/main" id="{6166C6D1-23AC-49C4-BA07-238E4E9F8CEB}"/>
+              </a:ext>
+              <a:ext uri="{C183D7F6-B498-43B3-948B-1728B52AA6E4}">
+                <adec:decorative xmlns:adec="http://schemas.microsoft.com/office/drawing/2017/decorative" val="1"/>
+              </a:ext>
+            </a:extLst>
+          </p:cNvPr>
+          <p:cNvSpPr>
+            <a:spLocks noGrp="1" noRot="1" noChangeAspect="1" noMove="1" noResize="1" noEditPoints="1" noAdjustHandles="1" noChangeArrowheads="1" noChangeShapeType="1" noTextEdit="1"/>
+          </p:cNvSpPr>
+          <p:nvPr>
+            <p:extLst>
+              <p:ext uri="{386F3935-93C4-4BCD-93E2-E3B085C9AB24}">
+                <p16:designElem xmlns:p16="http://schemas.microsoft.com/office/powerpoint/2015/main" val="1"/>
+              </p:ext>
+            </p:extLst>
+          </p:nvPr>
+        </p:nvSpPr>
+        <p:spPr>
+          <a:xfrm>
+            <a:off x="466343" y="4419227"/>
+            <a:ext cx="3414369" cy="1979852"/>
+          </a:xfrm>
+          <a:prstGeom prst="rect">
+            <a:avLst/>
+          </a:prstGeom>
+          <a:solidFill>
+            <a:schemeClr val="accent1">
+              <a:alpha val="95000"/>
+            </a:schemeClr>
+          </a:solidFill>
+          <a:ln w="25400">
+            <a:noFill/>
+          </a:ln>
+        </p:spPr>
+        <p:style>
+          <a:lnRef idx="2">
+            <a:schemeClr val="accent1">
+              <a:shade val="50000"/>
+            </a:schemeClr>
+          </a:lnRef>
+          <a:fillRef idx="1">
+            <a:schemeClr val="accent1"/>
+          </a:fillRef>
+          <a:effectRef idx="0">
+            <a:schemeClr val="accent1"/>
+          </a:effectRef>
+          <a:fontRef idx="minor">
+            <a:schemeClr val="lt1"/>
+          </a:fontRef>
+        </p:style>
+        <p:txBody>
+          <a:bodyPr rtlCol="0" anchor="ctr"/>
+          <a:lstStyle/>
+          <a:p>
+            <a:pPr algn="ctr"/>
+            <a:endParaRPr lang="en-US" dirty="0">
+              <a:solidFill>
+                <a:srgbClr val="FFFFFF"/>
+              </a:solidFill>
+            </a:endParaRPr>
+          </a:p>
+        </p:txBody>
+      </p:sp>
+      <p:sp>
+        <p:nvSpPr>
+          <p:cNvPr id="23" name="Rectangle 22">
+            <a:extLst>
+              <a:ext uri="{FF2B5EF4-FFF2-40B4-BE49-F238E27FC236}">
+                <a16:creationId xmlns:a16="http://schemas.microsoft.com/office/drawing/2014/main" id="{1C091803-41C2-48E0-9228-5148460C7479}"/>
+              </a:ext>
+              <a:ext uri="{C183D7F6-B498-43B3-948B-1728B52AA6E4}">
+                <adec:decorative xmlns:adec="http://schemas.microsoft.com/office/drawing/2017/decorative" val="1"/>
+              </a:ext>
+            </a:extLst>
+          </p:cNvPr>
+          <p:cNvSpPr>
+            <a:spLocks noGrp="1" noRot="1" noChangeAspect="1" noMove="1" noResize="1" noEditPoints="1" noAdjustHandles="1" noChangeArrowheads="1" noChangeShapeType="1" noTextEdit="1"/>
+          </p:cNvSpPr>
+          <p:nvPr>
+            <p:extLst>
+              <p:ext uri="{386F3935-93C4-4BCD-93E2-E3B085C9AB24}">
+                <p16:designElem xmlns:p16="http://schemas.microsoft.com/office/powerpoint/2015/main" val="1"/>
+              </p:ext>
+            </p:extLst>
+          </p:nvPr>
+        </p:nvSpPr>
+        <p:spPr>
+          <a:xfrm>
+            <a:off x="4044603" y="448055"/>
+            <a:ext cx="7688475" cy="5952745"/>
+          </a:xfrm>
+          <a:prstGeom prst="rect">
+            <a:avLst/>
+          </a:prstGeom>
+          <a:solidFill>
+            <a:schemeClr val="tx1">
+              <a:lumMod val="50000"/>
+              <a:lumOff val="50000"/>
+              <a:alpha val="20000"/>
+            </a:schemeClr>
+          </a:solidFill>
+          <a:ln>
+            <a:noFill/>
+          </a:ln>
+        </p:spPr>
+        <p:style>
+          <a:lnRef idx="2">
+            <a:schemeClr val="accent1">
+              <a:shade val="50000"/>
+            </a:schemeClr>
+          </a:lnRef>
+          <a:fillRef idx="1">
+            <a:schemeClr val="accent1"/>
+          </a:fillRef>
+          <a:effectRef idx="0">
+            <a:schemeClr val="accent1"/>
+          </a:effectRef>
+          <a:fontRef idx="minor">
+            <a:schemeClr val="lt1"/>
+          </a:fontRef>
+        </p:style>
+        <p:txBody>
+          <a:bodyPr rtlCol="0" anchor="ctr"/>
+          <a:lstStyle/>
+          <a:p>
+            <a:pPr algn="ctr"/>
+            <a:endParaRPr lang="en-US"/>
+          </a:p>
+        </p:txBody>
+      </p:sp>
+      <p:sp>
+        <p:nvSpPr>
+          <p:cNvPr id="3" name="Marcador de Posição de Conteúdo 2">
+            <a:extLst>
+              <a:ext uri="{FF2B5EF4-FFF2-40B4-BE49-F238E27FC236}">
+                <a16:creationId xmlns:a16="http://schemas.microsoft.com/office/drawing/2014/main" id="{EAB80583-B529-422A-8C95-53B5990AAB96}"/>
+              </a:ext>
+            </a:extLst>
+          </p:cNvPr>
+          <p:cNvSpPr>
+            <a:spLocks noGrp="1"/>
+          </p:cNvSpPr>
+          <p:nvPr>
+            <p:ph idx="1"/>
+          </p:nvPr>
+        </p:nvSpPr>
+        <p:spPr>
+          <a:xfrm>
+            <a:off x="4379709" y="686862"/>
+            <a:ext cx="7037591" cy="5475129"/>
+          </a:xfrm>
+        </p:spPr>
+        <p:txBody>
+          <a:bodyPr anchor="ctr">
+            <a:normAutofit/>
+          </a:bodyPr>
+          <a:lstStyle/>
+          <a:p>
+            <a:r>
+              <a:rPr lang="pt-PT" sz="2000"/>
+              <a:t>Principais dificuldades</a:t>
+            </a:r>
+          </a:p>
+          <a:p>
+            <a:pPr lvl="1"/>
+            <a:r>
+              <a:rPr lang="pt-PT" sz="2000"/>
+              <a:t>Decompor o problema proposto nas melhores e mais eficientes estruturas de dados;</a:t>
+            </a:r>
+          </a:p>
+          <a:p>
+            <a:pPr lvl="1"/>
+            <a:r>
+              <a:rPr lang="pt-PT" sz="2000"/>
+              <a:t>Trabalhar com um número elevado de </a:t>
+            </a:r>
+            <a:r>
+              <a:rPr lang="pt-PT" sz="2000" i="1"/>
+              <a:t>pointers;</a:t>
+            </a:r>
+          </a:p>
+          <a:p>
+            <a:pPr lvl="1"/>
+            <a:r>
+              <a:rPr lang="pt-PT" sz="2000"/>
+              <a:t>Criação de um programa com fluxo dinâmico e interativo, não permitindo, contudo, maus </a:t>
+            </a:r>
+            <a:r>
+              <a:rPr lang="pt-PT" sz="2000" i="1"/>
+              <a:t>inputs</a:t>
+            </a:r>
+            <a:r>
+              <a:rPr lang="pt-PT" sz="2000"/>
+              <a:t> do utilizador;</a:t>
+            </a:r>
+          </a:p>
+          <a:p>
+            <a:pPr lvl="1"/>
+            <a:r>
+              <a:rPr lang="pt-PT" sz="2000"/>
+              <a:t>O desenvolvimento do melhor padrão possível para guardar e importar os respetivos dados em ficheiros;</a:t>
+            </a:r>
+          </a:p>
+          <a:p>
+            <a:pPr lvl="1"/>
+            <a:r>
+              <a:rPr lang="pt-PT" sz="2000"/>
+              <a:t>Criação de material de teste detalhado, com a utilização dos google </a:t>
+            </a:r>
+            <a:r>
+              <a:rPr lang="pt-PT" sz="2000" i="1"/>
+              <a:t>tests</a:t>
+            </a:r>
+            <a:r>
+              <a:rPr lang="pt-PT" sz="2000"/>
+              <a:t>;</a:t>
+            </a:r>
+          </a:p>
+          <a:p>
+            <a:pPr lvl="1"/>
+            <a:r>
+              <a:rPr lang="pt-PT" sz="2000"/>
+              <a:t>Obtenção de um programa </a:t>
+            </a:r>
+            <a:r>
+              <a:rPr lang="pt-PT" sz="2000" i="1"/>
+              <a:t>user</a:t>
+            </a:r>
+            <a:r>
+              <a:rPr lang="pt-PT" sz="2000"/>
+              <a:t> </a:t>
+            </a:r>
+            <a:r>
+              <a:rPr lang="pt-PT" sz="2000" i="1"/>
+              <a:t>friendly</a:t>
+            </a:r>
+            <a:r>
+              <a:rPr lang="pt-PT" sz="2000"/>
+              <a:t>.</a:t>
+            </a:r>
+          </a:p>
+          <a:p>
+            <a:endParaRPr lang="pt-PT" sz="2000"/>
+          </a:p>
+          <a:p>
+            <a:r>
+              <a:rPr lang="pt-PT" sz="2000"/>
+              <a:t>Participação de cada elemento:</a:t>
+            </a:r>
+          </a:p>
+          <a:p>
+            <a:pPr lvl="1"/>
+            <a:r>
+              <a:rPr lang="pt-PT" sz="2000"/>
+              <a:t>Lucas Santos: 50%</a:t>
+            </a:r>
+          </a:p>
+          <a:p>
+            <a:pPr lvl="1"/>
+            <a:r>
+              <a:rPr lang="pt-PT" sz="2000"/>
+              <a:t>Sérgio da Gama: 50%</a:t>
+            </a:r>
+          </a:p>
+        </p:txBody>
+      </p:sp>
+    </p:spTree>
+    <p:extLst>
+      <p:ext uri="{BB962C8B-B14F-4D97-AF65-F5344CB8AC3E}">
+        <p14:creationId xmlns:p14="http://schemas.microsoft.com/office/powerpoint/2010/main" val="3430535733"/>
+      </p:ext>
+    </p:extLst>
+  </p:cSld>
+  <p:clrMapOvr>
+    <a:masterClrMapping/>
+  </p:clrMapOvr>
+</p:sld>
+</file>
+
+<file path=ppt/slides/slide12.xml><?xml version="1.0" encoding="utf-8"?>
+<p:sld xmlns:a="http://schemas.openxmlformats.org/drawingml/2006/main" xmlns:r="http://schemas.openxmlformats.org/officeDocument/2006/relationships" xmlns:p="http://schemas.openxmlformats.org/presentationml/2006/main">
+  <p:cSld>
     <p:spTree>
       <p:nvGrpSpPr>
         <p:cNvPr id="1" name=""/>
@@ -4809,7 +5710,7 @@
         <p:spPr>
           <a:xfrm>
             <a:off x="1114371" y="1259916"/>
-            <a:ext cx="2696474" cy="2062103"/>
+            <a:ext cx="2696474" cy="1815882"/>
           </a:xfrm>
           <a:prstGeom prst="rect">
             <a:avLst/>
@@ -4831,35 +5732,21 @@
             <a:endParaRPr lang="pt-PT" sz="1600" dirty="0"/>
           </a:p>
           <a:p>
-            <a:pPr marL="342900" indent="-342900" algn="just">
-              <a:buFont typeface="+mj-lt"/>
-              <a:buAutoNum type="arabicPeriod"/>
-            </a:pPr>
+            <a:pPr algn="just"/>
             <a:r>
               <a:rPr lang="pt-PT" sz="1600" dirty="0"/>
-              <a:t>Menu da StreamZ </a:t>
-            </a:r>
-            <a:r>
-              <a:rPr lang="pt-PT" sz="1600" dirty="0" err="1"/>
-              <a:t>framework</a:t>
-            </a:r>
-            <a:endParaRPr lang="pt-PT" sz="1600" dirty="0"/>
-          </a:p>
-          <a:p>
-            <a:pPr marL="342900" indent="-342900" algn="just">
-              <a:buFont typeface="+mj-lt"/>
-              <a:buAutoNum type="arabicPeriod"/>
-            </a:pPr>
+              <a:t>Menu da StreamZ framework</a:t>
+            </a:r>
+          </a:p>
+          <a:p>
+            <a:pPr algn="just"/>
             <a:r>
               <a:rPr lang="pt-PT" sz="1600" dirty="0"/>
               <a:t>Menu das definições</a:t>
             </a:r>
           </a:p>
           <a:p>
-            <a:pPr marL="342900" indent="-342900" algn="just">
-              <a:buFont typeface="+mj-lt"/>
-              <a:buAutoNum type="arabicPeriod"/>
-            </a:pPr>
+            <a:pPr algn="just"/>
             <a:r>
               <a:rPr lang="pt-PT" sz="1600" dirty="0"/>
               <a:t>Menu de </a:t>
@@ -4870,10 +5757,7 @@
             </a:r>
           </a:p>
           <a:p>
-            <a:pPr marL="342900" indent="-342900" algn="just">
-              <a:buFont typeface="+mj-lt"/>
-              <a:buAutoNum type="arabicPeriod"/>
-            </a:pPr>
+            <a:pPr algn="just"/>
             <a:r>
               <a:rPr lang="pt-PT" sz="1600" dirty="0"/>
               <a:t>Opção de </a:t>
@@ -4885,10 +5769,7 @@
             <a:endParaRPr lang="pt-PT" sz="1600" i="1" dirty="0"/>
           </a:p>
           <a:p>
-            <a:pPr marL="342900" indent="-342900" algn="just">
-              <a:buFont typeface="+mj-lt"/>
-              <a:buAutoNum type="arabicPeriod"/>
-            </a:pPr>
+            <a:pPr algn="just"/>
             <a:r>
               <a:rPr lang="pt-PT" sz="1600" dirty="0"/>
               <a:t>Opção de </a:t>
@@ -5077,10 +5958,10 @@
         </p:nvGrpSpPr>
         <p:grpSpPr>
           <a:xfrm>
-            <a:off x="6539466" y="3165517"/>
-            <a:ext cx="413075" cy="369332"/>
-            <a:chOff x="4694620" y="1013137"/>
-            <a:chExt cx="413075" cy="369332"/>
+            <a:off x="6539466" y="3157149"/>
+            <a:ext cx="413075" cy="377700"/>
+            <a:chOff x="4694620" y="1004769"/>
+            <a:chExt cx="413075" cy="377700"/>
           </a:xfrm>
         </p:grpSpPr>
         <p:sp>
@@ -5151,7 +6032,7 @@
           </p:nvSpPr>
           <p:spPr>
             <a:xfrm>
-              <a:off x="4748094" y="1013137"/>
+              <a:off x="4753482" y="1004769"/>
               <a:ext cx="274523" cy="369332"/>
             </a:xfrm>
             <a:prstGeom prst="rect">
@@ -5191,10 +6072,10 @@
         </p:nvGrpSpPr>
         <p:grpSpPr>
           <a:xfrm>
-            <a:off x="9401395" y="2841963"/>
-            <a:ext cx="413075" cy="369332"/>
-            <a:chOff x="4694620" y="1013137"/>
-            <a:chExt cx="413075" cy="369332"/>
+            <a:off x="9401395" y="2839828"/>
+            <a:ext cx="413075" cy="371467"/>
+            <a:chOff x="4694620" y="1011002"/>
+            <a:chExt cx="413075" cy="371467"/>
           </a:xfrm>
         </p:grpSpPr>
         <p:sp>
@@ -5265,7 +6146,7 @@
           </p:nvSpPr>
           <p:spPr>
             <a:xfrm>
-              <a:off x="4748094" y="1013137"/>
+              <a:off x="4760217" y="1011002"/>
               <a:ext cx="274523" cy="369332"/>
             </a:xfrm>
             <a:prstGeom prst="rect">
@@ -5305,9 +6186,9 @@
         </p:nvGrpSpPr>
         <p:grpSpPr>
           <a:xfrm>
-            <a:off x="911778" y="5516133"/>
+            <a:off x="916713" y="5486850"/>
             <a:ext cx="413075" cy="646331"/>
-            <a:chOff x="4694620" y="1013137"/>
+            <a:chOff x="4694620" y="999407"/>
             <a:chExt cx="413075" cy="646331"/>
           </a:xfrm>
         </p:grpSpPr>
@@ -5379,7 +6260,7 @@
           </p:nvSpPr>
           <p:spPr>
             <a:xfrm>
-              <a:off x="4748094" y="1013137"/>
+              <a:off x="4758963" y="999407"/>
               <a:ext cx="274523" cy="646331"/>
             </a:xfrm>
             <a:prstGeom prst="rect">
@@ -5426,9 +6307,9 @@
         </p:nvGrpSpPr>
         <p:grpSpPr>
           <a:xfrm>
-            <a:off x="10367871" y="5516133"/>
+            <a:off x="10367871" y="5499789"/>
             <a:ext cx="413075" cy="646331"/>
-            <a:chOff x="4694620" y="1013137"/>
+            <a:chOff x="4694620" y="996793"/>
             <a:chExt cx="413075" cy="646331"/>
           </a:xfrm>
         </p:grpSpPr>
@@ -5500,7 +6381,7 @@
           </p:nvSpPr>
           <p:spPr>
             <a:xfrm>
-              <a:off x="4748094" y="1013137"/>
+              <a:off x="4763895" y="996793"/>
               <a:ext cx="274523" cy="646331"/>
             </a:xfrm>
             <a:prstGeom prst="rect">
@@ -5548,9 +6429,9 @@
         <p:grpSpPr>
           <a:xfrm>
             <a:off x="5892407" y="5313239"/>
-            <a:ext cx="413075" cy="646331"/>
+            <a:ext cx="413075" cy="651451"/>
             <a:chOff x="4694620" y="1013137"/>
-            <a:chExt cx="413075" cy="646331"/>
+            <a:chExt cx="413075" cy="651451"/>
           </a:xfrm>
         </p:grpSpPr>
         <p:sp>
@@ -5621,7 +6502,7 @@
           </p:nvSpPr>
           <p:spPr>
             <a:xfrm>
-              <a:off x="4748094" y="1013137"/>
+              <a:off x="4754607" y="1018257"/>
               <a:ext cx="274523" cy="646331"/>
             </a:xfrm>
             <a:prstGeom prst="rect">
@@ -5807,6 +6688,201 @@
           </a:p>
         </p:txBody>
       </p:sp>
+      <p:pic>
+        <p:nvPicPr>
+          <p:cNvPr id="36" name="Gráfico 35" descr="Distintivo">
+            <a:extLst>
+              <a:ext uri="{FF2B5EF4-FFF2-40B4-BE49-F238E27FC236}">
+                <a16:creationId xmlns:a16="http://schemas.microsoft.com/office/drawing/2014/main" id="{6FC30D5A-3379-446C-BF67-3DB2878BD826}"/>
+              </a:ext>
+            </a:extLst>
+          </p:cNvPr>
+          <p:cNvPicPr>
+            <a:picLocks noChangeAspect="1"/>
+          </p:cNvPicPr>
+          <p:nvPr/>
+        </p:nvPicPr>
+        <p:blipFill>
+          <a:blip r:embed="rId10">
+            <a:extLst>
+              <a:ext uri="{28A0092B-C50C-407E-A947-70E740481C1C}">
+                <a14:useLocalDpi xmlns:a14="http://schemas.microsoft.com/office/drawing/2010/main" val="0"/>
+              </a:ext>
+              <a:ext uri="{96DAC541-7B7A-43D3-8B79-37D633B846F1}">
+                <asvg:svgBlip xmlns:asvg="http://schemas.microsoft.com/office/drawing/2016/SVG/main" r:embed="rId11"/>
+              </a:ext>
+            </a:extLst>
+          </a:blip>
+          <a:stretch>
+            <a:fillRect/>
+          </a:stretch>
+        </p:blipFill>
+        <p:spPr>
+          <a:xfrm>
+            <a:off x="864846" y="2055460"/>
+            <a:ext cx="269437" cy="269437"/>
+          </a:xfrm>
+          <a:prstGeom prst="rect">
+            <a:avLst/>
+          </a:prstGeom>
+        </p:spPr>
+      </p:pic>
+      <p:pic>
+        <p:nvPicPr>
+          <p:cNvPr id="39" name="Gráfico 38" descr="Distintivo 3">
+            <a:extLst>
+              <a:ext uri="{FF2B5EF4-FFF2-40B4-BE49-F238E27FC236}">
+                <a16:creationId xmlns:a16="http://schemas.microsoft.com/office/drawing/2014/main" id="{EBF31BBD-2966-4D12-8A46-FBEE8737F3DC}"/>
+              </a:ext>
+            </a:extLst>
+          </p:cNvPr>
+          <p:cNvPicPr>
+            <a:picLocks noChangeAspect="1"/>
+          </p:cNvPicPr>
+          <p:nvPr/>
+        </p:nvPicPr>
+        <p:blipFill>
+          <a:blip r:embed="rId12">
+            <a:extLst>
+              <a:ext uri="{28A0092B-C50C-407E-A947-70E740481C1C}">
+                <a14:useLocalDpi xmlns:a14="http://schemas.microsoft.com/office/drawing/2010/main" val="0"/>
+              </a:ext>
+              <a:ext uri="{96DAC541-7B7A-43D3-8B79-37D633B846F1}">
+                <asvg:svgBlip xmlns:asvg="http://schemas.microsoft.com/office/drawing/2016/SVG/main" r:embed="rId13"/>
+              </a:ext>
+            </a:extLst>
+          </a:blip>
+          <a:stretch>
+            <a:fillRect/>
+          </a:stretch>
+        </p:blipFill>
+        <p:spPr>
+          <a:xfrm>
+            <a:off x="862946" y="2290940"/>
+            <a:ext cx="269437" cy="269437"/>
+          </a:xfrm>
+          <a:prstGeom prst="rect">
+            <a:avLst/>
+          </a:prstGeom>
+        </p:spPr>
+      </p:pic>
+      <p:pic>
+        <p:nvPicPr>
+          <p:cNvPr id="60" name="Gráfico 59" descr="Distintivo 1">
+            <a:extLst>
+              <a:ext uri="{FF2B5EF4-FFF2-40B4-BE49-F238E27FC236}">
+                <a16:creationId xmlns:a16="http://schemas.microsoft.com/office/drawing/2014/main" id="{C6AB9035-136D-4CB9-8CCB-D0759E3B6932}"/>
+              </a:ext>
+            </a:extLst>
+          </p:cNvPr>
+          <p:cNvPicPr>
+            <a:picLocks noChangeAspect="1"/>
+          </p:cNvPicPr>
+          <p:nvPr/>
+        </p:nvPicPr>
+        <p:blipFill>
+          <a:blip r:embed="rId14">
+            <a:extLst>
+              <a:ext uri="{28A0092B-C50C-407E-A947-70E740481C1C}">
+                <a14:useLocalDpi xmlns:a14="http://schemas.microsoft.com/office/drawing/2010/main" val="0"/>
+              </a:ext>
+              <a:ext uri="{96DAC541-7B7A-43D3-8B79-37D633B846F1}">
+                <asvg:svgBlip xmlns:asvg="http://schemas.microsoft.com/office/drawing/2016/SVG/main" r:embed="rId15"/>
+              </a:ext>
+            </a:extLst>
+          </a:blip>
+          <a:stretch>
+            <a:fillRect/>
+          </a:stretch>
+        </p:blipFill>
+        <p:spPr>
+          <a:xfrm>
+            <a:off x="862947" y="1804811"/>
+            <a:ext cx="269437" cy="269437"/>
+          </a:xfrm>
+          <a:prstGeom prst="rect">
+            <a:avLst/>
+          </a:prstGeom>
+        </p:spPr>
+      </p:pic>
+      <p:pic>
+        <p:nvPicPr>
+          <p:cNvPr id="101" name="Gráfico 100" descr="Distintivo 5">
+            <a:extLst>
+              <a:ext uri="{FF2B5EF4-FFF2-40B4-BE49-F238E27FC236}">
+                <a16:creationId xmlns:a16="http://schemas.microsoft.com/office/drawing/2014/main" id="{376F4185-0F7D-4826-8A32-188FFF51C2BF}"/>
+              </a:ext>
+            </a:extLst>
+          </p:cNvPr>
+          <p:cNvPicPr>
+            <a:picLocks noChangeAspect="1"/>
+          </p:cNvPicPr>
+          <p:nvPr/>
+        </p:nvPicPr>
+        <p:blipFill>
+          <a:blip r:embed="rId16">
+            <a:extLst>
+              <a:ext uri="{28A0092B-C50C-407E-A947-70E740481C1C}">
+                <a14:useLocalDpi xmlns:a14="http://schemas.microsoft.com/office/drawing/2010/main" val="0"/>
+              </a:ext>
+              <a:ext uri="{96DAC541-7B7A-43D3-8B79-37D633B846F1}">
+                <asvg:svgBlip xmlns:asvg="http://schemas.microsoft.com/office/drawing/2016/SVG/main" r:embed="rId17"/>
+              </a:ext>
+            </a:extLst>
+          </a:blip>
+          <a:stretch>
+            <a:fillRect/>
+          </a:stretch>
+        </p:blipFill>
+        <p:spPr>
+          <a:xfrm>
+            <a:off x="867041" y="2770319"/>
+            <a:ext cx="269437" cy="269437"/>
+          </a:xfrm>
+          <a:prstGeom prst="rect">
+            <a:avLst/>
+          </a:prstGeom>
+        </p:spPr>
+      </p:pic>
+      <p:pic>
+        <p:nvPicPr>
+          <p:cNvPr id="103" name="Gráfico 102" descr="Distintivo 4">
+            <a:extLst>
+              <a:ext uri="{FF2B5EF4-FFF2-40B4-BE49-F238E27FC236}">
+                <a16:creationId xmlns:a16="http://schemas.microsoft.com/office/drawing/2014/main" id="{38CDF565-5CEB-4DAB-AB2C-6C1EAB21A6C4}"/>
+              </a:ext>
+            </a:extLst>
+          </p:cNvPr>
+          <p:cNvPicPr>
+            <a:picLocks noChangeAspect="1"/>
+          </p:cNvPicPr>
+          <p:nvPr/>
+        </p:nvPicPr>
+        <p:blipFill>
+          <a:blip r:embed="rId18">
+            <a:extLst>
+              <a:ext uri="{28A0092B-C50C-407E-A947-70E740481C1C}">
+                <a14:useLocalDpi xmlns:a14="http://schemas.microsoft.com/office/drawing/2010/main" val="0"/>
+              </a:ext>
+              <a:ext uri="{96DAC541-7B7A-43D3-8B79-37D633B846F1}">
+                <asvg:svgBlip xmlns:asvg="http://schemas.microsoft.com/office/drawing/2016/SVG/main" r:embed="rId19"/>
+              </a:ext>
+            </a:extLst>
+          </a:blip>
+          <a:stretch>
+            <a:fillRect/>
+          </a:stretch>
+        </p:blipFill>
+        <p:spPr>
+          <a:xfrm>
+            <a:off x="862946" y="2526419"/>
+            <a:ext cx="269437" cy="269437"/>
+          </a:xfrm>
+          <a:prstGeom prst="rect">
+            <a:avLst/>
+          </a:prstGeom>
+        </p:spPr>
+      </p:pic>
     </p:spTree>
     <p:extLst>
       <p:ext uri="{BB962C8B-B14F-4D97-AF65-F5344CB8AC3E}">
@@ -5820,7 +6896,7 @@
 </p:sld>
 </file>
 
-<file path=ppt/slides/slide11.xml><?xml version="1.0" encoding="utf-8"?>
+<file path=ppt/slides/slide13.xml><?xml version="1.0" encoding="utf-8"?>
 <p:sld xmlns:a="http://schemas.openxmlformats.org/drawingml/2006/main" xmlns:r="http://schemas.openxmlformats.org/officeDocument/2006/relationships" xmlns:p="http://schemas.openxmlformats.org/presentationml/2006/main">
   <p:cSld>
     <p:spTree>
@@ -6248,9 +7324,9 @@
         <p:grpSpPr>
           <a:xfrm>
             <a:off x="11603607" y="6295650"/>
-            <a:ext cx="413075" cy="646331"/>
+            <a:ext cx="413075" cy="653809"/>
             <a:chOff x="510203" y="599076"/>
-            <a:chExt cx="413075" cy="646331"/>
+            <a:chExt cx="413075" cy="653809"/>
           </a:xfrm>
         </p:grpSpPr>
         <p:sp>
@@ -6313,7 +7389,7 @@
           </p:nvSpPr>
           <p:spPr>
             <a:xfrm>
-              <a:off x="563677" y="599076"/>
+              <a:off x="586734" y="606554"/>
               <a:ext cx="274523" cy="646331"/>
             </a:xfrm>
             <a:prstGeom prst="rect">
@@ -6383,9 +7459,7 @@
             <a:endParaRPr lang="pt-PT" sz="1600" dirty="0"/>
           </a:p>
           <a:p>
-            <a:pPr marL="342900" indent="-342900" algn="just">
-              <a:buAutoNum type="arabicPeriod" startAt="6"/>
-            </a:pPr>
+            <a:pPr algn="just"/>
             <a:r>
               <a:rPr lang="pt-PT" sz="1600" dirty="0"/>
               <a:t>Menu do </a:t>
@@ -6397,9 +7471,7 @@
             <a:endParaRPr lang="pt-PT" sz="1600" i="1" dirty="0"/>
           </a:p>
           <a:p>
-            <a:pPr marL="342900" indent="-342900" algn="just">
-              <a:buAutoNum type="arabicPeriod" startAt="6"/>
-            </a:pPr>
+            <a:pPr algn="just"/>
             <a:r>
               <a:rPr lang="pt-PT" sz="1600" dirty="0"/>
               <a:t>Menu do </a:t>
@@ -6411,9 +7483,7 @@
             <a:endParaRPr lang="pt-PT" sz="1600" i="1" dirty="0"/>
           </a:p>
           <a:p>
-            <a:pPr marL="342900" indent="-342900" algn="just">
-              <a:buAutoNum type="arabicPeriod" startAt="6"/>
-            </a:pPr>
+            <a:pPr algn="just"/>
             <a:r>
               <a:rPr lang="pt-PT" sz="1600" dirty="0"/>
               <a:t>Menu do </a:t>
@@ -6751,6 +7821,123 @@
           </a:p>
         </p:txBody>
       </p:sp>
+      <p:pic>
+        <p:nvPicPr>
+          <p:cNvPr id="25" name="Gráfico 24" descr="Distintivo 8">
+            <a:extLst>
+              <a:ext uri="{FF2B5EF4-FFF2-40B4-BE49-F238E27FC236}">
+                <a16:creationId xmlns:a16="http://schemas.microsoft.com/office/drawing/2014/main" id="{D81F15B9-E425-4181-9010-59D8FA948AA7}"/>
+              </a:ext>
+            </a:extLst>
+          </p:cNvPr>
+          <p:cNvPicPr>
+            <a:picLocks noChangeAspect="1"/>
+          </p:cNvPicPr>
+          <p:nvPr/>
+        </p:nvPicPr>
+        <p:blipFill>
+          <a:blip r:embed="rId8">
+            <a:extLst>
+              <a:ext uri="{28A0092B-C50C-407E-A947-70E740481C1C}">
+                <a14:useLocalDpi xmlns:a14="http://schemas.microsoft.com/office/drawing/2010/main" val="0"/>
+              </a:ext>
+              <a:ext uri="{96DAC541-7B7A-43D3-8B79-37D633B846F1}">
+                <asvg:svgBlip xmlns:asvg="http://schemas.microsoft.com/office/drawing/2016/SVG/main" r:embed="rId9"/>
+              </a:ext>
+            </a:extLst>
+          </a:blip>
+          <a:stretch>
+            <a:fillRect/>
+          </a:stretch>
+        </p:blipFill>
+        <p:spPr>
+          <a:xfrm>
+            <a:off x="798254" y="2265555"/>
+            <a:ext cx="269437" cy="269437"/>
+          </a:xfrm>
+          <a:prstGeom prst="rect">
+            <a:avLst/>
+          </a:prstGeom>
+        </p:spPr>
+      </p:pic>
+      <p:pic>
+        <p:nvPicPr>
+          <p:cNvPr id="26" name="Gráfico 25" descr="Distintivo 6">
+            <a:extLst>
+              <a:ext uri="{FF2B5EF4-FFF2-40B4-BE49-F238E27FC236}">
+                <a16:creationId xmlns:a16="http://schemas.microsoft.com/office/drawing/2014/main" id="{1A0E01C5-6443-45AC-A81A-5C1FBD84A3DA}"/>
+              </a:ext>
+            </a:extLst>
+          </p:cNvPr>
+          <p:cNvPicPr>
+            <a:picLocks noChangeAspect="1"/>
+          </p:cNvPicPr>
+          <p:nvPr/>
+        </p:nvPicPr>
+        <p:blipFill>
+          <a:blip r:embed="rId10">
+            <a:extLst>
+              <a:ext uri="{28A0092B-C50C-407E-A947-70E740481C1C}">
+                <a14:useLocalDpi xmlns:a14="http://schemas.microsoft.com/office/drawing/2010/main" val="0"/>
+              </a:ext>
+              <a:ext uri="{96DAC541-7B7A-43D3-8B79-37D633B846F1}">
+                <asvg:svgBlip xmlns:asvg="http://schemas.microsoft.com/office/drawing/2016/SVG/main" r:embed="rId11"/>
+              </a:ext>
+            </a:extLst>
+          </a:blip>
+          <a:stretch>
+            <a:fillRect/>
+          </a:stretch>
+        </p:blipFill>
+        <p:spPr>
+          <a:xfrm>
+            <a:off x="798255" y="1769575"/>
+            <a:ext cx="269437" cy="269437"/>
+          </a:xfrm>
+          <a:prstGeom prst="rect">
+            <a:avLst/>
+          </a:prstGeom>
+        </p:spPr>
+      </p:pic>
+      <p:pic>
+        <p:nvPicPr>
+          <p:cNvPr id="28" name="Gráfico 27" descr="Distintivo 7">
+            <a:extLst>
+              <a:ext uri="{FF2B5EF4-FFF2-40B4-BE49-F238E27FC236}">
+                <a16:creationId xmlns:a16="http://schemas.microsoft.com/office/drawing/2014/main" id="{F11DDF94-37A0-48C2-998A-B7DFBB71B709}"/>
+              </a:ext>
+            </a:extLst>
+          </p:cNvPr>
+          <p:cNvPicPr>
+            <a:picLocks noChangeAspect="1"/>
+          </p:cNvPicPr>
+          <p:nvPr/>
+        </p:nvPicPr>
+        <p:blipFill>
+          <a:blip r:embed="rId12">
+            <a:extLst>
+              <a:ext uri="{28A0092B-C50C-407E-A947-70E740481C1C}">
+                <a14:useLocalDpi xmlns:a14="http://schemas.microsoft.com/office/drawing/2010/main" val="0"/>
+              </a:ext>
+              <a:ext uri="{96DAC541-7B7A-43D3-8B79-37D633B846F1}">
+                <asvg:svgBlip xmlns:asvg="http://schemas.microsoft.com/office/drawing/2016/SVG/main" r:embed="rId13"/>
+              </a:ext>
+            </a:extLst>
+          </a:blip>
+          <a:stretch>
+            <a:fillRect/>
+          </a:stretch>
+        </p:blipFill>
+        <p:spPr>
+          <a:xfrm>
+            <a:off x="798254" y="2012264"/>
+            <a:ext cx="269437" cy="269437"/>
+          </a:xfrm>
+          <a:prstGeom prst="rect">
+            <a:avLst/>
+          </a:prstGeom>
+        </p:spPr>
+      </p:pic>
     </p:spTree>
     <p:extLst>
       <p:ext uri="{BB962C8B-B14F-4D97-AF65-F5344CB8AC3E}">
@@ -6764,7 +7951,7 @@
 </p:sld>
 </file>
 
-<file path=ppt/slides/slide12.xml><?xml version="1.0" encoding="utf-8"?>
+<file path=ppt/slides/slide14.xml><?xml version="1.0" encoding="utf-8"?>
 <p:sld xmlns:a="http://schemas.openxmlformats.org/drawingml/2006/main" xmlns:r="http://schemas.openxmlformats.org/officeDocument/2006/relationships" xmlns:p="http://schemas.openxmlformats.org/presentationml/2006/main">
   <p:cSld>
     <p:spTree>
@@ -9309,7 +10496,7 @@
               <a:t> utiliza todas as anteriores classes para criar uma </a:t>
             </a:r>
             <a:r>
-              <a:rPr lang="pt-PT" sz="1400" i="1" dirty="0" err="1"/>
+              <a:rPr lang="pt-PT" sz="1400" i="1" dirty="0"/>
               <a:t>framework</a:t>
             </a:r>
             <a:r>
@@ -9879,8 +11066,8 @@
         </p:blipFill>
         <p:spPr>
           <a:xfrm>
-            <a:off x="1208512" y="729894"/>
-            <a:ext cx="4585990" cy="5397575"/>
+            <a:off x="1122240" y="690719"/>
+            <a:ext cx="4758534" cy="5600654"/>
           </a:xfrm>
           <a:prstGeom prst="rect">
             <a:avLst/>
@@ -10360,7 +11547,7 @@
         </p:nvSpPr>
         <p:spPr>
           <a:xfrm>
-            <a:off x="387098" y="2061970"/>
+            <a:off x="612650" y="2061970"/>
             <a:ext cx="3568192" cy="4218305"/>
           </a:xfrm>
         </p:spPr>
@@ -10840,6 +12027,222 @@
               </a:solidFill>
               <a:effectLst/>
               <a:latin typeface="Arial" panose="020B0604020202020204" pitchFamily="34" charset="0"/>
+            </a:endParaRPr>
+          </a:p>
+        </p:txBody>
+      </p:sp>
+      <p:sp>
+        <p:nvSpPr>
+          <p:cNvPr id="9" name="Marcador de Posição de Conteúdo 4">
+            <a:extLst>
+              <a:ext uri="{FF2B5EF4-FFF2-40B4-BE49-F238E27FC236}">
+                <a16:creationId xmlns:a16="http://schemas.microsoft.com/office/drawing/2014/main" id="{A714AE95-A178-499F-88E6-8565F33C3052}"/>
+              </a:ext>
+            </a:extLst>
+          </p:cNvPr>
+          <p:cNvSpPr txBox="1">
+            <a:spLocks/>
+          </p:cNvSpPr>
+          <p:nvPr/>
+        </p:nvSpPr>
+        <p:spPr>
+          <a:xfrm>
+            <a:off x="5376660" y="2061970"/>
+            <a:ext cx="3339592" cy="345806"/>
+          </a:xfrm>
+          <a:prstGeom prst="rect">
+            <a:avLst/>
+          </a:prstGeom>
+        </p:spPr>
+        <p:txBody>
+          <a:bodyPr vert="horz" lIns="91440" tIns="45720" rIns="91440" bIns="45720" rtlCol="0" anchor="t">
+            <a:normAutofit/>
+          </a:bodyPr>
+          <a:lstStyle>
+            <a:lvl1pPr marL="228600" indent="-228600" algn="l" defTabSz="914400" rtl="0" eaLnBrk="1" latinLnBrk="0" hangingPunct="1">
+              <a:lnSpc>
+                <a:spcPct val="90000"/>
+              </a:lnSpc>
+              <a:spcBef>
+                <a:spcPts val="1000"/>
+              </a:spcBef>
+              <a:buFont typeface="Arial" panose="020B0604020202020204" pitchFamily="34" charset="0"/>
+              <a:buChar char="•"/>
+              <a:defRPr sz="2800" kern="1200">
+                <a:solidFill>
+                  <a:schemeClr val="tx1"/>
+                </a:solidFill>
+                <a:latin typeface="+mn-lt"/>
+                <a:ea typeface="+mn-ea"/>
+                <a:cs typeface="+mn-cs"/>
+              </a:defRPr>
+            </a:lvl1pPr>
+            <a:lvl2pPr marL="685800" indent="-228600" algn="l" defTabSz="914400" rtl="0" eaLnBrk="1" latinLnBrk="0" hangingPunct="1">
+              <a:lnSpc>
+                <a:spcPct val="90000"/>
+              </a:lnSpc>
+              <a:spcBef>
+                <a:spcPts val="500"/>
+              </a:spcBef>
+              <a:buFont typeface="Arial" panose="020B0604020202020204" pitchFamily="34" charset="0"/>
+              <a:buChar char="•"/>
+              <a:defRPr sz="2400" kern="1200">
+                <a:solidFill>
+                  <a:schemeClr val="tx1"/>
+                </a:solidFill>
+                <a:latin typeface="+mn-lt"/>
+                <a:ea typeface="+mn-ea"/>
+                <a:cs typeface="+mn-cs"/>
+              </a:defRPr>
+            </a:lvl2pPr>
+            <a:lvl3pPr marL="1143000" indent="-228600" algn="l" defTabSz="914400" rtl="0" eaLnBrk="1" latinLnBrk="0" hangingPunct="1">
+              <a:lnSpc>
+                <a:spcPct val="90000"/>
+              </a:lnSpc>
+              <a:spcBef>
+                <a:spcPts val="500"/>
+              </a:spcBef>
+              <a:buFont typeface="Arial" panose="020B0604020202020204" pitchFamily="34" charset="0"/>
+              <a:buChar char="•"/>
+              <a:defRPr sz="2000" kern="1200">
+                <a:solidFill>
+                  <a:schemeClr val="tx1"/>
+                </a:solidFill>
+                <a:latin typeface="+mn-lt"/>
+                <a:ea typeface="+mn-ea"/>
+                <a:cs typeface="+mn-cs"/>
+              </a:defRPr>
+            </a:lvl3pPr>
+            <a:lvl4pPr marL="1600200" indent="-228600" algn="l" defTabSz="914400" rtl="0" eaLnBrk="1" latinLnBrk="0" hangingPunct="1">
+              <a:lnSpc>
+                <a:spcPct val="90000"/>
+              </a:lnSpc>
+              <a:spcBef>
+                <a:spcPts val="500"/>
+              </a:spcBef>
+              <a:buFont typeface="Arial" panose="020B0604020202020204" pitchFamily="34" charset="0"/>
+              <a:buChar char="•"/>
+              <a:defRPr sz="1800" kern="1200">
+                <a:solidFill>
+                  <a:schemeClr val="tx1"/>
+                </a:solidFill>
+                <a:latin typeface="+mn-lt"/>
+                <a:ea typeface="+mn-ea"/>
+                <a:cs typeface="+mn-cs"/>
+              </a:defRPr>
+            </a:lvl4pPr>
+            <a:lvl5pPr marL="2057400" indent="-228600" algn="l" defTabSz="914400" rtl="0" eaLnBrk="1" latinLnBrk="0" hangingPunct="1">
+              <a:lnSpc>
+                <a:spcPct val="90000"/>
+              </a:lnSpc>
+              <a:spcBef>
+                <a:spcPts val="500"/>
+              </a:spcBef>
+              <a:buFont typeface="Arial" panose="020B0604020202020204" pitchFamily="34" charset="0"/>
+              <a:buChar char="•"/>
+              <a:defRPr sz="1800" kern="1200">
+                <a:solidFill>
+                  <a:schemeClr val="tx1"/>
+                </a:solidFill>
+                <a:latin typeface="+mn-lt"/>
+                <a:ea typeface="+mn-ea"/>
+                <a:cs typeface="+mn-cs"/>
+              </a:defRPr>
+            </a:lvl5pPr>
+            <a:lvl6pPr marL="2514600" indent="-228600" algn="l" defTabSz="914400" rtl="0" eaLnBrk="1" latinLnBrk="0" hangingPunct="1">
+              <a:lnSpc>
+                <a:spcPct val="90000"/>
+              </a:lnSpc>
+              <a:spcBef>
+                <a:spcPts val="500"/>
+              </a:spcBef>
+              <a:buFont typeface="Arial" panose="020B0604020202020204" pitchFamily="34" charset="0"/>
+              <a:buChar char="•"/>
+              <a:defRPr sz="1800" kern="1200">
+                <a:solidFill>
+                  <a:schemeClr val="tx1"/>
+                </a:solidFill>
+                <a:latin typeface="+mn-lt"/>
+                <a:ea typeface="+mn-ea"/>
+                <a:cs typeface="+mn-cs"/>
+              </a:defRPr>
+            </a:lvl6pPr>
+            <a:lvl7pPr marL="2971800" indent="-228600" algn="l" defTabSz="914400" rtl="0" eaLnBrk="1" latinLnBrk="0" hangingPunct="1">
+              <a:lnSpc>
+                <a:spcPct val="90000"/>
+              </a:lnSpc>
+              <a:spcBef>
+                <a:spcPts val="500"/>
+              </a:spcBef>
+              <a:buFont typeface="Arial" panose="020B0604020202020204" pitchFamily="34" charset="0"/>
+              <a:buChar char="•"/>
+              <a:defRPr sz="1800" kern="1200">
+                <a:solidFill>
+                  <a:schemeClr val="tx1"/>
+                </a:solidFill>
+                <a:latin typeface="+mn-lt"/>
+                <a:ea typeface="+mn-ea"/>
+                <a:cs typeface="+mn-cs"/>
+              </a:defRPr>
+            </a:lvl7pPr>
+            <a:lvl8pPr marL="3429000" indent="-228600" algn="l" defTabSz="914400" rtl="0" eaLnBrk="1" latinLnBrk="0" hangingPunct="1">
+              <a:lnSpc>
+                <a:spcPct val="90000"/>
+              </a:lnSpc>
+              <a:spcBef>
+                <a:spcPts val="500"/>
+              </a:spcBef>
+              <a:buFont typeface="Arial" panose="020B0604020202020204" pitchFamily="34" charset="0"/>
+              <a:buChar char="•"/>
+              <a:defRPr sz="1800" kern="1200">
+                <a:solidFill>
+                  <a:schemeClr val="tx1"/>
+                </a:solidFill>
+                <a:latin typeface="+mn-lt"/>
+                <a:ea typeface="+mn-ea"/>
+                <a:cs typeface="+mn-cs"/>
+              </a:defRPr>
+            </a:lvl8pPr>
+            <a:lvl9pPr marL="3886200" indent="-228600" algn="l" defTabSz="914400" rtl="0" eaLnBrk="1" latinLnBrk="0" hangingPunct="1">
+              <a:lnSpc>
+                <a:spcPct val="90000"/>
+              </a:lnSpc>
+              <a:spcBef>
+                <a:spcPts val="500"/>
+              </a:spcBef>
+              <a:buFont typeface="Arial" panose="020B0604020202020204" pitchFamily="34" charset="0"/>
+              <a:buChar char="•"/>
+              <a:defRPr sz="1800" kern="1200">
+                <a:solidFill>
+                  <a:schemeClr val="tx1"/>
+                </a:solidFill>
+                <a:latin typeface="+mn-lt"/>
+                <a:ea typeface="+mn-ea"/>
+                <a:cs typeface="+mn-cs"/>
+              </a:defRPr>
+            </a:lvl9pPr>
+          </a:lstStyle>
+          <a:p>
+            <a:r>
+              <a:rPr lang="pt-PT" sz="1800" dirty="0">
+                <a:solidFill>
+                  <a:schemeClr val="bg1"/>
+                </a:solidFill>
+              </a:rPr>
+              <a:t>Exemplo:</a:t>
+            </a:r>
+            <a:endParaRPr lang="pt-PT" sz="1400" dirty="0">
+              <a:solidFill>
+                <a:schemeClr val="bg1"/>
+              </a:solidFill>
+            </a:endParaRPr>
+          </a:p>
+          <a:p>
+            <a:pPr lvl="1"/>
+            <a:endParaRPr lang="pt-PT" dirty="0">
+              <a:solidFill>
+                <a:schemeClr val="bg1"/>
+              </a:solidFill>
             </a:endParaRPr>
           </a:p>
         </p:txBody>
@@ -13313,6 +14716,1318 @@
 <file path=ppt/slides/slide7.xml><?xml version="1.0" encoding="utf-8"?>
 <p:sld xmlns:a="http://schemas.openxmlformats.org/drawingml/2006/main" xmlns:r="http://schemas.openxmlformats.org/officeDocument/2006/relationships" xmlns:p="http://schemas.openxmlformats.org/presentationml/2006/main">
   <p:cSld>
+    <p:spTree>
+      <p:nvGrpSpPr>
+        <p:cNvPr id="1" name=""/>
+        <p:cNvGrpSpPr/>
+        <p:nvPr/>
+      </p:nvGrpSpPr>
+      <p:grpSpPr>
+        <a:xfrm>
+          <a:off x="0" y="0"/>
+          <a:ext cx="0" cy="0"/>
+          <a:chOff x="0" y="0"/>
+          <a:chExt cx="0" cy="0"/>
+        </a:xfrm>
+      </p:grpSpPr>
+      <p:sp>
+        <p:nvSpPr>
+          <p:cNvPr id="53" name="Triângulo retângulo 52">
+            <a:extLst>
+              <a:ext uri="{FF2B5EF4-FFF2-40B4-BE49-F238E27FC236}">
+                <a16:creationId xmlns:a16="http://schemas.microsoft.com/office/drawing/2014/main" id="{63B97383-FD5C-44C6-A869-75F560FABA1C}"/>
+              </a:ext>
+            </a:extLst>
+          </p:cNvPr>
+          <p:cNvSpPr/>
+          <p:nvPr/>
+        </p:nvSpPr>
+        <p:spPr>
+          <a:xfrm>
+            <a:off x="-9985" y="0"/>
+            <a:ext cx="5347774" cy="6858000"/>
+          </a:xfrm>
+          <a:prstGeom prst="rtTriangle">
+            <a:avLst/>
+          </a:prstGeom>
+          <a:solidFill>
+            <a:srgbClr val="0563C1">
+              <a:alpha val="78824"/>
+            </a:srgbClr>
+          </a:solidFill>
+          <a:ln>
+            <a:noFill/>
+          </a:ln>
+        </p:spPr>
+        <p:style>
+          <a:lnRef idx="2">
+            <a:schemeClr val="accent1">
+              <a:shade val="50000"/>
+            </a:schemeClr>
+          </a:lnRef>
+          <a:fillRef idx="1">
+            <a:schemeClr val="accent1"/>
+          </a:fillRef>
+          <a:effectRef idx="0">
+            <a:schemeClr val="accent1"/>
+          </a:effectRef>
+          <a:fontRef idx="minor">
+            <a:schemeClr val="lt1"/>
+          </a:fontRef>
+        </p:style>
+        <p:txBody>
+          <a:bodyPr rtlCol="0" anchor="ctr"/>
+          <a:lstStyle/>
+          <a:p>
+            <a:pPr algn="ctr"/>
+            <a:endParaRPr lang="pt-PT" dirty="0"/>
+          </a:p>
+        </p:txBody>
+      </p:sp>
+      <p:sp>
+        <p:nvSpPr>
+          <p:cNvPr id="55" name="Triângulo retângulo 54">
+            <a:extLst>
+              <a:ext uri="{FF2B5EF4-FFF2-40B4-BE49-F238E27FC236}">
+                <a16:creationId xmlns:a16="http://schemas.microsoft.com/office/drawing/2014/main" id="{71A705DE-8109-4151-A32A-208B04B7B6A2}"/>
+              </a:ext>
+            </a:extLst>
+          </p:cNvPr>
+          <p:cNvSpPr/>
+          <p:nvPr/>
+        </p:nvSpPr>
+        <p:spPr>
+          <a:xfrm>
+            <a:off x="-9987" y="-1"/>
+            <a:ext cx="1735215" cy="1935565"/>
+          </a:xfrm>
+          <a:prstGeom prst="rtTriangle">
+            <a:avLst/>
+          </a:prstGeom>
+          <a:solidFill>
+            <a:schemeClr val="bg1"/>
+          </a:solidFill>
+          <a:ln>
+            <a:noFill/>
+          </a:ln>
+        </p:spPr>
+        <p:style>
+          <a:lnRef idx="2">
+            <a:schemeClr val="accent1">
+              <a:shade val="50000"/>
+            </a:schemeClr>
+          </a:lnRef>
+          <a:fillRef idx="1">
+            <a:schemeClr val="accent1"/>
+          </a:fillRef>
+          <a:effectRef idx="0">
+            <a:schemeClr val="accent1"/>
+          </a:effectRef>
+          <a:fontRef idx="minor">
+            <a:schemeClr val="lt1"/>
+          </a:fontRef>
+        </p:style>
+        <p:txBody>
+          <a:bodyPr rtlCol="0" anchor="ctr"/>
+          <a:lstStyle/>
+          <a:p>
+            <a:pPr algn="ctr"/>
+            <a:endParaRPr lang="pt-PT"/>
+          </a:p>
+        </p:txBody>
+      </p:sp>
+      <p:sp>
+        <p:nvSpPr>
+          <p:cNvPr id="54" name="Triângulo retângulo 53">
+            <a:extLst>
+              <a:ext uri="{FF2B5EF4-FFF2-40B4-BE49-F238E27FC236}">
+                <a16:creationId xmlns:a16="http://schemas.microsoft.com/office/drawing/2014/main" id="{9451502F-6A7D-4103-A8A2-C5F11340EDEE}"/>
+              </a:ext>
+            </a:extLst>
+          </p:cNvPr>
+          <p:cNvSpPr/>
+          <p:nvPr/>
+        </p:nvSpPr>
+        <p:spPr>
+          <a:xfrm>
+            <a:off x="-9985" y="50555"/>
+            <a:ext cx="1814427" cy="1935565"/>
+          </a:xfrm>
+          <a:prstGeom prst="rtTriangle">
+            <a:avLst/>
+          </a:prstGeom>
+          <a:solidFill>
+            <a:schemeClr val="bg1"/>
+          </a:solidFill>
+          <a:ln>
+            <a:solidFill>
+              <a:schemeClr val="bg1"/>
+            </a:solidFill>
+          </a:ln>
+        </p:spPr>
+        <p:style>
+          <a:lnRef idx="2">
+            <a:schemeClr val="accent1">
+              <a:shade val="50000"/>
+            </a:schemeClr>
+          </a:lnRef>
+          <a:fillRef idx="1">
+            <a:schemeClr val="accent1"/>
+          </a:fillRef>
+          <a:effectRef idx="0">
+            <a:schemeClr val="accent1"/>
+          </a:effectRef>
+          <a:fontRef idx="minor">
+            <a:schemeClr val="lt1"/>
+          </a:fontRef>
+        </p:style>
+        <p:txBody>
+          <a:bodyPr rtlCol="0" anchor="ctr"/>
+          <a:lstStyle/>
+          <a:p>
+            <a:pPr algn="ctr"/>
+            <a:endParaRPr lang="pt-PT"/>
+          </a:p>
+        </p:txBody>
+      </p:sp>
+      <p:sp>
+        <p:nvSpPr>
+          <p:cNvPr id="51" name="Triângulo retângulo 50">
+            <a:extLst>
+              <a:ext uri="{FF2B5EF4-FFF2-40B4-BE49-F238E27FC236}">
+                <a16:creationId xmlns:a16="http://schemas.microsoft.com/office/drawing/2014/main" id="{62AB3277-73D0-460A-8096-DEEE686FEC5E}"/>
+              </a:ext>
+            </a:extLst>
+          </p:cNvPr>
+          <p:cNvSpPr/>
+          <p:nvPr/>
+        </p:nvSpPr>
+        <p:spPr>
+          <a:xfrm>
+            <a:off x="-9984" y="-1"/>
+            <a:ext cx="1418904" cy="1851103"/>
+          </a:xfrm>
+          <a:prstGeom prst="rtTriangle">
+            <a:avLst/>
+          </a:prstGeom>
+          <a:solidFill>
+            <a:schemeClr val="accent3">
+              <a:lumMod val="60000"/>
+              <a:lumOff val="40000"/>
+            </a:schemeClr>
+          </a:solidFill>
+          <a:ln>
+            <a:solidFill>
+              <a:schemeClr val="accent3">
+                <a:lumMod val="60000"/>
+                <a:lumOff val="40000"/>
+              </a:schemeClr>
+            </a:solidFill>
+          </a:ln>
+        </p:spPr>
+        <p:style>
+          <a:lnRef idx="2">
+            <a:schemeClr val="accent1">
+              <a:shade val="50000"/>
+            </a:schemeClr>
+          </a:lnRef>
+          <a:fillRef idx="1">
+            <a:schemeClr val="accent1"/>
+          </a:fillRef>
+          <a:effectRef idx="0">
+            <a:schemeClr val="accent1"/>
+          </a:effectRef>
+          <a:fontRef idx="minor">
+            <a:schemeClr val="lt1"/>
+          </a:fontRef>
+        </p:style>
+        <p:txBody>
+          <a:bodyPr rtlCol="0" anchor="ctr"/>
+          <a:lstStyle/>
+          <a:p>
+            <a:pPr algn="ctr"/>
+            <a:endParaRPr lang="pt-PT"/>
+          </a:p>
+        </p:txBody>
+      </p:sp>
+      <p:sp>
+        <p:nvSpPr>
+          <p:cNvPr id="2" name="Título 1">
+            <a:extLst>
+              <a:ext uri="{FF2B5EF4-FFF2-40B4-BE49-F238E27FC236}">
+                <a16:creationId xmlns:a16="http://schemas.microsoft.com/office/drawing/2014/main" id="{BFFEC387-405C-408D-A19A-16CA199198AD}"/>
+              </a:ext>
+            </a:extLst>
+          </p:cNvPr>
+          <p:cNvSpPr>
+            <a:spLocks noGrp="1"/>
+          </p:cNvSpPr>
+          <p:nvPr>
+            <p:ph type="title"/>
+          </p:nvPr>
+        </p:nvSpPr>
+        <p:spPr/>
+        <p:txBody>
+          <a:bodyPr/>
+          <a:lstStyle/>
+          <a:p>
+            <a:r>
+              <a:rPr lang="pt-PT" dirty="0">
+                <a:effectLst>
+                  <a:outerShdw blurRad="38100" dist="38100" dir="2700000" algn="tl">
+                    <a:srgbClr val="000000">
+                      <a:alpha val="43137"/>
+                    </a:srgbClr>
+                  </a:outerShdw>
+                </a:effectLst>
+              </a:rPr>
+              <a:t>Exemplo de tratamento de exceção</a:t>
+            </a:r>
+          </a:p>
+        </p:txBody>
+      </p:sp>
+      <p:pic>
+        <p:nvPicPr>
+          <p:cNvPr id="5" name="Marcador de Posição de Conteúdo 4" descr="Uma imagem com texto&#10;&#10;Descrição gerada automaticamente">
+            <a:extLst>
+              <a:ext uri="{FF2B5EF4-FFF2-40B4-BE49-F238E27FC236}">
+                <a16:creationId xmlns:a16="http://schemas.microsoft.com/office/drawing/2014/main" id="{B1074A4C-B587-4F07-9F42-42A2B6C91E01}"/>
+              </a:ext>
+            </a:extLst>
+          </p:cNvPr>
+          <p:cNvPicPr>
+            <a:picLocks noGrp="1" noChangeAspect="1"/>
+          </p:cNvPicPr>
+          <p:nvPr>
+            <p:ph idx="1"/>
+          </p:nvPr>
+        </p:nvPicPr>
+        <p:blipFill>
+          <a:blip r:embed="rId2">
+            <a:extLst>
+              <a:ext uri="{28A0092B-C50C-407E-A947-70E740481C1C}">
+                <a14:useLocalDpi xmlns:a14="http://schemas.microsoft.com/office/drawing/2010/main" val="0"/>
+              </a:ext>
+            </a:extLst>
+          </a:blip>
+          <a:stretch>
+            <a:fillRect/>
+          </a:stretch>
+        </p:blipFill>
+        <p:spPr>
+          <a:xfrm>
+            <a:off x="1166898" y="1735606"/>
+            <a:ext cx="5758162" cy="2201488"/>
+          </a:xfrm>
+        </p:spPr>
+      </p:pic>
+      <p:pic>
+        <p:nvPicPr>
+          <p:cNvPr id="7" name="Imagem 6" descr="Uma imagem com texto&#10;&#10;Descrição gerada automaticamente">
+            <a:extLst>
+              <a:ext uri="{FF2B5EF4-FFF2-40B4-BE49-F238E27FC236}">
+                <a16:creationId xmlns:a16="http://schemas.microsoft.com/office/drawing/2014/main" id="{4FFC7ADC-4629-4F73-A9E9-65F055314AE3}"/>
+              </a:ext>
+            </a:extLst>
+          </p:cNvPr>
+          <p:cNvPicPr>
+            <a:picLocks noChangeAspect="1"/>
+          </p:cNvPicPr>
+          <p:nvPr/>
+        </p:nvPicPr>
+        <p:blipFill rotWithShape="1">
+          <a:blip r:embed="rId3">
+            <a:extLst>
+              <a:ext uri="{28A0092B-C50C-407E-A947-70E740481C1C}">
+                <a14:useLocalDpi xmlns:a14="http://schemas.microsoft.com/office/drawing/2010/main" val="0"/>
+              </a:ext>
+            </a:extLst>
+          </a:blip>
+          <a:srcRect r="8804"/>
+          <a:stretch/>
+        </p:blipFill>
+        <p:spPr>
+          <a:xfrm>
+            <a:off x="7960825" y="4434860"/>
+            <a:ext cx="3945731" cy="1807838"/>
+          </a:xfrm>
+          <a:prstGeom prst="rect">
+            <a:avLst/>
+          </a:prstGeom>
+        </p:spPr>
+      </p:pic>
+      <p:pic>
+        <p:nvPicPr>
+          <p:cNvPr id="9" name="Imagem 8" descr="Uma imagem com texto&#10;&#10;Descrição gerada automaticamente">
+            <a:extLst>
+              <a:ext uri="{FF2B5EF4-FFF2-40B4-BE49-F238E27FC236}">
+                <a16:creationId xmlns:a16="http://schemas.microsoft.com/office/drawing/2014/main" id="{D6C974DA-E19C-435B-B195-849D047B9FBC}"/>
+              </a:ext>
+            </a:extLst>
+          </p:cNvPr>
+          <p:cNvPicPr>
+            <a:picLocks noChangeAspect="1"/>
+          </p:cNvPicPr>
+          <p:nvPr/>
+        </p:nvPicPr>
+        <p:blipFill>
+          <a:blip r:embed="rId4">
+            <a:extLst>
+              <a:ext uri="{28A0092B-C50C-407E-A947-70E740481C1C}">
+                <a14:useLocalDpi xmlns:a14="http://schemas.microsoft.com/office/drawing/2010/main" val="0"/>
+              </a:ext>
+            </a:extLst>
+          </a:blip>
+          <a:stretch>
+            <a:fillRect/>
+          </a:stretch>
+        </p:blipFill>
+        <p:spPr>
+          <a:xfrm>
+            <a:off x="305764" y="4464476"/>
+            <a:ext cx="3740215" cy="1782209"/>
+          </a:xfrm>
+          <a:prstGeom prst="rect">
+            <a:avLst/>
+          </a:prstGeom>
+        </p:spPr>
+      </p:pic>
+      <p:pic>
+        <p:nvPicPr>
+          <p:cNvPr id="11" name="Imagem 10" descr="Uma imagem com texto&#10;&#10;Descrição gerada automaticamente">
+            <a:extLst>
+              <a:ext uri="{FF2B5EF4-FFF2-40B4-BE49-F238E27FC236}">
+                <a16:creationId xmlns:a16="http://schemas.microsoft.com/office/drawing/2014/main" id="{89B157ED-FFF6-4236-86F8-B035CDAF8CC4}"/>
+              </a:ext>
+            </a:extLst>
+          </p:cNvPr>
+          <p:cNvPicPr>
+            <a:picLocks noChangeAspect="1"/>
+          </p:cNvPicPr>
+          <p:nvPr/>
+        </p:nvPicPr>
+        <p:blipFill>
+          <a:blip r:embed="rId5">
+            <a:extLst>
+              <a:ext uri="{28A0092B-C50C-407E-A947-70E740481C1C}">
+                <a14:useLocalDpi xmlns:a14="http://schemas.microsoft.com/office/drawing/2010/main" val="0"/>
+              </a:ext>
+            </a:extLst>
+          </a:blip>
+          <a:stretch>
+            <a:fillRect/>
+          </a:stretch>
+        </p:blipFill>
+        <p:spPr>
+          <a:xfrm>
+            <a:off x="4231175" y="4445101"/>
+            <a:ext cx="3556801" cy="1801583"/>
+          </a:xfrm>
+          <a:prstGeom prst="rect">
+            <a:avLst/>
+          </a:prstGeom>
+        </p:spPr>
+      </p:pic>
+      <p:sp>
+        <p:nvSpPr>
+          <p:cNvPr id="12" name="Oval 11">
+            <a:extLst>
+              <a:ext uri="{FF2B5EF4-FFF2-40B4-BE49-F238E27FC236}">
+                <a16:creationId xmlns:a16="http://schemas.microsoft.com/office/drawing/2014/main" id="{9862C63A-70C9-4BFA-8337-B7CF5B299BBE}"/>
+              </a:ext>
+            </a:extLst>
+          </p:cNvPr>
+          <p:cNvSpPr/>
+          <p:nvPr/>
+        </p:nvSpPr>
+        <p:spPr>
+          <a:xfrm>
+            <a:off x="132916" y="5802860"/>
+            <a:ext cx="3569150" cy="439838"/>
+          </a:xfrm>
+          <a:prstGeom prst="ellipse">
+            <a:avLst/>
+          </a:prstGeom>
+          <a:noFill/>
+          <a:ln w="38100">
+            <a:solidFill>
+              <a:srgbClr val="FF0000"/>
+            </a:solidFill>
+          </a:ln>
+        </p:spPr>
+        <p:style>
+          <a:lnRef idx="2">
+            <a:schemeClr val="accent1">
+              <a:shade val="50000"/>
+            </a:schemeClr>
+          </a:lnRef>
+          <a:fillRef idx="1">
+            <a:schemeClr val="accent1"/>
+          </a:fillRef>
+          <a:effectRef idx="0">
+            <a:schemeClr val="accent1"/>
+          </a:effectRef>
+          <a:fontRef idx="minor">
+            <a:schemeClr val="lt1"/>
+          </a:fontRef>
+        </p:style>
+        <p:txBody>
+          <a:bodyPr rtlCol="0" anchor="ctr"/>
+          <a:lstStyle/>
+          <a:p>
+            <a:pPr algn="ctr"/>
+            <a:endParaRPr lang="pt-PT"/>
+          </a:p>
+        </p:txBody>
+      </p:sp>
+      <p:sp>
+        <p:nvSpPr>
+          <p:cNvPr id="13" name="Oval 12">
+            <a:extLst>
+              <a:ext uri="{FF2B5EF4-FFF2-40B4-BE49-F238E27FC236}">
+                <a16:creationId xmlns:a16="http://schemas.microsoft.com/office/drawing/2014/main" id="{22F1C9F0-7FB8-4C9E-8A1F-C216A9673ED8}"/>
+              </a:ext>
+            </a:extLst>
+          </p:cNvPr>
+          <p:cNvSpPr/>
+          <p:nvPr/>
+        </p:nvSpPr>
+        <p:spPr>
+          <a:xfrm>
+            <a:off x="4126231" y="5904560"/>
+            <a:ext cx="3740216" cy="324840"/>
+          </a:xfrm>
+          <a:prstGeom prst="ellipse">
+            <a:avLst/>
+          </a:prstGeom>
+          <a:noFill/>
+          <a:ln w="38100">
+            <a:solidFill>
+              <a:srgbClr val="92D050"/>
+            </a:solidFill>
+          </a:ln>
+        </p:spPr>
+        <p:style>
+          <a:lnRef idx="2">
+            <a:schemeClr val="accent1">
+              <a:shade val="50000"/>
+            </a:schemeClr>
+          </a:lnRef>
+          <a:fillRef idx="1">
+            <a:schemeClr val="accent1"/>
+          </a:fillRef>
+          <a:effectRef idx="0">
+            <a:schemeClr val="accent1"/>
+          </a:effectRef>
+          <a:fontRef idx="minor">
+            <a:schemeClr val="lt1"/>
+          </a:fontRef>
+        </p:style>
+        <p:txBody>
+          <a:bodyPr rtlCol="0" anchor="ctr"/>
+          <a:lstStyle/>
+          <a:p>
+            <a:pPr algn="ctr"/>
+            <a:endParaRPr lang="pt-PT">
+              <a:solidFill>
+                <a:srgbClr val="FF0000"/>
+              </a:solidFill>
+            </a:endParaRPr>
+          </a:p>
+        </p:txBody>
+      </p:sp>
+      <p:sp>
+        <p:nvSpPr>
+          <p:cNvPr id="14" name="Oval 13">
+            <a:extLst>
+              <a:ext uri="{FF2B5EF4-FFF2-40B4-BE49-F238E27FC236}">
+                <a16:creationId xmlns:a16="http://schemas.microsoft.com/office/drawing/2014/main" id="{717D9583-AA41-4152-A6F8-A8FB6BCB519F}"/>
+              </a:ext>
+            </a:extLst>
+          </p:cNvPr>
+          <p:cNvSpPr/>
+          <p:nvPr/>
+        </p:nvSpPr>
+        <p:spPr>
+          <a:xfrm>
+            <a:off x="7960825" y="5083633"/>
+            <a:ext cx="2164755" cy="271947"/>
+          </a:xfrm>
+          <a:prstGeom prst="ellipse">
+            <a:avLst/>
+          </a:prstGeom>
+          <a:noFill/>
+          <a:ln w="38100">
+            <a:solidFill>
+              <a:srgbClr val="0070C0"/>
+            </a:solidFill>
+          </a:ln>
+        </p:spPr>
+        <p:style>
+          <a:lnRef idx="2">
+            <a:schemeClr val="accent1">
+              <a:shade val="50000"/>
+            </a:schemeClr>
+          </a:lnRef>
+          <a:fillRef idx="1">
+            <a:schemeClr val="accent1"/>
+          </a:fillRef>
+          <a:effectRef idx="0">
+            <a:schemeClr val="accent1"/>
+          </a:effectRef>
+          <a:fontRef idx="minor">
+            <a:schemeClr val="lt1"/>
+          </a:fontRef>
+        </p:style>
+        <p:txBody>
+          <a:bodyPr rtlCol="0" anchor="ctr"/>
+          <a:lstStyle/>
+          <a:p>
+            <a:pPr algn="ctr"/>
+            <a:endParaRPr lang="pt-PT"/>
+          </a:p>
+        </p:txBody>
+      </p:sp>
+      <p:cxnSp>
+        <p:nvCxnSpPr>
+          <p:cNvPr id="16" name="Conexão reta 15">
+            <a:extLst>
+              <a:ext uri="{FF2B5EF4-FFF2-40B4-BE49-F238E27FC236}">
+                <a16:creationId xmlns:a16="http://schemas.microsoft.com/office/drawing/2014/main" id="{96A70521-04B3-4453-946F-F824434111E1}"/>
+              </a:ext>
+            </a:extLst>
+          </p:cNvPr>
+          <p:cNvCxnSpPr/>
+          <p:nvPr/>
+        </p:nvCxnSpPr>
+        <p:spPr>
+          <a:xfrm>
+            <a:off x="10972800" y="5521124"/>
+            <a:ext cx="787078" cy="0"/>
+          </a:xfrm>
+          <a:prstGeom prst="line">
+            <a:avLst/>
+          </a:prstGeom>
+          <a:ln w="38100">
+            <a:solidFill>
+              <a:srgbClr val="0070C0"/>
+            </a:solidFill>
+          </a:ln>
+        </p:spPr>
+        <p:style>
+          <a:lnRef idx="1">
+            <a:schemeClr val="accent1"/>
+          </a:lnRef>
+          <a:fillRef idx="0">
+            <a:schemeClr val="accent1"/>
+          </a:fillRef>
+          <a:effectRef idx="0">
+            <a:schemeClr val="accent1"/>
+          </a:effectRef>
+          <a:fontRef idx="minor">
+            <a:schemeClr val="tx1"/>
+          </a:fontRef>
+        </p:style>
+      </p:cxnSp>
+      <p:cxnSp>
+        <p:nvCxnSpPr>
+          <p:cNvPr id="17" name="Conexão reta 16">
+            <a:extLst>
+              <a:ext uri="{FF2B5EF4-FFF2-40B4-BE49-F238E27FC236}">
+                <a16:creationId xmlns:a16="http://schemas.microsoft.com/office/drawing/2014/main" id="{DAEDFB3E-794C-447B-83CF-A77918ECA95D}"/>
+              </a:ext>
+            </a:extLst>
+          </p:cNvPr>
+          <p:cNvCxnSpPr/>
+          <p:nvPr/>
+        </p:nvCxnSpPr>
+        <p:spPr>
+          <a:xfrm>
+            <a:off x="11044177" y="5874237"/>
+            <a:ext cx="787078" cy="0"/>
+          </a:xfrm>
+          <a:prstGeom prst="line">
+            <a:avLst/>
+          </a:prstGeom>
+          <a:ln w="38100">
+            <a:solidFill>
+              <a:srgbClr val="0070C0"/>
+            </a:solidFill>
+          </a:ln>
+        </p:spPr>
+        <p:style>
+          <a:lnRef idx="1">
+            <a:schemeClr val="accent1"/>
+          </a:lnRef>
+          <a:fillRef idx="0">
+            <a:schemeClr val="accent1"/>
+          </a:fillRef>
+          <a:effectRef idx="0">
+            <a:schemeClr val="accent1"/>
+          </a:effectRef>
+          <a:fontRef idx="minor">
+            <a:schemeClr val="tx1"/>
+          </a:fontRef>
+        </p:style>
+      </p:cxnSp>
+      <p:sp>
+        <p:nvSpPr>
+          <p:cNvPr id="21" name="Oval 20">
+            <a:extLst>
+              <a:ext uri="{FF2B5EF4-FFF2-40B4-BE49-F238E27FC236}">
+                <a16:creationId xmlns:a16="http://schemas.microsoft.com/office/drawing/2014/main" id="{A1B150D1-BA65-4FCD-8CF1-C33A6492246C}"/>
+              </a:ext>
+            </a:extLst>
+          </p:cNvPr>
+          <p:cNvSpPr/>
+          <p:nvPr/>
+        </p:nvSpPr>
+        <p:spPr>
+          <a:xfrm>
+            <a:off x="3859107" y="1851103"/>
+            <a:ext cx="1574939" cy="275708"/>
+          </a:xfrm>
+          <a:prstGeom prst="ellipse">
+            <a:avLst/>
+          </a:prstGeom>
+          <a:noFill/>
+          <a:ln w="38100">
+            <a:solidFill>
+              <a:srgbClr val="92D050"/>
+            </a:solidFill>
+          </a:ln>
+        </p:spPr>
+        <p:style>
+          <a:lnRef idx="2">
+            <a:schemeClr val="accent1">
+              <a:shade val="50000"/>
+            </a:schemeClr>
+          </a:lnRef>
+          <a:fillRef idx="1">
+            <a:schemeClr val="accent1"/>
+          </a:fillRef>
+          <a:effectRef idx="0">
+            <a:schemeClr val="accent1"/>
+          </a:effectRef>
+          <a:fontRef idx="minor">
+            <a:schemeClr val="lt1"/>
+          </a:fontRef>
+        </p:style>
+        <p:txBody>
+          <a:bodyPr rtlCol="0" anchor="ctr"/>
+          <a:lstStyle/>
+          <a:p>
+            <a:pPr algn="ctr"/>
+            <a:endParaRPr lang="pt-PT">
+              <a:solidFill>
+                <a:srgbClr val="FF0000"/>
+              </a:solidFill>
+            </a:endParaRPr>
+          </a:p>
+        </p:txBody>
+      </p:sp>
+      <p:sp>
+        <p:nvSpPr>
+          <p:cNvPr id="22" name="Oval 21">
+            <a:extLst>
+              <a:ext uri="{FF2B5EF4-FFF2-40B4-BE49-F238E27FC236}">
+                <a16:creationId xmlns:a16="http://schemas.microsoft.com/office/drawing/2014/main" id="{64C99ECF-D054-4D43-BDB2-6EAE3AC3068A}"/>
+              </a:ext>
+            </a:extLst>
+          </p:cNvPr>
+          <p:cNvSpPr/>
+          <p:nvPr/>
+        </p:nvSpPr>
+        <p:spPr>
+          <a:xfrm>
+            <a:off x="3232124" y="2265178"/>
+            <a:ext cx="1574939" cy="275708"/>
+          </a:xfrm>
+          <a:prstGeom prst="ellipse">
+            <a:avLst/>
+          </a:prstGeom>
+          <a:noFill/>
+          <a:ln w="38100">
+            <a:solidFill>
+              <a:srgbClr val="FF0000"/>
+            </a:solidFill>
+          </a:ln>
+        </p:spPr>
+        <p:style>
+          <a:lnRef idx="2">
+            <a:schemeClr val="accent1">
+              <a:shade val="50000"/>
+            </a:schemeClr>
+          </a:lnRef>
+          <a:fillRef idx="1">
+            <a:schemeClr val="accent1"/>
+          </a:fillRef>
+          <a:effectRef idx="0">
+            <a:schemeClr val="accent1"/>
+          </a:effectRef>
+          <a:fontRef idx="minor">
+            <a:schemeClr val="lt1"/>
+          </a:fontRef>
+        </p:style>
+        <p:txBody>
+          <a:bodyPr rtlCol="0" anchor="ctr"/>
+          <a:lstStyle/>
+          <a:p>
+            <a:pPr algn="ctr"/>
+            <a:endParaRPr lang="pt-PT"/>
+          </a:p>
+        </p:txBody>
+      </p:sp>
+      <p:sp>
+        <p:nvSpPr>
+          <p:cNvPr id="24" name="Oval 23">
+            <a:extLst>
+              <a:ext uri="{FF2B5EF4-FFF2-40B4-BE49-F238E27FC236}">
+                <a16:creationId xmlns:a16="http://schemas.microsoft.com/office/drawing/2014/main" id="{A6A5DE28-7D27-4E31-83D1-76D30E94A85F}"/>
+              </a:ext>
+            </a:extLst>
+          </p:cNvPr>
+          <p:cNvSpPr/>
+          <p:nvPr/>
+        </p:nvSpPr>
+        <p:spPr>
+          <a:xfrm>
+            <a:off x="3456944" y="3427497"/>
+            <a:ext cx="619871" cy="275708"/>
+          </a:xfrm>
+          <a:prstGeom prst="ellipse">
+            <a:avLst/>
+          </a:prstGeom>
+          <a:noFill/>
+          <a:ln w="38100">
+            <a:solidFill>
+              <a:srgbClr val="0070C0"/>
+            </a:solidFill>
+          </a:ln>
+        </p:spPr>
+        <p:style>
+          <a:lnRef idx="2">
+            <a:schemeClr val="accent1">
+              <a:shade val="50000"/>
+            </a:schemeClr>
+          </a:lnRef>
+          <a:fillRef idx="1">
+            <a:schemeClr val="accent1"/>
+          </a:fillRef>
+          <a:effectRef idx="0">
+            <a:schemeClr val="accent1"/>
+          </a:effectRef>
+          <a:fontRef idx="minor">
+            <a:schemeClr val="lt1"/>
+          </a:fontRef>
+        </p:style>
+        <p:txBody>
+          <a:bodyPr rtlCol="0" anchor="ctr"/>
+          <a:lstStyle/>
+          <a:p>
+            <a:pPr algn="ctr"/>
+            <a:endParaRPr lang="pt-PT"/>
+          </a:p>
+        </p:txBody>
+      </p:sp>
+      <p:pic>
+        <p:nvPicPr>
+          <p:cNvPr id="28" name="Imagem 27">
+            <a:extLst>
+              <a:ext uri="{FF2B5EF4-FFF2-40B4-BE49-F238E27FC236}">
+                <a16:creationId xmlns:a16="http://schemas.microsoft.com/office/drawing/2014/main" id="{8A80F190-51FD-4C07-A87C-E96C526EEECF}"/>
+              </a:ext>
+            </a:extLst>
+          </p:cNvPr>
+          <p:cNvPicPr>
+            <a:picLocks noChangeAspect="1"/>
+          </p:cNvPicPr>
+          <p:nvPr/>
+        </p:nvPicPr>
+        <p:blipFill>
+          <a:blip r:embed="rId6">
+            <a:extLst>
+              <a:ext uri="{28A0092B-C50C-407E-A947-70E740481C1C}">
+                <a14:useLocalDpi xmlns:a14="http://schemas.microsoft.com/office/drawing/2010/main" val="0"/>
+              </a:ext>
+            </a:extLst>
+          </a:blip>
+          <a:stretch>
+            <a:fillRect/>
+          </a:stretch>
+        </p:blipFill>
+        <p:spPr>
+          <a:xfrm>
+            <a:off x="7197979" y="1739717"/>
+            <a:ext cx="3268793" cy="2197377"/>
+          </a:xfrm>
+          <a:prstGeom prst="rect">
+            <a:avLst/>
+          </a:prstGeom>
+        </p:spPr>
+      </p:pic>
+      <p:sp>
+        <p:nvSpPr>
+          <p:cNvPr id="29" name="Retângulo 28">
+            <a:extLst>
+              <a:ext uri="{FF2B5EF4-FFF2-40B4-BE49-F238E27FC236}">
+                <a16:creationId xmlns:a16="http://schemas.microsoft.com/office/drawing/2014/main" id="{08BD4959-0645-4F2B-A12C-95911209D1DE}"/>
+              </a:ext>
+            </a:extLst>
+          </p:cNvPr>
+          <p:cNvSpPr/>
+          <p:nvPr/>
+        </p:nvSpPr>
+        <p:spPr>
+          <a:xfrm>
+            <a:off x="7197979" y="1735604"/>
+            <a:ext cx="3268793" cy="2201489"/>
+          </a:xfrm>
+          <a:prstGeom prst="rect">
+            <a:avLst/>
+          </a:prstGeom>
+          <a:noFill/>
+          <a:ln w="38100">
+            <a:solidFill>
+              <a:srgbClr val="0070C0"/>
+            </a:solidFill>
+          </a:ln>
+        </p:spPr>
+        <p:style>
+          <a:lnRef idx="2">
+            <a:schemeClr val="accent1">
+              <a:shade val="50000"/>
+            </a:schemeClr>
+          </a:lnRef>
+          <a:fillRef idx="1">
+            <a:schemeClr val="accent1"/>
+          </a:fillRef>
+          <a:effectRef idx="0">
+            <a:schemeClr val="accent1"/>
+          </a:effectRef>
+          <a:fontRef idx="minor">
+            <a:schemeClr val="lt1"/>
+          </a:fontRef>
+        </p:style>
+        <p:txBody>
+          <a:bodyPr rtlCol="0" anchor="ctr"/>
+          <a:lstStyle/>
+          <a:p>
+            <a:pPr algn="ctr"/>
+            <a:endParaRPr lang="pt-PT"/>
+          </a:p>
+        </p:txBody>
+      </p:sp>
+      <p:cxnSp>
+        <p:nvCxnSpPr>
+          <p:cNvPr id="34" name="Conexão: Curva 33">
+            <a:extLst>
+              <a:ext uri="{FF2B5EF4-FFF2-40B4-BE49-F238E27FC236}">
+                <a16:creationId xmlns:a16="http://schemas.microsoft.com/office/drawing/2014/main" id="{BBB060A0-E503-4A09-9EBD-A88EE5EBAB14}"/>
+              </a:ext>
+            </a:extLst>
+          </p:cNvPr>
+          <p:cNvCxnSpPr>
+            <a:cxnSpLocks/>
+            <a:stCxn id="24" idx="4"/>
+            <a:endCxn id="28" idx="1"/>
+          </p:cNvCxnSpPr>
+          <p:nvPr/>
+        </p:nvCxnSpPr>
+        <p:spPr>
+          <a:xfrm rot="5400000" flipH="1" flipV="1">
+            <a:off x="5050029" y="1555256"/>
+            <a:ext cx="864799" cy="3431099"/>
+          </a:xfrm>
+          <a:prstGeom prst="curvedConnector4">
+            <a:avLst>
+              <a:gd name="adj1" fmla="val -26434"/>
+              <a:gd name="adj2" fmla="val 54517"/>
+            </a:avLst>
+          </a:prstGeom>
+          <a:ln w="38100">
+            <a:tailEnd type="triangle"/>
+          </a:ln>
+        </p:spPr>
+        <p:style>
+          <a:lnRef idx="1">
+            <a:schemeClr val="accent1"/>
+          </a:lnRef>
+          <a:fillRef idx="0">
+            <a:schemeClr val="accent1"/>
+          </a:fillRef>
+          <a:effectRef idx="0">
+            <a:schemeClr val="accent1"/>
+          </a:effectRef>
+          <a:fontRef idx="minor">
+            <a:schemeClr val="tx1"/>
+          </a:fontRef>
+        </p:style>
+      </p:cxnSp>
+      <p:cxnSp>
+        <p:nvCxnSpPr>
+          <p:cNvPr id="38" name="Conexão: Curva 37">
+            <a:extLst>
+              <a:ext uri="{FF2B5EF4-FFF2-40B4-BE49-F238E27FC236}">
+                <a16:creationId xmlns:a16="http://schemas.microsoft.com/office/drawing/2014/main" id="{2F29CD62-34DE-4950-B9A1-A2A19899C3E4}"/>
+              </a:ext>
+            </a:extLst>
+          </p:cNvPr>
+          <p:cNvCxnSpPr>
+            <a:cxnSpLocks/>
+            <a:stCxn id="29" idx="3"/>
+            <a:endCxn id="14" idx="2"/>
+          </p:cNvCxnSpPr>
+          <p:nvPr/>
+        </p:nvCxnSpPr>
+        <p:spPr>
+          <a:xfrm flipH="1">
+            <a:off x="7960825" y="2836349"/>
+            <a:ext cx="2505947" cy="2383258"/>
+          </a:xfrm>
+          <a:prstGeom prst="curvedConnector5">
+            <a:avLst>
+              <a:gd name="adj1" fmla="val -9122"/>
+              <a:gd name="adj2" fmla="val 70241"/>
+              <a:gd name="adj3" fmla="val 109122"/>
+            </a:avLst>
+          </a:prstGeom>
+          <a:ln w="38100">
+            <a:tailEnd type="triangle"/>
+          </a:ln>
+        </p:spPr>
+        <p:style>
+          <a:lnRef idx="1">
+            <a:schemeClr val="accent1"/>
+          </a:lnRef>
+          <a:fillRef idx="0">
+            <a:schemeClr val="accent1"/>
+          </a:fillRef>
+          <a:effectRef idx="0">
+            <a:schemeClr val="accent1"/>
+          </a:effectRef>
+          <a:fontRef idx="minor">
+            <a:schemeClr val="tx1"/>
+          </a:fontRef>
+        </p:style>
+      </p:cxnSp>
+      <p:sp>
+        <p:nvSpPr>
+          <p:cNvPr id="44" name="CaixaDeTexto 43">
+            <a:extLst>
+              <a:ext uri="{FF2B5EF4-FFF2-40B4-BE49-F238E27FC236}">
+                <a16:creationId xmlns:a16="http://schemas.microsoft.com/office/drawing/2014/main" id="{AD1EED88-FDDD-4C24-8F90-A742333EDB78}"/>
+              </a:ext>
+            </a:extLst>
+          </p:cNvPr>
+          <p:cNvSpPr txBox="1"/>
+          <p:nvPr/>
+        </p:nvSpPr>
+        <p:spPr>
+          <a:xfrm>
+            <a:off x="1068610" y="3936961"/>
+            <a:ext cx="3925412" cy="276999"/>
+          </a:xfrm>
+          <a:prstGeom prst="rect">
+            <a:avLst/>
+          </a:prstGeom>
+          <a:noFill/>
+        </p:spPr>
+        <p:txBody>
+          <a:bodyPr wrap="square" rtlCol="0">
+            <a:spAutoFit/>
+          </a:bodyPr>
+          <a:lstStyle/>
+          <a:p>
+            <a:r>
+              <a:rPr lang="pt-PT" sz="1200" dirty="0"/>
+              <a:t>Função que cria e adiciona um </a:t>
+            </a:r>
+            <a:r>
+              <a:rPr lang="pt-PT" sz="1200" i="1" dirty="0" err="1"/>
+              <a:t>streamer</a:t>
+            </a:r>
+            <a:r>
+              <a:rPr lang="pt-PT" sz="1200" dirty="0"/>
+              <a:t> ao </a:t>
+            </a:r>
+            <a:r>
+              <a:rPr lang="pt-PT" sz="1200" i="1" dirty="0" err="1"/>
+              <a:t>streamz</a:t>
+            </a:r>
+            <a:r>
+              <a:rPr lang="pt-PT" sz="1200" i="1" dirty="0"/>
+              <a:t>.</a:t>
+            </a:r>
+          </a:p>
+        </p:txBody>
+      </p:sp>
+      <p:sp>
+        <p:nvSpPr>
+          <p:cNvPr id="45" name="CaixaDeTexto 44">
+            <a:extLst>
+              <a:ext uri="{FF2B5EF4-FFF2-40B4-BE49-F238E27FC236}">
+                <a16:creationId xmlns:a16="http://schemas.microsoft.com/office/drawing/2014/main" id="{B1CA2ADB-496F-4A40-95CE-6723B34AD01A}"/>
+              </a:ext>
+            </a:extLst>
+          </p:cNvPr>
+          <p:cNvSpPr txBox="1"/>
+          <p:nvPr/>
+        </p:nvSpPr>
+        <p:spPr>
+          <a:xfrm>
+            <a:off x="7118765" y="3928602"/>
+            <a:ext cx="3348007" cy="276999"/>
+          </a:xfrm>
+          <a:prstGeom prst="rect">
+            <a:avLst/>
+          </a:prstGeom>
+          <a:noFill/>
+        </p:spPr>
+        <p:txBody>
+          <a:bodyPr wrap="square" rtlCol="0">
+            <a:spAutoFit/>
+          </a:bodyPr>
+          <a:lstStyle/>
+          <a:p>
+            <a:r>
+              <a:rPr lang="pt-PT" sz="1200" dirty="0"/>
+              <a:t>Construtor da classe </a:t>
+            </a:r>
+            <a:r>
+              <a:rPr lang="pt-PT" sz="1200" i="1" dirty="0"/>
+              <a:t>Date.</a:t>
+            </a:r>
+          </a:p>
+        </p:txBody>
+      </p:sp>
+      <p:sp>
+        <p:nvSpPr>
+          <p:cNvPr id="47" name="CaixaDeTexto 46">
+            <a:extLst>
+              <a:ext uri="{FF2B5EF4-FFF2-40B4-BE49-F238E27FC236}">
+                <a16:creationId xmlns:a16="http://schemas.microsoft.com/office/drawing/2014/main" id="{864D4DD7-F44A-40EE-9C29-76A7BA36BC22}"/>
+              </a:ext>
+            </a:extLst>
+          </p:cNvPr>
+          <p:cNvSpPr txBox="1"/>
+          <p:nvPr/>
+        </p:nvSpPr>
+        <p:spPr>
+          <a:xfrm>
+            <a:off x="200818" y="6242699"/>
+            <a:ext cx="3740215" cy="461665"/>
+          </a:xfrm>
+          <a:prstGeom prst="rect">
+            <a:avLst/>
+          </a:prstGeom>
+          <a:noFill/>
+        </p:spPr>
+        <p:txBody>
+          <a:bodyPr wrap="square" rtlCol="0">
+            <a:spAutoFit/>
+          </a:bodyPr>
+          <a:lstStyle/>
+          <a:p>
+            <a:r>
+              <a:rPr lang="pt-PT" sz="1200" dirty="0"/>
+              <a:t>Tentativa de criação de </a:t>
+            </a:r>
+            <a:r>
+              <a:rPr lang="pt-PT" sz="1200" i="1" dirty="0" err="1"/>
+              <a:t>streamer</a:t>
+            </a:r>
+            <a:r>
+              <a:rPr lang="pt-PT" sz="1200" dirty="0"/>
+              <a:t> na </a:t>
+            </a:r>
+            <a:r>
+              <a:rPr lang="pt-PT" sz="1200" i="1" dirty="0"/>
+              <a:t>framework</a:t>
+            </a:r>
+            <a:r>
+              <a:rPr lang="pt-PT" sz="1200" dirty="0"/>
+              <a:t> com nome anteriormente usado.</a:t>
+            </a:r>
+            <a:endParaRPr lang="pt-PT" sz="1200" i="1" dirty="0"/>
+          </a:p>
+        </p:txBody>
+      </p:sp>
+      <p:sp>
+        <p:nvSpPr>
+          <p:cNvPr id="48" name="CaixaDeTexto 47">
+            <a:extLst>
+              <a:ext uri="{FF2B5EF4-FFF2-40B4-BE49-F238E27FC236}">
+                <a16:creationId xmlns:a16="http://schemas.microsoft.com/office/drawing/2014/main" id="{5D08D028-DE8E-4BFC-BCFA-B8A1F268E6B8}"/>
+              </a:ext>
+            </a:extLst>
+          </p:cNvPr>
+          <p:cNvSpPr txBox="1"/>
+          <p:nvPr/>
+        </p:nvSpPr>
+        <p:spPr>
+          <a:xfrm>
+            <a:off x="4173419" y="6229400"/>
+            <a:ext cx="3740215" cy="461665"/>
+          </a:xfrm>
+          <a:prstGeom prst="rect">
+            <a:avLst/>
+          </a:prstGeom>
+          <a:noFill/>
+        </p:spPr>
+        <p:txBody>
+          <a:bodyPr wrap="square" rtlCol="0">
+            <a:spAutoFit/>
+          </a:bodyPr>
+          <a:lstStyle/>
+          <a:p>
+            <a:r>
+              <a:rPr lang="pt-PT" sz="1200" dirty="0"/>
+              <a:t>Tentativa de criação de </a:t>
+            </a:r>
+            <a:r>
+              <a:rPr lang="pt-PT" sz="1200" i="1" dirty="0" err="1"/>
+              <a:t>streamer</a:t>
+            </a:r>
+            <a:r>
+              <a:rPr lang="pt-PT" sz="1200" dirty="0"/>
+              <a:t> na </a:t>
+            </a:r>
+            <a:r>
+              <a:rPr lang="pt-PT" sz="1200" i="1" dirty="0"/>
+              <a:t>framework</a:t>
+            </a:r>
+            <a:r>
+              <a:rPr lang="pt-PT" sz="1200" dirty="0"/>
+              <a:t> sem cumprir idade mínima de 15 anos.</a:t>
+            </a:r>
+            <a:endParaRPr lang="pt-PT" sz="1200" i="1" dirty="0"/>
+          </a:p>
+        </p:txBody>
+      </p:sp>
+      <p:sp>
+        <p:nvSpPr>
+          <p:cNvPr id="49" name="CaixaDeTexto 48">
+            <a:extLst>
+              <a:ext uri="{FF2B5EF4-FFF2-40B4-BE49-F238E27FC236}">
+                <a16:creationId xmlns:a16="http://schemas.microsoft.com/office/drawing/2014/main" id="{5C3CE8DF-6D8D-4774-8CC5-6A5FDE46ACFF}"/>
+              </a:ext>
+            </a:extLst>
+          </p:cNvPr>
+          <p:cNvSpPr txBox="1"/>
+          <p:nvPr/>
+        </p:nvSpPr>
+        <p:spPr>
+          <a:xfrm>
+            <a:off x="7892920" y="6241124"/>
+            <a:ext cx="3740215" cy="461665"/>
+          </a:xfrm>
+          <a:prstGeom prst="rect">
+            <a:avLst/>
+          </a:prstGeom>
+          <a:noFill/>
+        </p:spPr>
+        <p:txBody>
+          <a:bodyPr wrap="square" rtlCol="0">
+            <a:spAutoFit/>
+          </a:bodyPr>
+          <a:lstStyle/>
+          <a:p>
+            <a:r>
+              <a:rPr lang="pt-PT" sz="1200" dirty="0"/>
+              <a:t>Tentativa de criação de </a:t>
+            </a:r>
+            <a:r>
+              <a:rPr lang="pt-PT" sz="1200" i="1" dirty="0" err="1"/>
+              <a:t>streamer</a:t>
+            </a:r>
+            <a:r>
+              <a:rPr lang="pt-PT" sz="1200" dirty="0"/>
+              <a:t> na </a:t>
+            </a:r>
+            <a:r>
+              <a:rPr lang="pt-PT" sz="1200" i="1" dirty="0"/>
+              <a:t>framework </a:t>
+            </a:r>
+            <a:r>
+              <a:rPr lang="pt-PT" sz="1200" dirty="0"/>
+              <a:t>dando </a:t>
+            </a:r>
+            <a:r>
+              <a:rPr lang="pt-PT" sz="1200" i="1" dirty="0"/>
+              <a:t>input</a:t>
+            </a:r>
+            <a:r>
+              <a:rPr lang="pt-PT" sz="1200" dirty="0"/>
+              <a:t> de uma data mal formada.</a:t>
+            </a:r>
+          </a:p>
+        </p:txBody>
+      </p:sp>
+      <p:sp>
+        <p:nvSpPr>
+          <p:cNvPr id="50" name="CaixaDeTexto 49">
+            <a:extLst>
+              <a:ext uri="{FF2B5EF4-FFF2-40B4-BE49-F238E27FC236}">
+                <a16:creationId xmlns:a16="http://schemas.microsoft.com/office/drawing/2014/main" id="{6EE40E27-CA59-444D-9A76-AECFC1AC669D}"/>
+              </a:ext>
+            </a:extLst>
+          </p:cNvPr>
+          <p:cNvSpPr txBox="1"/>
+          <p:nvPr/>
+        </p:nvSpPr>
+        <p:spPr>
+          <a:xfrm>
+            <a:off x="10623873" y="1690688"/>
+            <a:ext cx="1282683" cy="830997"/>
+          </a:xfrm>
+          <a:prstGeom prst="rect">
+            <a:avLst/>
+          </a:prstGeom>
+          <a:noFill/>
+        </p:spPr>
+        <p:txBody>
+          <a:bodyPr wrap="square" rtlCol="0">
+            <a:spAutoFit/>
+          </a:bodyPr>
+          <a:lstStyle/>
+          <a:p>
+            <a:r>
+              <a:rPr lang="pt-PT" sz="1200" b="1" dirty="0"/>
+              <a:t>Nota</a:t>
+            </a:r>
+            <a:r>
+              <a:rPr lang="pt-PT" sz="1200" dirty="0"/>
+              <a:t>: Na criação de </a:t>
+            </a:r>
+            <a:r>
+              <a:rPr lang="pt-PT" sz="1200" i="1" dirty="0" err="1"/>
+              <a:t>viewers</a:t>
+            </a:r>
+            <a:r>
+              <a:rPr lang="pt-PT" sz="1200" dirty="0"/>
+              <a:t> o procedimento é semelhante.</a:t>
+            </a:r>
+            <a:endParaRPr lang="pt-PT" sz="1200" i="1" dirty="0"/>
+          </a:p>
+        </p:txBody>
+      </p:sp>
+    </p:spTree>
+    <p:extLst>
+      <p:ext uri="{BB962C8B-B14F-4D97-AF65-F5344CB8AC3E}">
+        <p14:creationId xmlns:p14="http://schemas.microsoft.com/office/powerpoint/2010/main" val="1397670778"/>
+      </p:ext>
+    </p:extLst>
+  </p:cSld>
+  <p:clrMapOvr>
+    <a:masterClrMapping/>
+  </p:clrMapOvr>
+</p:sld>
+</file>
+
+<file path=ppt/slides/slide8.xml><?xml version="1.0" encoding="utf-8"?>
+<p:sld xmlns:a="http://schemas.openxmlformats.org/drawingml/2006/main" xmlns:r="http://schemas.openxmlformats.org/officeDocument/2006/relationships" xmlns:p="http://schemas.openxmlformats.org/presentationml/2006/main">
+  <p:cSld>
     <p:bg>
       <p:bgPr>
         <a:solidFill>
@@ -13622,7 +16337,7 @@
                   </a:outerShdw>
                 </a:effectLst>
               </a:rPr>
-              <a:t>Funcionalidades implementadas</a:t>
+              <a:t>Funcionalidades Implementadas</a:t>
             </a:r>
           </a:p>
         </p:txBody>
@@ -13725,22 +16440,28 @@
           <a:p>
             <a:r>
               <a:rPr lang="pt-PT" sz="2200" dirty="0"/>
-              <a:t>StreamZ Framework, utiliza a classe StreamZ e as restantes relacionadas com esta última, tendo feito algumas adições:</a:t>
+              <a:t>Classe StreamZ, </a:t>
+            </a:r>
+            <a:r>
+              <a:rPr lang="pt-PT" sz="2200" dirty="0" err="1"/>
+              <a:t>User</a:t>
+            </a:r>
+            <a:r>
+              <a:rPr lang="pt-PT" sz="2200" dirty="0"/>
+              <a:t> e Stream, principais classes, com todas as funcionalidades </a:t>
+            </a:r>
+            <a:r>
+              <a:rPr lang="pt-PT" sz="2200" dirty="0" err="1"/>
+              <a:t>requesitadas</a:t>
+            </a:r>
+            <a:r>
+              <a:rPr lang="pt-PT" sz="2200" dirty="0"/>
+              <a:t> no problema inicial, tais como:</a:t>
             </a:r>
           </a:p>
           <a:p>
             <a:pPr lvl="1"/>
-            <a:r>
-              <a:rPr lang="pt-PT" sz="1800" dirty="0"/>
-              <a:t>Sistema de Login</a:t>
-            </a:r>
-          </a:p>
-          <a:p>
-            <a:pPr lvl="1"/>
-            <a:r>
-              <a:rPr lang="pt-PT" sz="1800" dirty="0"/>
-              <a:t>Passwords dos utilizadores encriptadas, através do algoritmo sha256</a:t>
-            </a:r>
+            <a:endParaRPr lang="pt-PT" sz="1800" dirty="0"/>
           </a:p>
         </p:txBody>
       </p:sp>
@@ -13748,482 +16469,6 @@
     <p:extLst>
       <p:ext uri="{BB962C8B-B14F-4D97-AF65-F5344CB8AC3E}">
         <p14:creationId xmlns:p14="http://schemas.microsoft.com/office/powerpoint/2010/main" val="940220378"/>
-      </p:ext>
-    </p:extLst>
-  </p:cSld>
-  <p:clrMapOvr>
-    <a:masterClrMapping/>
-  </p:clrMapOvr>
-</p:sld>
-</file>
-
-<file path=ppt/slides/slide8.xml><?xml version="1.0" encoding="utf-8"?>
-<p:sld xmlns:a="http://schemas.openxmlformats.org/drawingml/2006/main" xmlns:r="http://schemas.openxmlformats.org/officeDocument/2006/relationships" xmlns:p="http://schemas.openxmlformats.org/presentationml/2006/main">
-  <p:cSld>
-    <p:bg>
-      <p:bgPr>
-        <a:solidFill>
-          <a:schemeClr val="bg1"/>
-        </a:solidFill>
-        <a:effectLst/>
-      </p:bgPr>
-    </p:bg>
-    <p:spTree>
-      <p:nvGrpSpPr>
-        <p:cNvPr id="1" name=""/>
-        <p:cNvGrpSpPr/>
-        <p:nvPr/>
-      </p:nvGrpSpPr>
-      <p:grpSpPr>
-        <a:xfrm>
-          <a:off x="0" y="0"/>
-          <a:ext cx="0" cy="0"/>
-          <a:chOff x="0" y="0"/>
-          <a:chExt cx="0" cy="0"/>
-        </a:xfrm>
-      </p:grpSpPr>
-      <p:sp>
-        <p:nvSpPr>
-          <p:cNvPr id="10" name="Rectangle 9">
-            <a:extLst>
-              <a:ext uri="{FF2B5EF4-FFF2-40B4-BE49-F238E27FC236}">
-                <a16:creationId xmlns:a16="http://schemas.microsoft.com/office/drawing/2014/main" id="{35555856-9970-4BC3-9AA9-6A917F53AFBD}"/>
-              </a:ext>
-              <a:ext uri="{C183D7F6-B498-43B3-948B-1728B52AA6E4}">
-                <adec:decorative xmlns:adec="http://schemas.microsoft.com/office/drawing/2017/decorative" val="1"/>
-              </a:ext>
-            </a:extLst>
-          </p:cNvPr>
-          <p:cNvSpPr>
-            <a:spLocks noGrp="1" noRot="1" noChangeAspect="1" noMove="1" noResize="1" noEditPoints="1" noAdjustHandles="1" noChangeArrowheads="1" noChangeShapeType="1" noTextEdit="1"/>
-          </p:cNvSpPr>
-          <p:nvPr>
-            <p:extLst>
-              <p:ext uri="{386F3935-93C4-4BCD-93E2-E3B085C9AB24}">
-                <p16:designElem xmlns:p16="http://schemas.microsoft.com/office/powerpoint/2015/main" val="1"/>
-              </p:ext>
-            </p:extLst>
-          </p:nvPr>
-        </p:nvSpPr>
-        <p:spPr>
-          <a:xfrm flipH="1">
-            <a:off x="0" y="0"/>
-            <a:ext cx="6421721" cy="6858000"/>
-          </a:xfrm>
-          <a:prstGeom prst="rect">
-            <a:avLst/>
-          </a:prstGeom>
-          <a:gradFill>
-            <a:gsLst>
-              <a:gs pos="0">
-                <a:schemeClr val="accent1">
-                  <a:lumMod val="100000"/>
-                  <a:alpha val="82000"/>
-                </a:schemeClr>
-              </a:gs>
-              <a:gs pos="25000">
-                <a:schemeClr val="accent1">
-                  <a:alpha val="60000"/>
-                </a:schemeClr>
-              </a:gs>
-              <a:gs pos="94000">
-                <a:schemeClr val="bg2">
-                  <a:lumMod val="75000"/>
-                </a:schemeClr>
-              </a:gs>
-              <a:gs pos="100000">
-                <a:schemeClr val="bg2">
-                  <a:lumMod val="75000"/>
-                </a:schemeClr>
-              </a:gs>
-            </a:gsLst>
-            <a:lin ang="4200000" scaled="0"/>
-          </a:gradFill>
-          <a:ln>
-            <a:noFill/>
-          </a:ln>
-        </p:spPr>
-        <p:style>
-          <a:lnRef idx="2">
-            <a:schemeClr val="accent1">
-              <a:shade val="50000"/>
-            </a:schemeClr>
-          </a:lnRef>
-          <a:fillRef idx="1">
-            <a:schemeClr val="accent1"/>
-          </a:fillRef>
-          <a:effectRef idx="0">
-            <a:schemeClr val="accent1"/>
-          </a:effectRef>
-          <a:fontRef idx="minor">
-            <a:schemeClr val="lt1"/>
-          </a:fontRef>
-        </p:style>
-        <p:txBody>
-          <a:bodyPr rtlCol="0" anchor="ctr"/>
-          <a:lstStyle/>
-          <a:p>
-            <a:pPr algn="ctr"/>
-            <a:endParaRPr lang="en-US"/>
-          </a:p>
-        </p:txBody>
-      </p:sp>
-      <p:pic>
-        <p:nvPicPr>
-          <p:cNvPr id="12" name="Picture 11">
-            <a:extLst>
-              <a:ext uri="{FF2B5EF4-FFF2-40B4-BE49-F238E27FC236}">
-                <a16:creationId xmlns:a16="http://schemas.microsoft.com/office/drawing/2014/main" id="{7F487851-BFAF-46D8-A1ED-50CAD6E46F59}"/>
-              </a:ext>
-              <a:ext uri="{C183D7F6-B498-43B3-948B-1728B52AA6E4}">
-                <adec:decorative xmlns:adec="http://schemas.microsoft.com/office/drawing/2017/decorative" val="1"/>
-              </a:ext>
-            </a:extLst>
-          </p:cNvPr>
-          <p:cNvPicPr>
-            <a:picLocks noGrp="1" noRot="1" noChangeAspect="1" noMove="1" noResize="1" noEditPoints="1" noAdjustHandles="1" noChangeArrowheads="1" noChangeShapeType="1" noCrop="1"/>
-          </p:cNvPicPr>
-          <p:nvPr>
-            <p:extLst>
-              <p:ext uri="{386F3935-93C4-4BCD-93E2-E3B085C9AB24}">
-                <p16:designElem xmlns:p16="http://schemas.microsoft.com/office/powerpoint/2015/main" val="1"/>
-              </p:ext>
-            </p:extLst>
-          </p:nvPr>
-        </p:nvPicPr>
-        <p:blipFill>
-          <a:blip r:embed="rId2">
-            <a:extLst>
-              <a:ext uri="{28A0092B-C50C-407E-A947-70E740481C1C}">
-                <a14:useLocalDpi xmlns:a14="http://schemas.microsoft.com/office/drawing/2010/main" val="0"/>
-              </a:ext>
-            </a:extLst>
-          </a:blip>
-          <a:stretch>
-            <a:fillRect/>
-          </a:stretch>
-        </p:blipFill>
-        <p:spPr>
-          <a:xfrm>
-            <a:off x="0" y="0"/>
-            <a:ext cx="12192000" cy="6858000"/>
-          </a:xfrm>
-          <a:prstGeom prst="rect">
-            <a:avLst/>
-          </a:prstGeom>
-        </p:spPr>
-      </p:pic>
-      <p:sp>
-        <p:nvSpPr>
-          <p:cNvPr id="2" name="Título 1">
-            <a:extLst>
-              <a:ext uri="{FF2B5EF4-FFF2-40B4-BE49-F238E27FC236}">
-                <a16:creationId xmlns:a16="http://schemas.microsoft.com/office/drawing/2014/main" id="{D8FD4CB8-FBEF-418C-9210-810F790F7904}"/>
-              </a:ext>
-            </a:extLst>
-          </p:cNvPr>
-          <p:cNvSpPr>
-            <a:spLocks noGrp="1"/>
-          </p:cNvSpPr>
-          <p:nvPr>
-            <p:ph type="title"/>
-          </p:nvPr>
-        </p:nvSpPr>
-        <p:spPr>
-          <a:xfrm>
-            <a:off x="6590662" y="4267832"/>
-            <a:ext cx="4805996" cy="1297115"/>
-          </a:xfrm>
-        </p:spPr>
-        <p:txBody>
-          <a:bodyPr vert="horz" lIns="91440" tIns="45720" rIns="91440" bIns="45720" rtlCol="0" anchor="t">
-            <a:noAutofit/>
-          </a:bodyPr>
-          <a:lstStyle/>
-          <a:p>
-            <a:r>
-              <a:rPr lang="en-US" kern="1200" dirty="0">
-                <a:solidFill>
-                  <a:srgbClr val="000000"/>
-                </a:solidFill>
-                <a:effectLst>
-                  <a:outerShdw blurRad="38100" dist="38100" dir="2700000" algn="tl">
-                    <a:srgbClr val="000000">
-                      <a:alpha val="43137"/>
-                    </a:srgbClr>
-                  </a:outerShdw>
-                </a:effectLst>
-                <a:latin typeface="+mj-lt"/>
-                <a:ea typeface="+mj-ea"/>
-                <a:cs typeface="+mj-cs"/>
-              </a:rPr>
-              <a:t>Funcionalidade Destacada</a:t>
-            </a:r>
-          </a:p>
-        </p:txBody>
-      </p:sp>
-      <p:sp>
-        <p:nvSpPr>
-          <p:cNvPr id="14" name="Freeform 50">
-            <a:extLst>
-              <a:ext uri="{FF2B5EF4-FFF2-40B4-BE49-F238E27FC236}">
-                <a16:creationId xmlns:a16="http://schemas.microsoft.com/office/drawing/2014/main" id="{13722DD7-BA73-4776-93A3-94491FEF7260}"/>
-              </a:ext>
-              <a:ext uri="{C183D7F6-B498-43B3-948B-1728B52AA6E4}">
-                <adec:decorative xmlns:adec="http://schemas.microsoft.com/office/drawing/2017/decorative" val="1"/>
-              </a:ext>
-            </a:extLst>
-          </p:cNvPr>
-          <p:cNvSpPr>
-            <a:spLocks noGrp="1" noRot="1" noChangeAspect="1" noMove="1" noResize="1" noEditPoints="1" noAdjustHandles="1" noChangeArrowheads="1" noChangeShapeType="1" noTextEdit="1"/>
-          </p:cNvSpPr>
-          <p:nvPr>
-            <p:extLst>
-              <p:ext uri="{386F3935-93C4-4BCD-93E2-E3B085C9AB24}">
-                <p16:designElem xmlns:p16="http://schemas.microsoft.com/office/powerpoint/2015/main" val="1"/>
-              </p:ext>
-            </p:extLst>
-          </p:nvPr>
-        </p:nvSpPr>
-        <p:spPr>
-          <a:xfrm flipH="1">
-            <a:off x="0" y="581159"/>
-            <a:ext cx="5464879" cy="6276841"/>
-          </a:xfrm>
-          <a:custGeom>
-            <a:avLst/>
-            <a:gdLst>
-              <a:gd name="connsiteX0" fmla="*/ 3299930 w 5464879"/>
-              <a:gd name="connsiteY0" fmla="*/ 0 h 6276841"/>
-              <a:gd name="connsiteX1" fmla="*/ 5398992 w 5464879"/>
-              <a:gd name="connsiteY1" fmla="*/ 753544 h 6276841"/>
-              <a:gd name="connsiteX2" fmla="*/ 5464879 w 5464879"/>
-              <a:gd name="connsiteY2" fmla="*/ 813426 h 6276841"/>
-              <a:gd name="connsiteX3" fmla="*/ 5464879 w 5464879"/>
-              <a:gd name="connsiteY3" fmla="*/ 5786434 h 6276841"/>
-              <a:gd name="connsiteX4" fmla="*/ 5398992 w 5464879"/>
-              <a:gd name="connsiteY4" fmla="*/ 5846317 h 6276841"/>
-              <a:gd name="connsiteX5" fmla="*/ 4872873 w 5464879"/>
-              <a:gd name="connsiteY5" fmla="*/ 6201577 h 6276841"/>
-              <a:gd name="connsiteX6" fmla="*/ 4716632 w 5464879"/>
-              <a:gd name="connsiteY6" fmla="*/ 6276841 h 6276841"/>
-              <a:gd name="connsiteX7" fmla="*/ 1883227 w 5464879"/>
-              <a:gd name="connsiteY7" fmla="*/ 6276841 h 6276841"/>
-              <a:gd name="connsiteX8" fmla="*/ 1726987 w 5464879"/>
-              <a:gd name="connsiteY8" fmla="*/ 6201577 h 6276841"/>
-              <a:gd name="connsiteX9" fmla="*/ 0 w 5464879"/>
-              <a:gd name="connsiteY9" fmla="*/ 3299930 h 6276841"/>
-              <a:gd name="connsiteX10" fmla="*/ 3299930 w 5464879"/>
-              <a:gd name="connsiteY10" fmla="*/ 0 h 6276841"/>
-            </a:gdLst>
-            <a:ahLst/>
-            <a:cxnLst>
-              <a:cxn ang="0">
-                <a:pos x="connsiteX0" y="connsiteY0"/>
-              </a:cxn>
-              <a:cxn ang="0">
-                <a:pos x="connsiteX1" y="connsiteY1"/>
-              </a:cxn>
-              <a:cxn ang="0">
-                <a:pos x="connsiteX2" y="connsiteY2"/>
-              </a:cxn>
-              <a:cxn ang="0">
-                <a:pos x="connsiteX3" y="connsiteY3"/>
-              </a:cxn>
-              <a:cxn ang="0">
-                <a:pos x="connsiteX4" y="connsiteY4"/>
-              </a:cxn>
-              <a:cxn ang="0">
-                <a:pos x="connsiteX5" y="connsiteY5"/>
-              </a:cxn>
-              <a:cxn ang="0">
-                <a:pos x="connsiteX6" y="connsiteY6"/>
-              </a:cxn>
-              <a:cxn ang="0">
-                <a:pos x="connsiteX7" y="connsiteY7"/>
-              </a:cxn>
-              <a:cxn ang="0">
-                <a:pos x="connsiteX8" y="connsiteY8"/>
-              </a:cxn>
-              <a:cxn ang="0">
-                <a:pos x="connsiteX9" y="connsiteY9"/>
-              </a:cxn>
-              <a:cxn ang="0">
-                <a:pos x="connsiteX10" y="connsiteY10"/>
-              </a:cxn>
-            </a:cxnLst>
-            <a:rect l="l" t="t" r="r" b="b"/>
-            <a:pathLst>
-              <a:path w="5464879" h="6276841">
-                <a:moveTo>
-                  <a:pt x="3299930" y="0"/>
-                </a:moveTo>
-                <a:cubicBezTo>
-                  <a:pt x="4097274" y="0"/>
-                  <a:pt x="4828569" y="282789"/>
-                  <a:pt x="5398992" y="753544"/>
-                </a:cubicBezTo>
-                <a:lnTo>
-                  <a:pt x="5464879" y="813426"/>
-                </a:lnTo>
-                <a:lnTo>
-                  <a:pt x="5464879" y="5786434"/>
-                </a:lnTo>
-                <a:lnTo>
-                  <a:pt x="5398992" y="5846317"/>
-                </a:lnTo>
-                <a:cubicBezTo>
-                  <a:pt x="5236014" y="5980818"/>
-                  <a:pt x="5059904" y="6099975"/>
-                  <a:pt x="4872873" y="6201577"/>
-                </a:cubicBezTo>
-                <a:lnTo>
-                  <a:pt x="4716632" y="6276841"/>
-                </a:lnTo>
-                <a:lnTo>
-                  <a:pt x="1883227" y="6276841"/>
-                </a:lnTo>
-                <a:lnTo>
-                  <a:pt x="1726987" y="6201577"/>
-                </a:lnTo>
-                <a:cubicBezTo>
-                  <a:pt x="698316" y="5642769"/>
-                  <a:pt x="0" y="4552900"/>
-                  <a:pt x="0" y="3299930"/>
-                </a:cubicBezTo>
-                <a:cubicBezTo>
-                  <a:pt x="0" y="1477429"/>
-                  <a:pt x="1477429" y="0"/>
-                  <a:pt x="3299930" y="0"/>
-                </a:cubicBezTo>
-                <a:close/>
-              </a:path>
-            </a:pathLst>
-          </a:custGeom>
-          <a:solidFill>
-            <a:srgbClr val="FFFFFF"/>
-          </a:solidFill>
-          <a:ln>
-            <a:gradFill>
-              <a:gsLst>
-                <a:gs pos="0">
-                  <a:schemeClr val="accent1">
-                    <a:lumMod val="40000"/>
-                    <a:lumOff val="60000"/>
-                  </a:schemeClr>
-                </a:gs>
-                <a:gs pos="23000">
-                  <a:schemeClr val="accent1">
-                    <a:lumMod val="45000"/>
-                    <a:lumOff val="55000"/>
-                  </a:schemeClr>
-                </a:gs>
-                <a:gs pos="83000">
-                  <a:schemeClr val="bg2">
-                    <a:lumMod val="75000"/>
-                  </a:schemeClr>
-                </a:gs>
-                <a:gs pos="100000">
-                  <a:schemeClr val="bg2">
-                    <a:lumMod val="75000"/>
-                  </a:schemeClr>
-                </a:gs>
-              </a:gsLst>
-              <a:lin ang="5400000" scaled="1"/>
-            </a:gradFill>
-          </a:ln>
-        </p:spPr>
-        <p:style>
-          <a:lnRef idx="2">
-            <a:schemeClr val="accent1">
-              <a:shade val="50000"/>
-            </a:schemeClr>
-          </a:lnRef>
-          <a:fillRef idx="1">
-            <a:schemeClr val="accent1"/>
-          </a:fillRef>
-          <a:effectRef idx="0">
-            <a:schemeClr val="accent1"/>
-          </a:effectRef>
-          <a:fontRef idx="minor">
-            <a:schemeClr val="lt1"/>
-          </a:fontRef>
-        </p:style>
-        <p:txBody>
-          <a:bodyPr wrap="square" rtlCol="0" anchor="ctr">
-            <a:noAutofit/>
-          </a:bodyPr>
-          <a:lstStyle/>
-          <a:p>
-            <a:pPr algn="ctr"/>
-            <a:endParaRPr lang="en-US"/>
-          </a:p>
-        </p:txBody>
-      </p:sp>
-      <p:pic>
-        <p:nvPicPr>
-          <p:cNvPr id="7" name="Graphic 6" descr="Marca de Verificação">
-            <a:extLst>
-              <a:ext uri="{FF2B5EF4-FFF2-40B4-BE49-F238E27FC236}">
-                <a16:creationId xmlns:a16="http://schemas.microsoft.com/office/drawing/2014/main" id="{99BC7C11-7C74-4B78-A8F9-AA7E45740460}"/>
-              </a:ext>
-            </a:extLst>
-          </p:cNvPr>
-          <p:cNvPicPr>
-            <a:picLocks noChangeAspect="1"/>
-          </p:cNvPicPr>
-          <p:nvPr/>
-        </p:nvPicPr>
-        <p:blipFill>
-          <a:blip r:embed="rId3">
-            <a:extLst>
-              <a:ext uri="{28A0092B-C50C-407E-A947-70E740481C1C}">
-                <a14:useLocalDpi xmlns:a14="http://schemas.microsoft.com/office/drawing/2010/main" val="0"/>
-              </a:ext>
-              <a:ext uri="{96DAC541-7B7A-43D3-8B79-37D633B846F1}">
-                <asvg:svgBlip xmlns:asvg="http://schemas.microsoft.com/office/drawing/2016/SVG/main" r:embed="rId4"/>
-              </a:ext>
-            </a:extLst>
-          </a:blip>
-          <a:stretch>
-            <a:fillRect/>
-          </a:stretch>
-        </p:blipFill>
-        <p:spPr>
-          <a:xfrm>
-            <a:off x="9451128" y="4806957"/>
-            <a:ext cx="1044152" cy="1044152"/>
-          </a:xfrm>
-          <a:custGeom>
-            <a:avLst/>
-            <a:gdLst/>
-            <a:ahLst/>
-            <a:cxnLst/>
-            <a:rect l="l" t="t" r="r" b="b"/>
-            <a:pathLst>
-              <a:path w="4141760" h="4377846">
-                <a:moveTo>
-                  <a:pt x="0" y="0"/>
-                </a:moveTo>
-                <a:lnTo>
-                  <a:pt x="4141760" y="0"/>
-                </a:lnTo>
-                <a:lnTo>
-                  <a:pt x="4141760" y="4377846"/>
-                </a:lnTo>
-                <a:lnTo>
-                  <a:pt x="0" y="4377846"/>
-                </a:lnTo>
-                <a:close/>
-              </a:path>
-            </a:pathLst>
-          </a:custGeom>
-        </p:spPr>
-      </p:pic>
-    </p:spTree>
-    <p:extLst>
-      <p:ext uri="{BB962C8B-B14F-4D97-AF65-F5344CB8AC3E}">
-        <p14:creationId xmlns:p14="http://schemas.microsoft.com/office/powerpoint/2010/main" val="1346403632"/>
       </p:ext>
     </p:extLst>
   </p:cSld>
@@ -14263,7 +16508,7 @@
           <p:cNvPr id="8" name="Rectangle 7">
             <a:extLst>
               <a:ext uri="{FF2B5EF4-FFF2-40B4-BE49-F238E27FC236}">
-                <a16:creationId xmlns:a16="http://schemas.microsoft.com/office/drawing/2014/main" id="{1C799903-48D5-4A31-A1A2-541072D9771E}"/>
+                <a16:creationId xmlns:a16="http://schemas.microsoft.com/office/drawing/2014/main" id="{DAF1966E-FD40-4A4A-B61B-C4DF7FA05F06}"/>
               </a:ext>
               <a:ext uri="{C183D7F6-B498-43B3-948B-1728B52AA6E4}">
                 <adec:decorative xmlns:adec="http://schemas.microsoft.com/office/drawing/2017/decorative" val="1"/>
@@ -14284,7 +16529,7 @@
         <p:spPr>
           <a:xfrm>
             <a:off x="0" y="0"/>
-            <a:ext cx="12192002" cy="6858000"/>
+            <a:ext cx="12192000" cy="6858000"/>
           </a:xfrm>
           <a:prstGeom prst="rect">
             <a:avLst/>
@@ -14320,10 +16565,10 @@
       </p:sp>
       <p:sp useBgFill="1">
         <p:nvSpPr>
-          <p:cNvPr id="10" name="Freeform: Shape 9">
-            <a:extLst>
-              <a:ext uri="{FF2B5EF4-FFF2-40B4-BE49-F238E27FC236}">
-                <a16:creationId xmlns:a16="http://schemas.microsoft.com/office/drawing/2014/main" id="{8EFFF109-FC58-4FD3-BE05-9775A1310F55}"/>
+          <p:cNvPr id="10" name="Rectangle 9">
+            <a:extLst>
+              <a:ext uri="{FF2B5EF4-FFF2-40B4-BE49-F238E27FC236}">
+                <a16:creationId xmlns:a16="http://schemas.microsoft.com/office/drawing/2014/main" id="{047BFA19-D45E-416B-A404-7AF2F3F27017}"/>
               </a:ext>
               <a:ext uri="{C183D7F6-B498-43B3-948B-1728B52AA6E4}">
                 <adec:decorative xmlns:adec="http://schemas.microsoft.com/office/drawing/2017/decorative" val="1"/>
@@ -14343,90 +16588,19 @@
         </p:nvSpPr>
         <p:spPr>
           <a:xfrm>
-            <a:off x="-1" y="0"/>
-            <a:ext cx="4818889" cy="6858000"/>
-          </a:xfrm>
-          <a:custGeom>
+            <a:off x="558209" y="0"/>
+            <a:ext cx="11167447" cy="2018806"/>
+          </a:xfrm>
+          <a:prstGeom prst="rect">
             <a:avLst/>
-            <a:gdLst>
-              <a:gd name="connsiteX0" fmla="*/ 0 w 4818889"/>
-              <a:gd name="connsiteY0" fmla="*/ 0 h 6858000"/>
-              <a:gd name="connsiteX1" fmla="*/ 3605911 w 4818889"/>
-              <a:gd name="connsiteY1" fmla="*/ 0 h 6858000"/>
-              <a:gd name="connsiteX2" fmla="*/ 3668894 w 4818889"/>
-              <a:gd name="connsiteY2" fmla="*/ 69271 h 6858000"/>
-              <a:gd name="connsiteX3" fmla="*/ 4818889 w 4818889"/>
-              <a:gd name="connsiteY3" fmla="*/ 3429000 h 6858000"/>
-              <a:gd name="connsiteX4" fmla="*/ 3668894 w 4818889"/>
-              <a:gd name="connsiteY4" fmla="*/ 6788730 h 6858000"/>
-              <a:gd name="connsiteX5" fmla="*/ 3605911 w 4818889"/>
-              <a:gd name="connsiteY5" fmla="*/ 6858000 h 6858000"/>
-              <a:gd name="connsiteX6" fmla="*/ 0 w 4818889"/>
-              <a:gd name="connsiteY6" fmla="*/ 6858000 h 6858000"/>
-            </a:gdLst>
-            <a:ahLst/>
-            <a:cxnLst>
-              <a:cxn ang="0">
-                <a:pos x="connsiteX0" y="connsiteY0"/>
-              </a:cxn>
-              <a:cxn ang="0">
-                <a:pos x="connsiteX1" y="connsiteY1"/>
-              </a:cxn>
-              <a:cxn ang="0">
-                <a:pos x="connsiteX2" y="connsiteY2"/>
-              </a:cxn>
-              <a:cxn ang="0">
-                <a:pos x="connsiteX3" y="connsiteY3"/>
-              </a:cxn>
-              <a:cxn ang="0">
-                <a:pos x="connsiteX4" y="connsiteY4"/>
-              </a:cxn>
-              <a:cxn ang="0">
-                <a:pos x="connsiteX5" y="connsiteY5"/>
-              </a:cxn>
-              <a:cxn ang="0">
-                <a:pos x="connsiteX6" y="connsiteY6"/>
-              </a:cxn>
-            </a:cxnLst>
-            <a:rect l="l" t="t" r="r" b="b"/>
-            <a:pathLst>
-              <a:path w="4818889" h="6858000">
-                <a:moveTo>
-                  <a:pt x="0" y="0"/>
-                </a:moveTo>
-                <a:lnTo>
-                  <a:pt x="3605911" y="0"/>
-                </a:lnTo>
-                <a:lnTo>
-                  <a:pt x="3668894" y="69271"/>
-                </a:lnTo>
-                <a:cubicBezTo>
-                  <a:pt x="4379420" y="929100"/>
-                  <a:pt x="4818889" y="2116944"/>
-                  <a:pt x="4818889" y="3429000"/>
-                </a:cubicBezTo>
-                <a:cubicBezTo>
-                  <a:pt x="4818889" y="4741056"/>
-                  <a:pt x="4379420" y="5928900"/>
-                  <a:pt x="3668894" y="6788730"/>
-                </a:cubicBezTo>
-                <a:lnTo>
-                  <a:pt x="3605911" y="6858000"/>
-                </a:lnTo>
-                <a:lnTo>
-                  <a:pt x="0" y="6858000"/>
-                </a:lnTo>
-                <a:close/>
-              </a:path>
-            </a:pathLst>
-          </a:custGeom>
+          </a:prstGeom>
           <a:ln w="9525">
             <a:solidFill>
-              <a:srgbClr val="E6E6E6"/>
+              <a:srgbClr val="E1E1E1"/>
             </a:solidFill>
           </a:ln>
           <a:effectLst>
-            <a:outerShdw blurRad="50800" dist="38100" algn="l" rotWithShape="0">
+            <a:outerShdw blurRad="50800" dist="38100" dir="2700000" algn="tl" rotWithShape="0">
               <a:schemeClr val="bg1">
                 <a:lumMod val="85000"/>
                 <a:alpha val="50000"/>
@@ -14451,9 +16625,7 @@
           </a:fontRef>
         </p:style>
         <p:txBody>
-          <a:bodyPr wrap="square" rtlCol="0" anchor="ctr">
-            <a:noAutofit/>
-          </a:bodyPr>
+          <a:bodyPr rtlCol="0" anchor="ctr"/>
           <a:lstStyle/>
           <a:p>
             <a:pPr marL="0" marR="0" lvl="0" indent="0" algn="ctr" defTabSz="914400" rtl="0" eaLnBrk="1" fontAlgn="auto" latinLnBrk="0" hangingPunct="1">
@@ -14492,10 +16664,10 @@
       </p:sp>
       <p:sp useBgFill="1">
         <p:nvSpPr>
-          <p:cNvPr id="12" name="Freeform: Shape 11">
-            <a:extLst>
-              <a:ext uri="{FF2B5EF4-FFF2-40B4-BE49-F238E27FC236}">
-                <a16:creationId xmlns:a16="http://schemas.microsoft.com/office/drawing/2014/main" id="{E1B96AD6-92A9-4273-A62B-96A1C3E0BA95}"/>
+          <p:cNvPr id="12" name="Rectangle 11">
+            <a:extLst>
+              <a:ext uri="{FF2B5EF4-FFF2-40B4-BE49-F238E27FC236}">
+                <a16:creationId xmlns:a16="http://schemas.microsoft.com/office/drawing/2014/main" id="{8E0105E7-23DB-4CF2-8258-FF47C7620F6E}"/>
               </a:ext>
               <a:ext uri="{C183D7F6-B498-43B3-948B-1728B52AA6E4}">
                 <adec:decorative xmlns:adec="http://schemas.microsoft.com/office/drawing/2017/decorative" val="1"/>
@@ -14515,83 +16687,12 @@
         </p:nvSpPr>
         <p:spPr>
           <a:xfrm>
-            <a:off x="1" y="0"/>
-            <a:ext cx="4811477" cy="6858000"/>
-          </a:xfrm>
-          <a:custGeom>
+            <a:off x="566928" y="0"/>
+            <a:ext cx="11155680" cy="2011680"/>
+          </a:xfrm>
+          <a:prstGeom prst="rect">
             <a:avLst/>
-            <a:gdLst>
-              <a:gd name="connsiteX0" fmla="*/ 0 w 4811477"/>
-              <a:gd name="connsiteY0" fmla="*/ 0 h 6858000"/>
-              <a:gd name="connsiteX1" fmla="*/ 3598499 w 4811477"/>
-              <a:gd name="connsiteY1" fmla="*/ 0 h 6858000"/>
-              <a:gd name="connsiteX2" fmla="*/ 3661482 w 4811477"/>
-              <a:gd name="connsiteY2" fmla="*/ 69271 h 6858000"/>
-              <a:gd name="connsiteX3" fmla="*/ 4811477 w 4811477"/>
-              <a:gd name="connsiteY3" fmla="*/ 3429000 h 6858000"/>
-              <a:gd name="connsiteX4" fmla="*/ 3661482 w 4811477"/>
-              <a:gd name="connsiteY4" fmla="*/ 6788730 h 6858000"/>
-              <a:gd name="connsiteX5" fmla="*/ 3598499 w 4811477"/>
-              <a:gd name="connsiteY5" fmla="*/ 6858000 h 6858000"/>
-              <a:gd name="connsiteX6" fmla="*/ 0 w 4811477"/>
-              <a:gd name="connsiteY6" fmla="*/ 6858000 h 6858000"/>
-            </a:gdLst>
-            <a:ahLst/>
-            <a:cxnLst>
-              <a:cxn ang="0">
-                <a:pos x="connsiteX0" y="connsiteY0"/>
-              </a:cxn>
-              <a:cxn ang="0">
-                <a:pos x="connsiteX1" y="connsiteY1"/>
-              </a:cxn>
-              <a:cxn ang="0">
-                <a:pos x="connsiteX2" y="connsiteY2"/>
-              </a:cxn>
-              <a:cxn ang="0">
-                <a:pos x="connsiteX3" y="connsiteY3"/>
-              </a:cxn>
-              <a:cxn ang="0">
-                <a:pos x="connsiteX4" y="connsiteY4"/>
-              </a:cxn>
-              <a:cxn ang="0">
-                <a:pos x="connsiteX5" y="connsiteY5"/>
-              </a:cxn>
-              <a:cxn ang="0">
-                <a:pos x="connsiteX6" y="connsiteY6"/>
-              </a:cxn>
-            </a:cxnLst>
-            <a:rect l="l" t="t" r="r" b="b"/>
-            <a:pathLst>
-              <a:path w="4811477" h="6858000">
-                <a:moveTo>
-                  <a:pt x="0" y="0"/>
-                </a:moveTo>
-                <a:lnTo>
-                  <a:pt x="3598499" y="0"/>
-                </a:lnTo>
-                <a:lnTo>
-                  <a:pt x="3661482" y="69271"/>
-                </a:lnTo>
-                <a:cubicBezTo>
-                  <a:pt x="4372008" y="929100"/>
-                  <a:pt x="4811477" y="2116944"/>
-                  <a:pt x="4811477" y="3429000"/>
-                </a:cubicBezTo>
-                <a:cubicBezTo>
-                  <a:pt x="4811477" y="4741056"/>
-                  <a:pt x="4372008" y="5928900"/>
-                  <a:pt x="3661482" y="6788730"/>
-                </a:cubicBezTo>
-                <a:lnTo>
-                  <a:pt x="3598499" y="6858000"/>
-                </a:lnTo>
-                <a:lnTo>
-                  <a:pt x="0" y="6858000"/>
-                </a:lnTo>
-                <a:close/>
-              </a:path>
-            </a:pathLst>
-          </a:custGeom>
+          </a:prstGeom>
           <a:ln w="9525">
             <a:noFill/>
           </a:ln>
@@ -14614,9 +16715,7 @@
           </a:fontRef>
         </p:style>
         <p:txBody>
-          <a:bodyPr wrap="square" rtlCol="0" anchor="ctr">
-            <a:noAutofit/>
-          </a:bodyPr>
+          <a:bodyPr rtlCol="0" anchor="ctr"/>
           <a:lstStyle/>
           <a:p>
             <a:pPr marL="0" marR="0" lvl="0" indent="0" algn="ctr" defTabSz="914400" rtl="0" eaLnBrk="1" fontAlgn="auto" latinLnBrk="0" hangingPunct="1">
@@ -14658,7 +16757,7 @@
           <p:cNvPr id="2" name="Título 1">
             <a:extLst>
               <a:ext uri="{FF2B5EF4-FFF2-40B4-BE49-F238E27FC236}">
-                <a16:creationId xmlns:a16="http://schemas.microsoft.com/office/drawing/2014/main" id="{EC0C3B75-B8C8-48E2-A537-EF03E63BB6F6}"/>
+                <a16:creationId xmlns:a16="http://schemas.microsoft.com/office/drawing/2014/main" id="{7CEC00B8-C060-4706-A6FA-00C75BBCF67F}"/>
               </a:ext>
             </a:extLst>
           </p:cNvPr>
@@ -14671,8 +16770,8 @@
         </p:nvSpPr>
         <p:spPr>
           <a:xfrm>
-            <a:off x="621792" y="1161288"/>
-            <a:ext cx="3602736" cy="4526280"/>
+            <a:off x="1115568" y="548640"/>
+            <a:ext cx="10168128" cy="1179576"/>
           </a:xfrm>
         </p:spPr>
         <p:txBody>
@@ -14682,7 +16781,7 @@
           <a:lstStyle/>
           <a:p>
             <a:r>
-              <a:rPr lang="pt-PT" dirty="0">
+              <a:rPr lang="pt-PT" sz="4000" dirty="0">
                 <a:effectLst>
                   <a:outerShdw blurRad="38100" dist="38100" dir="2700000" algn="tl">
                     <a:srgbClr val="000000">
@@ -14691,7 +16790,7 @@
                   </a:outerShdw>
                 </a:effectLst>
               </a:rPr>
-              <a:t>Principais dificuldades e esforço individual</a:t>
+              <a:t>Funcionalidades Adicionadas</a:t>
             </a:r>
           </a:p>
         </p:txBody>
@@ -14701,7 +16800,7 @@
           <p:cNvPr id="14" name="Rectangle 13">
             <a:extLst>
               <a:ext uri="{FF2B5EF4-FFF2-40B4-BE49-F238E27FC236}">
-                <a16:creationId xmlns:a16="http://schemas.microsoft.com/office/drawing/2014/main" id="{463EEC44-1BA3-44ED-81FC-A644B04B2A44}"/>
+                <a16:creationId xmlns:a16="http://schemas.microsoft.com/office/drawing/2014/main" id="{074B4F7D-14B2-478B-8BF5-01E4E0C5D263}"/>
               </a:ext>
               <a:ext uri="{C183D7F6-B498-43B3-948B-1728B52AA6E4}">
                 <adec:decorative xmlns:adec="http://schemas.microsoft.com/office/drawing/2017/decorative" val="1"/>
@@ -14721,8 +16820,8 @@
         </p:nvSpPr>
         <p:spPr>
           <a:xfrm>
-            <a:off x="0" y="3102049"/>
-            <a:ext cx="128016" cy="653903"/>
+            <a:off x="498834" y="758952"/>
+            <a:ext cx="128016" cy="704088"/>
           </a:xfrm>
           <a:prstGeom prst="rect">
             <a:avLst/>
@@ -14769,7 +16868,7 @@
           <p:cNvPr id="3" name="Marcador de Posição de Conteúdo 2">
             <a:extLst>
               <a:ext uri="{FF2B5EF4-FFF2-40B4-BE49-F238E27FC236}">
-                <a16:creationId xmlns:a16="http://schemas.microsoft.com/office/drawing/2014/main" id="{EAB80583-B529-422A-8C95-53B5990AAB96}"/>
+                <a16:creationId xmlns:a16="http://schemas.microsoft.com/office/drawing/2014/main" id="{32587519-6715-4148-9F6C-A19A67EAA123}"/>
               </a:ext>
             </a:extLst>
           </p:cNvPr>
@@ -14782,132 +16881,239 @@
         </p:nvSpPr>
         <p:spPr>
           <a:xfrm>
-            <a:off x="5433269" y="928116"/>
-            <a:ext cx="5916603" cy="4992624"/>
+            <a:off x="626850" y="2296032"/>
+            <a:ext cx="10656846" cy="3945490"/>
           </a:xfrm>
         </p:spPr>
         <p:txBody>
-          <a:bodyPr anchor="ctr">
-            <a:normAutofit/>
+          <a:bodyPr>
+            <a:normAutofit fontScale="77500" lnSpcReduction="20000"/>
           </a:bodyPr>
           <a:lstStyle/>
           <a:p>
+            <a:pPr algn="just">
+              <a:lnSpc>
+                <a:spcPct val="110000"/>
+              </a:lnSpc>
+            </a:pPr>
+            <a:r>
+              <a:rPr lang="pt-PT" sz="2100" dirty="0"/>
+              <a:t>StreamZ:</a:t>
+            </a:r>
+          </a:p>
+          <a:p>
+            <a:pPr lvl="1" algn="just">
+              <a:lnSpc>
+                <a:spcPct val="110000"/>
+              </a:lnSpc>
+            </a:pPr>
             <a:r>
               <a:rPr lang="pt-PT" sz="1800" dirty="0"/>
-              <a:t>Principais dificuldades</a:t>
-            </a:r>
-          </a:p>
-          <a:p>
-            <a:pPr lvl="1" algn="just"/>
-            <a:r>
-              <a:rPr lang="pt-PT" sz="1400" dirty="0"/>
-              <a:t>Decompor o problema proposto nas melhores e mais eficientes estruturas de dados;</a:t>
-            </a:r>
-          </a:p>
-          <a:p>
-            <a:pPr lvl="1" algn="just"/>
-            <a:r>
-              <a:rPr lang="pt-PT" sz="1400" dirty="0"/>
-              <a:t>Trabalhar com um número elevado de </a:t>
-            </a:r>
-            <a:r>
-              <a:rPr lang="pt-PT" sz="1400" i="1" dirty="0" err="1"/>
-              <a:t>pointers</a:t>
-            </a:r>
-            <a:r>
-              <a:rPr lang="pt-PT" sz="1400" i="1" dirty="0"/>
-              <a:t>;</a:t>
-            </a:r>
-          </a:p>
-          <a:p>
-            <a:pPr lvl="1" algn="just"/>
-            <a:r>
-              <a:rPr lang="pt-PT" sz="1400" dirty="0"/>
-              <a:t>Criação de um programa com fluxo dinâmico e interativo, não permitindo, contudo, maus </a:t>
-            </a:r>
-            <a:r>
-              <a:rPr lang="pt-PT" sz="1400" i="1" dirty="0"/>
-              <a:t>inputs</a:t>
-            </a:r>
-            <a:r>
-              <a:rPr lang="pt-PT" sz="1400" dirty="0"/>
-              <a:t> do utilizador;</a:t>
-            </a:r>
-          </a:p>
-          <a:p>
-            <a:pPr lvl="1" algn="just"/>
-            <a:r>
-              <a:rPr lang="pt-PT" sz="1400" dirty="0"/>
-              <a:t>O desenvolvimento do melhor padrão possível para guardar e importar os respetivos dados em ficheiros;</a:t>
-            </a:r>
-          </a:p>
-          <a:p>
-            <a:pPr lvl="1" algn="just"/>
-            <a:r>
-              <a:rPr lang="pt-PT" sz="1400" dirty="0"/>
-              <a:t>Criação de material de teste detalhado, com a utilização dos google </a:t>
-            </a:r>
-            <a:r>
-              <a:rPr lang="pt-PT" sz="1400" i="1" dirty="0" err="1"/>
-              <a:t>tests</a:t>
-            </a:r>
-            <a:r>
-              <a:rPr lang="pt-PT" sz="1400" dirty="0"/>
-              <a:t>;</a:t>
-            </a:r>
-          </a:p>
-          <a:p>
-            <a:pPr lvl="1" algn="just"/>
-            <a:r>
-              <a:rPr lang="pt-PT" sz="1400" dirty="0"/>
-              <a:t>Obtenção de um programa </a:t>
-            </a:r>
-            <a:r>
-              <a:rPr lang="pt-PT" sz="1400" i="1" dirty="0" err="1"/>
-              <a:t>user</a:t>
-            </a:r>
-            <a:r>
-              <a:rPr lang="pt-PT" sz="1400" dirty="0"/>
+              <a:t>Adicionamos um atributo </a:t>
+            </a:r>
+            <a:r>
+              <a:rPr lang="pt-PT" sz="1800" i="1" dirty="0" err="1"/>
+              <a:t>capacity</a:t>
+            </a:r>
+            <a:r>
+              <a:rPr lang="pt-PT" sz="1800" dirty="0"/>
+              <a:t>, que reflete a capacidade de </a:t>
+            </a:r>
+            <a:r>
+              <a:rPr lang="pt-PT" sz="1800" i="1" dirty="0" err="1"/>
+              <a:t>streams</a:t>
+            </a:r>
+            <a:r>
+              <a:rPr lang="pt-PT" sz="1800" dirty="0"/>
+              <a:t> ativas da plataforma.</a:t>
+            </a:r>
+          </a:p>
+          <a:p>
+            <a:pPr algn="just">
+              <a:lnSpc>
+                <a:spcPct val="110000"/>
+              </a:lnSpc>
+            </a:pPr>
+            <a:r>
+              <a:rPr lang="pt-PT" sz="1600" dirty="0"/>
               <a:t> </a:t>
             </a:r>
             <a:r>
-              <a:rPr lang="pt-PT" sz="1400" i="1" dirty="0" err="1"/>
-              <a:t>friendly</a:t>
-            </a:r>
-            <a:r>
-              <a:rPr lang="pt-PT" sz="1400" dirty="0"/>
+              <a:rPr lang="pt-PT" sz="2100" dirty="0"/>
+              <a:t>Classe dos Menus:</a:t>
+            </a:r>
+          </a:p>
+          <a:p>
+            <a:pPr lvl="1" algn="just">
+              <a:lnSpc>
+                <a:spcPct val="110000"/>
+              </a:lnSpc>
+            </a:pPr>
+            <a:r>
+              <a:rPr lang="pt-PT" sz="1800" dirty="0"/>
+              <a:t>Utilizada na criação dos menus de consola interativos que se encontram na </a:t>
+            </a:r>
+            <a:r>
+              <a:rPr lang="pt-PT" sz="1800" i="1" dirty="0"/>
+              <a:t>framework</a:t>
+            </a:r>
+            <a:r>
+              <a:rPr lang="pt-PT" sz="1800" dirty="0"/>
               <a:t>.</a:t>
             </a:r>
           </a:p>
           <a:p>
-            <a:endParaRPr lang="pt-PT" sz="1700" dirty="0"/>
-          </a:p>
-          <a:p>
+            <a:pPr algn="just">
+              <a:lnSpc>
+                <a:spcPct val="110000"/>
+              </a:lnSpc>
+            </a:pPr>
+            <a:r>
+              <a:rPr lang="pt-PT" sz="2100" dirty="0"/>
+              <a:t>StreamZ Framework, que utiliza a classe StreamZ e as restantes relacionadas com esta última, onde se encontram implementadas estas funcionalidades:</a:t>
+            </a:r>
+          </a:p>
+          <a:p>
+            <a:pPr lvl="1" algn="just">
+              <a:lnSpc>
+                <a:spcPct val="110000"/>
+              </a:lnSpc>
+            </a:pPr>
             <a:r>
               <a:rPr lang="pt-PT" sz="1800" dirty="0"/>
-              <a:t>Participação de cada elemento:</a:t>
-            </a:r>
-          </a:p>
-          <a:p>
-            <a:pPr lvl="1" algn="just"/>
-            <a:r>
-              <a:rPr lang="pt-PT" sz="1400" dirty="0"/>
-              <a:t>Lucas Santos: 50%</a:t>
-            </a:r>
-          </a:p>
-          <a:p>
-            <a:pPr lvl="1" algn="just"/>
-            <a:r>
-              <a:rPr lang="pt-PT" sz="1400" dirty="0"/>
-              <a:t>Sérgio da Gama: 50%</a:t>
-            </a:r>
+              <a:t>Possibilidade de não criar uma, mas sim, um ilimitado número de plataformas StreamZ;</a:t>
+            </a:r>
+          </a:p>
+          <a:p>
+            <a:pPr lvl="1" algn="just">
+              <a:lnSpc>
+                <a:spcPct val="110000"/>
+              </a:lnSpc>
+            </a:pPr>
+            <a:r>
+              <a:rPr lang="pt-PT" sz="1800" dirty="0"/>
+              <a:t>Possibilidade de guardar ou importar a qualquer altura, no menu das definições, onde também é possível ativar o </a:t>
+            </a:r>
+            <a:r>
+              <a:rPr lang="pt-PT" sz="1800" i="1" dirty="0"/>
+              <a:t>auto save;</a:t>
+            </a:r>
+          </a:p>
+          <a:p>
+            <a:pPr lvl="1" algn="just">
+              <a:lnSpc>
+                <a:spcPct val="110000"/>
+              </a:lnSpc>
+            </a:pPr>
+            <a:r>
+              <a:rPr lang="pt-PT" sz="1800" dirty="0"/>
+              <a:t>Sistema de </a:t>
+            </a:r>
+            <a:r>
+              <a:rPr lang="pt-PT" sz="1800" i="1" dirty="0"/>
+              <a:t>Login</a:t>
+            </a:r>
+            <a:r>
+              <a:rPr lang="pt-PT" sz="1800" dirty="0"/>
+              <a:t> (associado a cada uma das plataformas criadas);</a:t>
+            </a:r>
+          </a:p>
+          <a:p>
+            <a:pPr lvl="1" algn="just">
+              <a:lnSpc>
+                <a:spcPct val="110000"/>
+              </a:lnSpc>
+            </a:pPr>
+            <a:r>
+              <a:rPr lang="pt-PT" sz="1800" dirty="0"/>
+              <a:t>Passwords dos utilizadores encriptadas, através do algoritmo </a:t>
+            </a:r>
+            <a:r>
+              <a:rPr lang="pt-PT" sz="1800" i="1" dirty="0"/>
+              <a:t>sha256</a:t>
+            </a:r>
+            <a:r>
+              <a:rPr lang="pt-PT" sz="1800" dirty="0"/>
+              <a:t> (considerado totalmente seguro na atualidade);</a:t>
+            </a:r>
+          </a:p>
+          <a:p>
+            <a:pPr lvl="1" algn="just">
+              <a:lnSpc>
+                <a:spcPct val="110000"/>
+              </a:lnSpc>
+            </a:pPr>
+            <a:r>
+              <a:rPr lang="pt-PT" sz="1800" i="1" dirty="0"/>
+              <a:t>Admin</a:t>
+            </a:r>
+            <a:r>
+              <a:rPr lang="pt-PT" sz="1800" dirty="0"/>
+              <a:t> com a possibilidade de criar e entrar nas contas de todos os utilizadores.</a:t>
+            </a:r>
+          </a:p>
+          <a:p>
+            <a:pPr algn="just">
+              <a:lnSpc>
+                <a:spcPct val="110000"/>
+              </a:lnSpc>
+            </a:pPr>
+            <a:r>
+              <a:rPr lang="pt-PT" sz="2100" dirty="0"/>
+              <a:t>Informação guardada em ficheiros:</a:t>
+            </a:r>
+          </a:p>
+          <a:p>
+            <a:pPr lvl="1" algn="just">
+              <a:lnSpc>
+                <a:spcPct val="110000"/>
+              </a:lnSpc>
+            </a:pPr>
+            <a:r>
+              <a:rPr lang="pt-PT" sz="1800" dirty="0"/>
+              <a:t>Cada ficheiro tem um indicativo de que se trata de um ficheiro formatado pela StreamZ, caso contrário é ignorado;</a:t>
+            </a:r>
+          </a:p>
+          <a:p>
+            <a:pPr lvl="1" algn="just">
+              <a:lnSpc>
+                <a:spcPct val="110000"/>
+              </a:lnSpc>
+            </a:pPr>
+            <a:r>
+              <a:rPr lang="pt-PT" sz="1800" dirty="0"/>
+              <a:t>Todo os comentários são também guardados nos respetivos ficheiros;</a:t>
+            </a:r>
+          </a:p>
+          <a:p>
+            <a:pPr lvl="1"/>
+            <a:endParaRPr lang="pt-PT" sz="1800" dirty="0"/>
+          </a:p>
+          <a:p>
+            <a:pPr lvl="1"/>
+            <a:endParaRPr lang="pt-PT" sz="1800" dirty="0"/>
+          </a:p>
+          <a:p>
+            <a:pPr lvl="1"/>
+            <a:endParaRPr lang="pt-PT" sz="1800" dirty="0"/>
+          </a:p>
+          <a:p>
+            <a:pPr lvl="1"/>
+            <a:endParaRPr lang="pt-PT" sz="1800" dirty="0"/>
+          </a:p>
+          <a:p>
+            <a:pPr lvl="1"/>
+            <a:endParaRPr lang="pt-PT" sz="1800" dirty="0"/>
+          </a:p>
+          <a:p>
+            <a:endParaRPr lang="pt-PT" sz="2200" dirty="0"/>
           </a:p>
         </p:txBody>
       </p:sp>
     </p:spTree>
     <p:extLst>
       <p:ext uri="{BB962C8B-B14F-4D97-AF65-F5344CB8AC3E}">
-        <p14:creationId xmlns:p14="http://schemas.microsoft.com/office/powerpoint/2010/main" val="3430535733"/>
+        <p14:creationId xmlns:p14="http://schemas.microsoft.com/office/powerpoint/2010/main" val="2277023433"/>
       </p:ext>
     </p:extLst>
   </p:cSld>

</xml_diff>